<commit_message>
overview relationship and update illustrations pptx #272
</commit_message>
<xml_diff>
--- a/illustrations.pptx
+++ b/illustrations.pptx
@@ -4,6 +4,9 @@
   <p:sldMasterIdLst>
     <p:sldMasterId id="2147483648" r:id="rId1"/>
   </p:sldMasterIdLst>
+  <p:notesMasterIdLst>
+    <p:notesMasterId r:id="rId11"/>
+  </p:notesMasterIdLst>
   <p:sldIdLst>
     <p:sldId id="267" r:id="rId2"/>
     <p:sldId id="268" r:id="rId3"/>
@@ -13,6 +16,7 @@
     <p:sldId id="272" r:id="rId7"/>
     <p:sldId id="273" r:id="rId8"/>
     <p:sldId id="274" r:id="rId9"/>
+    <p:sldId id="276" r:id="rId10"/>
   </p:sldIdLst>
   <p:sldSz cx="9144000" cy="6858000" type="screen4x3"/>
   <p:notesSz cx="6858000" cy="9144000"/>
@@ -130,6 +134,511 @@
 </p:presentation>
 </file>
 
+<file path=ppt/notesMasters/notesMaster1.xml><?xml version="1.0" encoding="utf-8"?>
+<p:notesMaster xmlns:a="http://schemas.openxmlformats.org/drawingml/2006/main" xmlns:r="http://schemas.openxmlformats.org/officeDocument/2006/relationships" xmlns:p="http://schemas.openxmlformats.org/presentationml/2006/main">
+  <p:cSld>
+    <p:bg>
+      <p:bgRef idx="1001">
+        <a:schemeClr val="bg1"/>
+      </p:bgRef>
+    </p:bg>
+    <p:spTree>
+      <p:nvGrpSpPr>
+        <p:cNvPr id="1" name=""/>
+        <p:cNvGrpSpPr/>
+        <p:nvPr/>
+      </p:nvGrpSpPr>
+      <p:grpSpPr>
+        <a:xfrm>
+          <a:off x="0" y="0"/>
+          <a:ext cx="0" cy="0"/>
+          <a:chOff x="0" y="0"/>
+          <a:chExt cx="0" cy="0"/>
+        </a:xfrm>
+      </p:grpSpPr>
+      <p:sp>
+        <p:nvSpPr>
+          <p:cNvPr id="2" name="Kopfzeilenplatzhalter 1"/>
+          <p:cNvSpPr>
+            <a:spLocks noGrp="1"/>
+          </p:cNvSpPr>
+          <p:nvPr>
+            <p:ph type="hdr" sz="quarter"/>
+          </p:nvPr>
+        </p:nvSpPr>
+        <p:spPr>
+          <a:xfrm>
+            <a:off x="0" y="0"/>
+            <a:ext cx="2971800" cy="458788"/>
+          </a:xfrm>
+          <a:prstGeom prst="rect">
+            <a:avLst/>
+          </a:prstGeom>
+        </p:spPr>
+        <p:txBody>
+          <a:bodyPr vert="horz" lIns="91440" tIns="45720" rIns="91440" bIns="45720" rtlCol="0"/>
+          <a:lstStyle>
+            <a:lvl1pPr algn="l">
+              <a:defRPr sz="1200"/>
+            </a:lvl1pPr>
+          </a:lstStyle>
+          <a:p>
+            <a:endParaRPr lang="de-CH"/>
+          </a:p>
+        </p:txBody>
+      </p:sp>
+      <p:sp>
+        <p:nvSpPr>
+          <p:cNvPr id="3" name="Datumsplatzhalter 2"/>
+          <p:cNvSpPr>
+            <a:spLocks noGrp="1"/>
+          </p:cNvSpPr>
+          <p:nvPr>
+            <p:ph type="dt" idx="1"/>
+          </p:nvPr>
+        </p:nvSpPr>
+        <p:spPr>
+          <a:xfrm>
+            <a:off x="3884613" y="0"/>
+            <a:ext cx="2971800" cy="458788"/>
+          </a:xfrm>
+          <a:prstGeom prst="rect">
+            <a:avLst/>
+          </a:prstGeom>
+        </p:spPr>
+        <p:txBody>
+          <a:bodyPr vert="horz" lIns="91440" tIns="45720" rIns="91440" bIns="45720" rtlCol="0"/>
+          <a:lstStyle>
+            <a:lvl1pPr algn="r">
+              <a:defRPr sz="1200"/>
+            </a:lvl1pPr>
+          </a:lstStyle>
+          <a:p>
+            <a:fld id="{AA0936E0-B937-435B-957D-29657CD375E8}" type="datetimeFigureOut">
+              <a:rPr lang="de-CH" smtClean="0"/>
+              <a:t>23.08.2024</a:t>
+            </a:fld>
+            <a:endParaRPr lang="de-CH"/>
+          </a:p>
+        </p:txBody>
+      </p:sp>
+      <p:sp>
+        <p:nvSpPr>
+          <p:cNvPr id="4" name="Folienbildplatzhalter 3"/>
+          <p:cNvSpPr>
+            <a:spLocks noGrp="1" noRot="1" noChangeAspect="1"/>
+          </p:cNvSpPr>
+          <p:nvPr>
+            <p:ph type="sldImg" idx="2"/>
+          </p:nvPr>
+        </p:nvSpPr>
+        <p:spPr>
+          <a:xfrm>
+            <a:off x="1371600" y="1143000"/>
+            <a:ext cx="4114800" cy="3086100"/>
+          </a:xfrm>
+          <a:prstGeom prst="rect">
+            <a:avLst/>
+          </a:prstGeom>
+          <a:noFill/>
+          <a:ln w="12700">
+            <a:solidFill>
+              <a:prstClr val="black"/>
+            </a:solidFill>
+          </a:ln>
+        </p:spPr>
+        <p:txBody>
+          <a:bodyPr vert="horz" lIns="91440" tIns="45720" rIns="91440" bIns="45720" rtlCol="0" anchor="ctr"/>
+          <a:lstStyle/>
+          <a:p>
+            <a:endParaRPr lang="de-CH"/>
+          </a:p>
+        </p:txBody>
+      </p:sp>
+      <p:sp>
+        <p:nvSpPr>
+          <p:cNvPr id="5" name="Notizenplatzhalter 4"/>
+          <p:cNvSpPr>
+            <a:spLocks noGrp="1"/>
+          </p:cNvSpPr>
+          <p:nvPr>
+            <p:ph type="body" sz="quarter" idx="3"/>
+          </p:nvPr>
+        </p:nvSpPr>
+        <p:spPr>
+          <a:xfrm>
+            <a:off x="685800" y="4400550"/>
+            <a:ext cx="5486400" cy="3600450"/>
+          </a:xfrm>
+          <a:prstGeom prst="rect">
+            <a:avLst/>
+          </a:prstGeom>
+        </p:spPr>
+        <p:txBody>
+          <a:bodyPr vert="horz" lIns="91440" tIns="45720" rIns="91440" bIns="45720" rtlCol="0"/>
+          <a:lstStyle/>
+          <a:p>
+            <a:pPr lvl="0"/>
+            <a:r>
+              <a:rPr lang="de-DE"/>
+              <a:t>Mastertextformat bearbeiten</a:t>
+            </a:r>
+          </a:p>
+          <a:p>
+            <a:pPr lvl="1"/>
+            <a:r>
+              <a:rPr lang="de-DE"/>
+              <a:t>Zweite Ebene</a:t>
+            </a:r>
+          </a:p>
+          <a:p>
+            <a:pPr lvl="2"/>
+            <a:r>
+              <a:rPr lang="de-DE"/>
+              <a:t>Dritte Ebene</a:t>
+            </a:r>
+          </a:p>
+          <a:p>
+            <a:pPr lvl="3"/>
+            <a:r>
+              <a:rPr lang="de-DE"/>
+              <a:t>Vierte Ebene</a:t>
+            </a:r>
+          </a:p>
+          <a:p>
+            <a:pPr lvl="4"/>
+            <a:r>
+              <a:rPr lang="de-DE"/>
+              <a:t>Fünfte Ebene</a:t>
+            </a:r>
+            <a:endParaRPr lang="de-CH"/>
+          </a:p>
+        </p:txBody>
+      </p:sp>
+      <p:sp>
+        <p:nvSpPr>
+          <p:cNvPr id="6" name="Fußzeilenplatzhalter 5"/>
+          <p:cNvSpPr>
+            <a:spLocks noGrp="1"/>
+          </p:cNvSpPr>
+          <p:nvPr>
+            <p:ph type="ftr" sz="quarter" idx="4"/>
+          </p:nvPr>
+        </p:nvSpPr>
+        <p:spPr>
+          <a:xfrm>
+            <a:off x="0" y="8685213"/>
+            <a:ext cx="2971800" cy="458787"/>
+          </a:xfrm>
+          <a:prstGeom prst="rect">
+            <a:avLst/>
+          </a:prstGeom>
+        </p:spPr>
+        <p:txBody>
+          <a:bodyPr vert="horz" lIns="91440" tIns="45720" rIns="91440" bIns="45720" rtlCol="0" anchor="b"/>
+          <a:lstStyle>
+            <a:lvl1pPr algn="l">
+              <a:defRPr sz="1200"/>
+            </a:lvl1pPr>
+          </a:lstStyle>
+          <a:p>
+            <a:endParaRPr lang="de-CH"/>
+          </a:p>
+        </p:txBody>
+      </p:sp>
+      <p:sp>
+        <p:nvSpPr>
+          <p:cNvPr id="7" name="Foliennummernplatzhalter 6"/>
+          <p:cNvSpPr>
+            <a:spLocks noGrp="1"/>
+          </p:cNvSpPr>
+          <p:nvPr>
+            <p:ph type="sldNum" sz="quarter" idx="5"/>
+          </p:nvPr>
+        </p:nvSpPr>
+        <p:spPr>
+          <a:xfrm>
+            <a:off x="3884613" y="8685213"/>
+            <a:ext cx="2971800" cy="458787"/>
+          </a:xfrm>
+          <a:prstGeom prst="rect">
+            <a:avLst/>
+          </a:prstGeom>
+        </p:spPr>
+        <p:txBody>
+          <a:bodyPr vert="horz" lIns="91440" tIns="45720" rIns="91440" bIns="45720" rtlCol="0" anchor="b"/>
+          <a:lstStyle>
+            <a:lvl1pPr algn="r">
+              <a:defRPr sz="1200"/>
+            </a:lvl1pPr>
+          </a:lstStyle>
+          <a:p>
+            <a:fld id="{51821AC4-155B-4558-8301-8A488F3002C0}" type="slidenum">
+              <a:rPr lang="de-CH" smtClean="0"/>
+              <a:t>‹#›</a:t>
+            </a:fld>
+            <a:endParaRPr lang="de-CH"/>
+          </a:p>
+        </p:txBody>
+      </p:sp>
+    </p:spTree>
+    <p:extLst>
+      <p:ext uri="{BB962C8B-B14F-4D97-AF65-F5344CB8AC3E}">
+        <p14:creationId xmlns:p14="http://schemas.microsoft.com/office/powerpoint/2010/main" val="2908380303"/>
+      </p:ext>
+    </p:extLst>
+  </p:cSld>
+  <p:clrMap bg1="lt1" tx1="dk1" bg2="lt2" tx2="dk2" accent1="accent1" accent2="accent2" accent3="accent3" accent4="accent4" accent5="accent5" accent6="accent6" hlink="hlink" folHlink="folHlink"/>
+  <p:notesStyle>
+    <a:lvl1pPr marL="0" algn="l" defTabSz="914400" rtl="0" eaLnBrk="1" latinLnBrk="0" hangingPunct="1">
+      <a:defRPr sz="1200" kern="1200">
+        <a:solidFill>
+          <a:schemeClr val="tx1"/>
+        </a:solidFill>
+        <a:latin typeface="+mn-lt"/>
+        <a:ea typeface="+mn-ea"/>
+        <a:cs typeface="+mn-cs"/>
+      </a:defRPr>
+    </a:lvl1pPr>
+    <a:lvl2pPr marL="457200" algn="l" defTabSz="914400" rtl="0" eaLnBrk="1" latinLnBrk="0" hangingPunct="1">
+      <a:defRPr sz="1200" kern="1200">
+        <a:solidFill>
+          <a:schemeClr val="tx1"/>
+        </a:solidFill>
+        <a:latin typeface="+mn-lt"/>
+        <a:ea typeface="+mn-ea"/>
+        <a:cs typeface="+mn-cs"/>
+      </a:defRPr>
+    </a:lvl2pPr>
+    <a:lvl3pPr marL="914400" algn="l" defTabSz="914400" rtl="0" eaLnBrk="1" latinLnBrk="0" hangingPunct="1">
+      <a:defRPr sz="1200" kern="1200">
+        <a:solidFill>
+          <a:schemeClr val="tx1"/>
+        </a:solidFill>
+        <a:latin typeface="+mn-lt"/>
+        <a:ea typeface="+mn-ea"/>
+        <a:cs typeface="+mn-cs"/>
+      </a:defRPr>
+    </a:lvl3pPr>
+    <a:lvl4pPr marL="1371600" algn="l" defTabSz="914400" rtl="0" eaLnBrk="1" latinLnBrk="0" hangingPunct="1">
+      <a:defRPr sz="1200" kern="1200">
+        <a:solidFill>
+          <a:schemeClr val="tx1"/>
+        </a:solidFill>
+        <a:latin typeface="+mn-lt"/>
+        <a:ea typeface="+mn-ea"/>
+        <a:cs typeface="+mn-cs"/>
+      </a:defRPr>
+    </a:lvl4pPr>
+    <a:lvl5pPr marL="1828800" algn="l" defTabSz="914400" rtl="0" eaLnBrk="1" latinLnBrk="0" hangingPunct="1">
+      <a:defRPr sz="1200" kern="1200">
+        <a:solidFill>
+          <a:schemeClr val="tx1"/>
+        </a:solidFill>
+        <a:latin typeface="+mn-lt"/>
+        <a:ea typeface="+mn-ea"/>
+        <a:cs typeface="+mn-cs"/>
+      </a:defRPr>
+    </a:lvl5pPr>
+    <a:lvl6pPr marL="2286000" algn="l" defTabSz="914400" rtl="0" eaLnBrk="1" latinLnBrk="0" hangingPunct="1">
+      <a:defRPr sz="1200" kern="1200">
+        <a:solidFill>
+          <a:schemeClr val="tx1"/>
+        </a:solidFill>
+        <a:latin typeface="+mn-lt"/>
+        <a:ea typeface="+mn-ea"/>
+        <a:cs typeface="+mn-cs"/>
+      </a:defRPr>
+    </a:lvl6pPr>
+    <a:lvl7pPr marL="2743200" algn="l" defTabSz="914400" rtl="0" eaLnBrk="1" latinLnBrk="0" hangingPunct="1">
+      <a:defRPr sz="1200" kern="1200">
+        <a:solidFill>
+          <a:schemeClr val="tx1"/>
+        </a:solidFill>
+        <a:latin typeface="+mn-lt"/>
+        <a:ea typeface="+mn-ea"/>
+        <a:cs typeface="+mn-cs"/>
+      </a:defRPr>
+    </a:lvl7pPr>
+    <a:lvl8pPr marL="3200400" algn="l" defTabSz="914400" rtl="0" eaLnBrk="1" latinLnBrk="0" hangingPunct="1">
+      <a:defRPr sz="1200" kern="1200">
+        <a:solidFill>
+          <a:schemeClr val="tx1"/>
+        </a:solidFill>
+        <a:latin typeface="+mn-lt"/>
+        <a:ea typeface="+mn-ea"/>
+        <a:cs typeface="+mn-cs"/>
+      </a:defRPr>
+    </a:lvl8pPr>
+    <a:lvl9pPr marL="3657600" algn="l" defTabSz="914400" rtl="0" eaLnBrk="1" latinLnBrk="0" hangingPunct="1">
+      <a:defRPr sz="1200" kern="1200">
+        <a:solidFill>
+          <a:schemeClr val="tx1"/>
+        </a:solidFill>
+        <a:latin typeface="+mn-lt"/>
+        <a:ea typeface="+mn-ea"/>
+        <a:cs typeface="+mn-cs"/>
+      </a:defRPr>
+    </a:lvl9pPr>
+  </p:notesStyle>
+</p:notesMaster>
+</file>
+
+<file path=ppt/notesSlides/notesSlide1.xml><?xml version="1.0" encoding="utf-8"?>
+<p:notes xmlns:a="http://schemas.openxmlformats.org/drawingml/2006/main" xmlns:r="http://schemas.openxmlformats.org/officeDocument/2006/relationships" xmlns:p="http://schemas.openxmlformats.org/presentationml/2006/main">
+  <p:cSld>
+    <p:spTree>
+      <p:nvGrpSpPr>
+        <p:cNvPr id="1" name=""/>
+        <p:cNvGrpSpPr/>
+        <p:nvPr/>
+      </p:nvGrpSpPr>
+      <p:grpSpPr>
+        <a:xfrm>
+          <a:off x="0" y="0"/>
+          <a:ext cx="0" cy="0"/>
+          <a:chOff x="0" y="0"/>
+          <a:chExt cx="0" cy="0"/>
+        </a:xfrm>
+      </p:grpSpPr>
+      <p:sp>
+        <p:nvSpPr>
+          <p:cNvPr id="2" name="Folienbildplatzhalter 1"/>
+          <p:cNvSpPr>
+            <a:spLocks noGrp="1" noRot="1" noChangeAspect="1"/>
+          </p:cNvSpPr>
+          <p:nvPr>
+            <p:ph type="sldImg"/>
+          </p:nvPr>
+        </p:nvSpPr>
+        <p:spPr/>
+      </p:sp>
+      <p:sp>
+        <p:nvSpPr>
+          <p:cNvPr id="3" name="Notizenplatzhalter 2"/>
+          <p:cNvSpPr>
+            <a:spLocks noGrp="1"/>
+          </p:cNvSpPr>
+          <p:nvPr>
+            <p:ph type="body" idx="1"/>
+          </p:nvPr>
+        </p:nvSpPr>
+        <p:spPr/>
+        <p:txBody>
+          <a:bodyPr/>
+          <a:lstStyle/>
+          <a:p>
+            <a:r>
+              <a:rPr lang="de-CH" dirty="0"/>
+              <a:t>2-1 Medication List document -&gt; dynamisch generiertes Dokument</a:t>
+            </a:r>
+          </a:p>
+          <a:p>
+            <a:r>
+              <a:rPr lang="de-CH" dirty="0"/>
+              <a:t>Medication Card gleiche Farbe wie Medication List</a:t>
+            </a:r>
+          </a:p>
+          <a:p>
+            <a:r>
+              <a:rPr lang="de-CH" dirty="0"/>
+              <a:t>TODO: </a:t>
+            </a:r>
+            <a:r>
+              <a:rPr lang="de-CH" dirty="0" err="1"/>
+              <a:t>Beloc</a:t>
+            </a:r>
+            <a:r>
+              <a:rPr lang="de-CH" dirty="0"/>
+              <a:t> Zok </a:t>
+            </a:r>
+            <a:r>
+              <a:rPr lang="de-CH" dirty="0" err="1"/>
+              <a:t>Medication</a:t>
+            </a:r>
+            <a:r>
+              <a:rPr lang="de-CH" dirty="0"/>
+              <a:t> Statement Farbe 2-7</a:t>
+            </a:r>
+          </a:p>
+          <a:p>
+            <a:r>
+              <a:rPr lang="de-CH" dirty="0"/>
+              <a:t>Boxen alle gleich</a:t>
+            </a:r>
+          </a:p>
+          <a:p>
+            <a:endParaRPr lang="de-CH" dirty="0"/>
+          </a:p>
+          <a:p>
+            <a:r>
+              <a:rPr lang="de-CH" dirty="0"/>
+              <a:t>Nicht mehr Entry </a:t>
+            </a:r>
+            <a:r>
+              <a:rPr lang="de-CH" dirty="0">
+                <a:sym typeface="Wingdings" panose="05000000000000000000" pitchFamily="2" charset="2"/>
+              </a:rPr>
+              <a:t> Ressource</a:t>
+            </a:r>
+            <a:endParaRPr lang="de-CH" dirty="0"/>
+          </a:p>
+          <a:p>
+            <a:r>
+              <a:rPr lang="de-CH" dirty="0"/>
+              <a:t>TODO: identifier klein schreibe</a:t>
+            </a:r>
+          </a:p>
+          <a:p>
+            <a:r>
+              <a:rPr lang="de-CH" dirty="0"/>
+              <a:t>Pfeil</a:t>
+            </a:r>
+          </a:p>
+          <a:p>
+            <a:r>
+              <a:rPr lang="de-CH" dirty="0"/>
+              <a:t>Screenshot auf Laptop</a:t>
+            </a:r>
+          </a:p>
+        </p:txBody>
+      </p:sp>
+      <p:sp>
+        <p:nvSpPr>
+          <p:cNvPr id="4" name="Foliennummernplatzhalter 3"/>
+          <p:cNvSpPr>
+            <a:spLocks noGrp="1"/>
+          </p:cNvSpPr>
+          <p:nvPr>
+            <p:ph type="sldNum" sz="quarter" idx="5"/>
+          </p:nvPr>
+        </p:nvSpPr>
+        <p:spPr/>
+        <p:txBody>
+          <a:bodyPr/>
+          <a:lstStyle/>
+          <a:p>
+            <a:fld id="{5C75C527-47DF-48F9-A085-BFEDB02C25E1}" type="slidenum">
+              <a:rPr lang="de-CH" smtClean="0"/>
+              <a:t>9</a:t>
+            </a:fld>
+            <a:endParaRPr lang="de-CH"/>
+          </a:p>
+        </p:txBody>
+      </p:sp>
+    </p:spTree>
+    <p:extLst>
+      <p:ext uri="{BB962C8B-B14F-4D97-AF65-F5344CB8AC3E}">
+        <p14:creationId xmlns:p14="http://schemas.microsoft.com/office/powerpoint/2010/main" val="2281108298"/>
+      </p:ext>
+    </p:extLst>
+  </p:cSld>
+  <p:clrMapOvr>
+    <a:masterClrMapping/>
+  </p:clrMapOvr>
+</p:notes>
+</file>
+
 <file path=ppt/slideLayouts/slideLayout1.xml><?xml version="1.0" encoding="utf-8"?>
 <p:sldLayout xmlns:a="http://schemas.openxmlformats.org/drawingml/2006/main" xmlns:r="http://schemas.openxmlformats.org/officeDocument/2006/relationships" xmlns:p="http://schemas.openxmlformats.org/presentationml/2006/main" type="title" preserve="1">
   <p:cSld name="Titelfolie">
@@ -309,7 +818,7 @@
           <a:p>
             <a:fld id="{DAD4AEBD-E175-AE42-B084-2E4026DB8423}" type="datetimeFigureOut">
               <a:rPr lang="de-DE" smtClean="0"/>
-              <a:t>01.06.2024</a:t>
+              <a:t>23.08.2024</a:t>
             </a:fld>
             <a:endParaRPr lang="de-DE"/>
           </a:p>
@@ -477,7 +986,7 @@
           <a:p>
             <a:fld id="{DAD4AEBD-E175-AE42-B084-2E4026DB8423}" type="datetimeFigureOut">
               <a:rPr lang="de-DE" smtClean="0"/>
-              <a:t>01.06.2024</a:t>
+              <a:t>23.08.2024</a:t>
             </a:fld>
             <a:endParaRPr lang="de-DE"/>
           </a:p>
@@ -655,7 +1164,7 @@
           <a:p>
             <a:fld id="{DAD4AEBD-E175-AE42-B084-2E4026DB8423}" type="datetimeFigureOut">
               <a:rPr lang="de-DE" smtClean="0"/>
-              <a:t>01.06.2024</a:t>
+              <a:t>23.08.2024</a:t>
             </a:fld>
             <a:endParaRPr lang="de-DE"/>
           </a:p>
@@ -823,7 +1332,7 @@
           <a:p>
             <a:fld id="{DAD4AEBD-E175-AE42-B084-2E4026DB8423}" type="datetimeFigureOut">
               <a:rPr lang="de-DE" smtClean="0"/>
-              <a:t>01.06.2024</a:t>
+              <a:t>23.08.2024</a:t>
             </a:fld>
             <a:endParaRPr lang="de-DE"/>
           </a:p>
@@ -1068,7 +1577,7 @@
           <a:p>
             <a:fld id="{DAD4AEBD-E175-AE42-B084-2E4026DB8423}" type="datetimeFigureOut">
               <a:rPr lang="de-DE" smtClean="0"/>
-              <a:t>01.06.2024</a:t>
+              <a:t>23.08.2024</a:t>
             </a:fld>
             <a:endParaRPr lang="de-DE"/>
           </a:p>
@@ -1353,7 +1862,7 @@
           <a:p>
             <a:fld id="{DAD4AEBD-E175-AE42-B084-2E4026DB8423}" type="datetimeFigureOut">
               <a:rPr lang="de-DE" smtClean="0"/>
-              <a:t>01.06.2024</a:t>
+              <a:t>23.08.2024</a:t>
             </a:fld>
             <a:endParaRPr lang="de-DE"/>
           </a:p>
@@ -1772,7 +2281,7 @@
           <a:p>
             <a:fld id="{DAD4AEBD-E175-AE42-B084-2E4026DB8423}" type="datetimeFigureOut">
               <a:rPr lang="de-DE" smtClean="0"/>
-              <a:t>01.06.2024</a:t>
+              <a:t>23.08.2024</a:t>
             </a:fld>
             <a:endParaRPr lang="de-DE"/>
           </a:p>
@@ -1889,7 +2398,7 @@
           <a:p>
             <a:fld id="{DAD4AEBD-E175-AE42-B084-2E4026DB8423}" type="datetimeFigureOut">
               <a:rPr lang="de-DE" smtClean="0"/>
-              <a:t>01.06.2024</a:t>
+              <a:t>23.08.2024</a:t>
             </a:fld>
             <a:endParaRPr lang="de-DE"/>
           </a:p>
@@ -1984,7 +2493,7 @@
           <a:p>
             <a:fld id="{DAD4AEBD-E175-AE42-B084-2E4026DB8423}" type="datetimeFigureOut">
               <a:rPr lang="de-DE" smtClean="0"/>
-              <a:t>01.06.2024</a:t>
+              <a:t>23.08.2024</a:t>
             </a:fld>
             <a:endParaRPr lang="de-DE"/>
           </a:p>
@@ -2259,7 +2768,7 @@
           <a:p>
             <a:fld id="{DAD4AEBD-E175-AE42-B084-2E4026DB8423}" type="datetimeFigureOut">
               <a:rPr lang="de-DE" smtClean="0"/>
-              <a:t>01.06.2024</a:t>
+              <a:t>23.08.2024</a:t>
             </a:fld>
             <a:endParaRPr lang="de-DE"/>
           </a:p>
@@ -2511,7 +3020,7 @@
           <a:p>
             <a:fld id="{DAD4AEBD-E175-AE42-B084-2E4026DB8423}" type="datetimeFigureOut">
               <a:rPr lang="de-DE" smtClean="0"/>
-              <a:t>01.06.2024</a:t>
+              <a:t>23.08.2024</a:t>
             </a:fld>
             <a:endParaRPr lang="de-DE"/>
           </a:p>
@@ -2722,7 +3231,7 @@
           <a:p>
             <a:fld id="{DAD4AEBD-E175-AE42-B084-2E4026DB8423}" type="datetimeFigureOut">
               <a:rPr lang="de-DE" smtClean="0"/>
-              <a:t>01.06.2024</a:t>
+              <a:t>23.08.2024</a:t>
             </a:fld>
             <a:endParaRPr lang="de-DE"/>
           </a:p>
@@ -11644,7 +12153,7 @@
 </file>
 
 <file path=ppt/slides/slide8.xml><?xml version="1.0" encoding="utf-8"?>
-<p:sld xmlns:a="http://schemas.openxmlformats.org/drawingml/2006/main" xmlns:r="http://schemas.openxmlformats.org/officeDocument/2006/relationships" xmlns:p="http://schemas.openxmlformats.org/presentationml/2006/main" show="0">
+<p:sld xmlns:a="http://schemas.openxmlformats.org/drawingml/2006/main" xmlns:r="http://schemas.openxmlformats.org/officeDocument/2006/relationships" xmlns:p="http://schemas.openxmlformats.org/presentationml/2006/main">
   <p:cSld>
     <p:spTree>
       <p:nvGrpSpPr>
@@ -13478,6 +13987,3255 @@
     <p:extLst>
       <p:ext uri="{BB962C8B-B14F-4D97-AF65-F5344CB8AC3E}">
         <p14:creationId xmlns:p14="http://schemas.microsoft.com/office/powerpoint/2010/main" val="2655286883"/>
+      </p:ext>
+    </p:extLst>
+  </p:cSld>
+  <p:clrMapOvr>
+    <a:masterClrMapping/>
+  </p:clrMapOvr>
+</p:sld>
+</file>
+
+<file path=ppt/slides/slide9.xml><?xml version="1.0" encoding="utf-8"?>
+<p:sld xmlns:a="http://schemas.openxmlformats.org/drawingml/2006/main" xmlns:r="http://schemas.openxmlformats.org/officeDocument/2006/relationships" xmlns:p="http://schemas.openxmlformats.org/presentationml/2006/main">
+  <p:cSld>
+    <p:spTree>
+      <p:nvGrpSpPr>
+        <p:cNvPr id="1" name=""/>
+        <p:cNvGrpSpPr/>
+        <p:nvPr/>
+      </p:nvGrpSpPr>
+      <p:grpSpPr>
+        <a:xfrm>
+          <a:off x="0" y="0"/>
+          <a:ext cx="0" cy="0"/>
+          <a:chOff x="0" y="0"/>
+          <a:chExt cx="0" cy="0"/>
+        </a:xfrm>
+      </p:grpSpPr>
+      <p:sp>
+        <p:nvSpPr>
+          <p:cNvPr id="36" name="Rectangle 109">
+            <a:extLst>
+              <a:ext uri="{FF2B5EF4-FFF2-40B4-BE49-F238E27FC236}">
+                <a16:creationId xmlns:a16="http://schemas.microsoft.com/office/drawing/2014/main" id="{0F614727-B373-7848-CFF6-E8382204E0C9}"/>
+              </a:ext>
+            </a:extLst>
+          </p:cNvPr>
+          <p:cNvSpPr/>
+          <p:nvPr/>
+        </p:nvSpPr>
+        <p:spPr>
+          <a:xfrm rot="5400000">
+            <a:off x="2139075" y="6252747"/>
+            <a:ext cx="9306333" cy="13584483"/>
+          </a:xfrm>
+          <a:prstGeom prst="rect">
+            <a:avLst/>
+          </a:prstGeom>
+          <a:solidFill>
+            <a:schemeClr val="bg1"/>
+          </a:solidFill>
+          <a:ln>
+            <a:solidFill>
+              <a:schemeClr val="bg1">
+                <a:lumMod val="85000"/>
+              </a:schemeClr>
+            </a:solidFill>
+          </a:ln>
+          <a:effectLst/>
+        </p:spPr>
+        <p:style>
+          <a:lnRef idx="1">
+            <a:schemeClr val="accent1"/>
+          </a:lnRef>
+          <a:fillRef idx="3">
+            <a:schemeClr val="accent1"/>
+          </a:fillRef>
+          <a:effectRef idx="2">
+            <a:schemeClr val="accent1"/>
+          </a:effectRef>
+          <a:fontRef idx="minor">
+            <a:schemeClr val="lt1"/>
+          </a:fontRef>
+        </p:style>
+        <p:txBody>
+          <a:bodyPr rtlCol="0" anchor="ctr"/>
+          <a:lstStyle/>
+          <a:p>
+            <a:pPr algn="ctr"/>
+            <a:endParaRPr lang="en-US" dirty="0"/>
+          </a:p>
+        </p:txBody>
+      </p:sp>
+      <p:sp>
+        <p:nvSpPr>
+          <p:cNvPr id="217" name="Rectangle 109">
+            <a:extLst>
+              <a:ext uri="{FF2B5EF4-FFF2-40B4-BE49-F238E27FC236}">
+                <a16:creationId xmlns:a16="http://schemas.microsoft.com/office/drawing/2014/main" id="{15B3D0BF-9126-9439-4878-6909A479EF64}"/>
+              </a:ext>
+            </a:extLst>
+          </p:cNvPr>
+          <p:cNvSpPr/>
+          <p:nvPr/>
+        </p:nvSpPr>
+        <p:spPr>
+          <a:xfrm rot="10800000">
+            <a:off x="-1" y="6379413"/>
+            <a:ext cx="13584483" cy="1938991"/>
+          </a:xfrm>
+          <a:prstGeom prst="rect">
+            <a:avLst/>
+          </a:prstGeom>
+          <a:solidFill>
+            <a:schemeClr val="bg1"/>
+          </a:solidFill>
+          <a:ln>
+            <a:noFill/>
+          </a:ln>
+          <a:effectLst/>
+        </p:spPr>
+        <p:style>
+          <a:lnRef idx="1">
+            <a:schemeClr val="accent1"/>
+          </a:lnRef>
+          <a:fillRef idx="3">
+            <a:schemeClr val="accent1"/>
+          </a:fillRef>
+          <a:effectRef idx="2">
+            <a:schemeClr val="accent1"/>
+          </a:effectRef>
+          <a:fontRef idx="minor">
+            <a:schemeClr val="lt1"/>
+          </a:fontRef>
+        </p:style>
+        <p:txBody>
+          <a:bodyPr rtlCol="0" anchor="ctr"/>
+          <a:lstStyle/>
+          <a:p>
+            <a:pPr algn="ctr"/>
+            <a:endParaRPr lang="LID4096" dirty="0"/>
+          </a:p>
+        </p:txBody>
+      </p:sp>
+      <p:sp>
+        <p:nvSpPr>
+          <p:cNvPr id="28" name="Rectangle 109">
+            <a:extLst>
+              <a:ext uri="{FF2B5EF4-FFF2-40B4-BE49-F238E27FC236}">
+                <a16:creationId xmlns:a16="http://schemas.microsoft.com/office/drawing/2014/main" id="{F75F3411-E984-9023-34BE-DC5586DF2D2E}"/>
+              </a:ext>
+            </a:extLst>
+          </p:cNvPr>
+          <p:cNvSpPr/>
+          <p:nvPr/>
+        </p:nvSpPr>
+        <p:spPr>
+          <a:xfrm rot="10800000">
+            <a:off x="9136914" y="-5399"/>
+            <a:ext cx="4447569" cy="6858001"/>
+          </a:xfrm>
+          <a:prstGeom prst="rect">
+            <a:avLst/>
+          </a:prstGeom>
+          <a:solidFill>
+            <a:schemeClr val="bg1"/>
+          </a:solidFill>
+          <a:ln>
+            <a:noFill/>
+          </a:ln>
+          <a:effectLst/>
+        </p:spPr>
+        <p:style>
+          <a:lnRef idx="1">
+            <a:schemeClr val="accent1"/>
+          </a:lnRef>
+          <a:fillRef idx="3">
+            <a:schemeClr val="accent1"/>
+          </a:fillRef>
+          <a:effectRef idx="2">
+            <a:schemeClr val="accent1"/>
+          </a:effectRef>
+          <a:fontRef idx="minor">
+            <a:schemeClr val="lt1"/>
+          </a:fontRef>
+        </p:style>
+        <p:txBody>
+          <a:bodyPr rtlCol="0" anchor="ctr"/>
+          <a:lstStyle/>
+          <a:p>
+            <a:pPr algn="ctr"/>
+            <a:endParaRPr lang="LID4096"/>
+          </a:p>
+        </p:txBody>
+      </p:sp>
+      <p:sp>
+        <p:nvSpPr>
+          <p:cNvPr id="5" name="TextBox 4">
+            <a:extLst>
+              <a:ext uri="{FF2B5EF4-FFF2-40B4-BE49-F238E27FC236}">
+                <a16:creationId xmlns:a16="http://schemas.microsoft.com/office/drawing/2014/main" id="{7FE0B084-ACB1-9EC3-2828-BA0C8C7F0C3D}"/>
+              </a:ext>
+            </a:extLst>
+          </p:cNvPr>
+          <p:cNvSpPr txBox="1"/>
+          <p:nvPr/>
+        </p:nvSpPr>
+        <p:spPr>
+          <a:xfrm>
+            <a:off x="7619295" y="366528"/>
+            <a:ext cx="5486400" cy="4154984"/>
+          </a:xfrm>
+          <a:prstGeom prst="rect">
+            <a:avLst/>
+          </a:prstGeom>
+          <a:noFill/>
+          <a:ln w="19050">
+            <a:solidFill>
+              <a:schemeClr val="bg1">
+                <a:lumMod val="75000"/>
+              </a:schemeClr>
+            </a:solidFill>
+          </a:ln>
+        </p:spPr>
+        <p:txBody>
+          <a:bodyPr wrap="square" rtlCol="0">
+            <a:spAutoFit/>
+          </a:bodyPr>
+          <a:lstStyle>
+            <a:defPPr>
+              <a:defRPr lang="de-DE"/>
+            </a:defPPr>
+            <a:lvl1pPr>
+              <a:defRPr sz="1200" b="1"/>
+            </a:lvl1pPr>
+          </a:lstStyle>
+          <a:p>
+            <a:r>
+              <a:rPr lang="en-US" dirty="0"/>
+              <a:t>2-1 Medication List document</a:t>
+            </a:r>
+          </a:p>
+          <a:p>
+            <a:r>
+              <a:rPr lang="en-US" sz="1200" b="0" dirty="0"/>
+              <a:t>Identifier (document)</a:t>
+            </a:r>
+            <a:r>
+              <a:rPr lang="en-US" b="0" dirty="0"/>
+              <a:t> =</a:t>
+            </a:r>
+            <a:r>
+              <a:rPr lang="en-US" b="0" dirty="0">
+                <a:solidFill>
+                  <a:schemeClr val="accent4"/>
+                </a:solidFill>
+              </a:rPr>
+              <a:t> </a:t>
+            </a:r>
+            <a:r>
+              <a:rPr lang="de-CH" b="0" dirty="0">
+                <a:solidFill>
+                  <a:schemeClr val="accent4"/>
+                </a:solidFill>
+              </a:rPr>
+              <a:t>17931678-20b4-11e6-b67b-9e71128cae77</a:t>
+            </a:r>
+          </a:p>
+          <a:p>
+            <a:endParaRPr lang="de-CH" b="0" dirty="0">
+              <a:solidFill>
+                <a:srgbClr val="C00000"/>
+              </a:solidFill>
+            </a:endParaRPr>
+          </a:p>
+          <a:p>
+            <a:endParaRPr lang="de-CH" b="0" dirty="0">
+              <a:solidFill>
+                <a:srgbClr val="C00000"/>
+              </a:solidFill>
+            </a:endParaRPr>
+          </a:p>
+          <a:p>
+            <a:endParaRPr lang="de-CH" b="0" dirty="0">
+              <a:solidFill>
+                <a:srgbClr val="C00000"/>
+              </a:solidFill>
+            </a:endParaRPr>
+          </a:p>
+          <a:p>
+            <a:endParaRPr lang="de-CH" b="0" dirty="0">
+              <a:solidFill>
+                <a:srgbClr val="C00000"/>
+              </a:solidFill>
+            </a:endParaRPr>
+          </a:p>
+          <a:p>
+            <a:endParaRPr lang="de-CH" b="0" dirty="0">
+              <a:solidFill>
+                <a:srgbClr val="7030A0"/>
+              </a:solidFill>
+            </a:endParaRPr>
+          </a:p>
+          <a:p>
+            <a:endParaRPr lang="de-CH" b="0" dirty="0">
+              <a:solidFill>
+                <a:srgbClr val="7030A0"/>
+              </a:solidFill>
+            </a:endParaRPr>
+          </a:p>
+          <a:p>
+            <a:endParaRPr lang="de-CH" b="0" dirty="0">
+              <a:solidFill>
+                <a:srgbClr val="7030A0"/>
+              </a:solidFill>
+            </a:endParaRPr>
+          </a:p>
+          <a:p>
+            <a:endParaRPr lang="de-CH" b="0" dirty="0">
+              <a:solidFill>
+                <a:srgbClr val="7030A0"/>
+              </a:solidFill>
+            </a:endParaRPr>
+          </a:p>
+          <a:p>
+            <a:endParaRPr lang="de-CH" b="0" dirty="0">
+              <a:solidFill>
+                <a:srgbClr val="7030A0"/>
+              </a:solidFill>
+            </a:endParaRPr>
+          </a:p>
+          <a:p>
+            <a:endParaRPr lang="de-CH" b="0" dirty="0">
+              <a:solidFill>
+                <a:srgbClr val="7030A0"/>
+              </a:solidFill>
+            </a:endParaRPr>
+          </a:p>
+          <a:p>
+            <a:endParaRPr lang="de-CH" b="0" dirty="0">
+              <a:solidFill>
+                <a:srgbClr val="7030A0"/>
+              </a:solidFill>
+            </a:endParaRPr>
+          </a:p>
+          <a:p>
+            <a:endParaRPr lang="de-CH" b="0" dirty="0">
+              <a:solidFill>
+                <a:srgbClr val="7030A0"/>
+              </a:solidFill>
+            </a:endParaRPr>
+          </a:p>
+          <a:p>
+            <a:endParaRPr lang="en-US" b="0" dirty="0">
+              <a:solidFill>
+                <a:srgbClr val="7030A0"/>
+              </a:solidFill>
+            </a:endParaRPr>
+          </a:p>
+          <a:p>
+            <a:endParaRPr lang="en-US" dirty="0">
+              <a:solidFill>
+                <a:srgbClr val="7030A0"/>
+              </a:solidFill>
+            </a:endParaRPr>
+          </a:p>
+          <a:p>
+            <a:endParaRPr lang="en-US" dirty="0"/>
+          </a:p>
+          <a:p>
+            <a:endParaRPr lang="en-US" dirty="0"/>
+          </a:p>
+          <a:p>
+            <a:endParaRPr lang="en-US" dirty="0"/>
+          </a:p>
+          <a:p>
+            <a:endParaRPr lang="en-US" dirty="0"/>
+          </a:p>
+          <a:p>
+            <a:endParaRPr lang="en-US" dirty="0"/>
+          </a:p>
+          <a:p>
+            <a:endParaRPr lang="en-US" dirty="0"/>
+          </a:p>
+        </p:txBody>
+      </p:sp>
+      <p:sp>
+        <p:nvSpPr>
+          <p:cNvPr id="6" name="TextBox 5">
+            <a:extLst>
+              <a:ext uri="{FF2B5EF4-FFF2-40B4-BE49-F238E27FC236}">
+                <a16:creationId xmlns:a16="http://schemas.microsoft.com/office/drawing/2014/main" id="{1CD6EEFB-BB5E-7542-3A26-121E3613DC03}"/>
+              </a:ext>
+            </a:extLst>
+          </p:cNvPr>
+          <p:cNvSpPr txBox="1"/>
+          <p:nvPr/>
+        </p:nvSpPr>
+        <p:spPr>
+          <a:xfrm>
+            <a:off x="1130926" y="373484"/>
+            <a:ext cx="5486400" cy="1200329"/>
+          </a:xfrm>
+          <a:prstGeom prst="rect">
+            <a:avLst/>
+          </a:prstGeom>
+          <a:noFill/>
+          <a:ln w="19050">
+            <a:solidFill>
+              <a:schemeClr val="bg1">
+                <a:lumMod val="75000"/>
+              </a:schemeClr>
+            </a:solidFill>
+          </a:ln>
+        </p:spPr>
+        <p:txBody>
+          <a:bodyPr wrap="square" rtlCol="0">
+            <a:spAutoFit/>
+          </a:bodyPr>
+          <a:lstStyle/>
+          <a:p>
+            <a:r>
+              <a:rPr lang="en-US" sz="1200" b="1" dirty="0"/>
+              <a:t>1-1 Medication Treatment Plan document</a:t>
+            </a:r>
+          </a:p>
+          <a:p>
+            <a:r>
+              <a:rPr lang="en-US" sz="1200" dirty="0"/>
+              <a:t>Identifier (document) = </a:t>
+            </a:r>
+            <a:r>
+              <a:rPr lang="de-CH" sz="1200" dirty="0">
+                <a:solidFill>
+                  <a:srgbClr val="0070C0"/>
+                </a:solidFill>
+              </a:rPr>
+              <a:t>c9f758a1-296c-4710-84d4-e181db8c7478</a:t>
+            </a:r>
+          </a:p>
+          <a:p>
+            <a:endParaRPr lang="en-US" sz="1200" dirty="0">
+              <a:solidFill>
+                <a:srgbClr val="0070C0"/>
+              </a:solidFill>
+            </a:endParaRPr>
+          </a:p>
+          <a:p>
+            <a:endParaRPr lang="en-US" sz="1200" b="1" dirty="0"/>
+          </a:p>
+          <a:p>
+            <a:endParaRPr lang="en-US" sz="1200" b="1" dirty="0"/>
+          </a:p>
+          <a:p>
+            <a:endParaRPr lang="en-US" sz="1200" b="1" dirty="0"/>
+          </a:p>
+        </p:txBody>
+      </p:sp>
+      <p:sp>
+        <p:nvSpPr>
+          <p:cNvPr id="7" name="TextBox 6">
+            <a:extLst>
+              <a:ext uri="{FF2B5EF4-FFF2-40B4-BE49-F238E27FC236}">
+                <a16:creationId xmlns:a16="http://schemas.microsoft.com/office/drawing/2014/main" id="{7B38C6D9-4A8B-4364-4F78-5BE4664BFF98}"/>
+              </a:ext>
+            </a:extLst>
+          </p:cNvPr>
+          <p:cNvSpPr txBox="1"/>
+          <p:nvPr/>
+        </p:nvSpPr>
+        <p:spPr>
+          <a:xfrm>
+            <a:off x="1300829" y="890859"/>
+            <a:ext cx="5166360" cy="457200"/>
+          </a:xfrm>
+          <a:prstGeom prst="rect">
+            <a:avLst/>
+          </a:prstGeom>
+          <a:solidFill>
+            <a:schemeClr val="accent6">
+              <a:lumMod val="20000"/>
+              <a:lumOff val="80000"/>
+            </a:schemeClr>
+          </a:solidFill>
+          <a:ln w="19050">
+            <a:solidFill>
+              <a:srgbClr val="00B0F0"/>
+            </a:solidFill>
+          </a:ln>
+        </p:spPr>
+        <p:txBody>
+          <a:bodyPr wrap="square" rtlCol="0">
+            <a:spAutoFit/>
+          </a:bodyPr>
+          <a:lstStyle>
+            <a:defPPr>
+              <a:defRPr lang="de-DE"/>
+            </a:defPPr>
+            <a:lvl1pPr>
+              <a:defRPr sz="1200" b="0"/>
+            </a:lvl1pPr>
+          </a:lstStyle>
+          <a:p>
+            <a:r>
+              <a:rPr lang="de-CH" b="1" dirty="0"/>
+              <a:t>MedicationStatement</a:t>
+            </a:r>
+          </a:p>
+          <a:p>
+            <a:r>
+              <a:rPr lang="de-CH" dirty="0"/>
+              <a:t>identifier (resource) = </a:t>
+            </a:r>
+            <a:r>
+              <a:rPr lang="de-CH" dirty="0">
+                <a:solidFill>
+                  <a:srgbClr val="00B0F0"/>
+                </a:solidFill>
+              </a:rPr>
+              <a:t>c9f758a1-296c-4710-84d4-e181db8c7478</a:t>
+            </a:r>
+          </a:p>
+        </p:txBody>
+      </p:sp>
+      <p:sp>
+        <p:nvSpPr>
+          <p:cNvPr id="8" name="TextBox 7">
+            <a:extLst>
+              <a:ext uri="{FF2B5EF4-FFF2-40B4-BE49-F238E27FC236}">
+                <a16:creationId xmlns:a16="http://schemas.microsoft.com/office/drawing/2014/main" id="{3F713F7B-F738-4B7E-997A-7BE7973E9363}"/>
+              </a:ext>
+            </a:extLst>
+          </p:cNvPr>
+          <p:cNvSpPr txBox="1"/>
+          <p:nvPr/>
+        </p:nvSpPr>
+        <p:spPr>
+          <a:xfrm>
+            <a:off x="7619295" y="4845756"/>
+            <a:ext cx="5486400" cy="1938992"/>
+          </a:xfrm>
+          <a:prstGeom prst="rect">
+            <a:avLst/>
+          </a:prstGeom>
+          <a:noFill/>
+          <a:ln w="19050">
+            <a:solidFill>
+              <a:schemeClr val="bg1">
+                <a:lumMod val="75000"/>
+              </a:schemeClr>
+            </a:solidFill>
+          </a:ln>
+        </p:spPr>
+        <p:txBody>
+          <a:bodyPr wrap="square" rtlCol="0">
+            <a:spAutoFit/>
+          </a:bodyPr>
+          <a:lstStyle>
+            <a:defPPr>
+              <a:defRPr lang="de-DE"/>
+            </a:defPPr>
+            <a:lvl1pPr>
+              <a:defRPr sz="1200" b="1"/>
+            </a:lvl1pPr>
+          </a:lstStyle>
+          <a:p>
+            <a:r>
+              <a:rPr lang="en-US" dirty="0"/>
+              <a:t>2-2 Pharmaceutical Advice document</a:t>
+            </a:r>
+          </a:p>
+          <a:p>
+            <a:r>
+              <a:rPr lang="en-US" sz="1200" b="0" dirty="0"/>
+              <a:t>Identifier (document) </a:t>
+            </a:r>
+            <a:r>
+              <a:rPr lang="de-CH" b="0" dirty="0"/>
+              <a:t>= </a:t>
+            </a:r>
+            <a:r>
+              <a:rPr lang="de-CH" b="0" dirty="0">
+                <a:solidFill>
+                  <a:srgbClr val="C00000"/>
+                </a:solidFill>
+              </a:rPr>
+              <a:t>488bd23a-20c6-11e6-b67b-9e71128cae77</a:t>
+            </a:r>
+          </a:p>
+          <a:p>
+            <a:endParaRPr lang="de-CH" b="0" dirty="0">
+              <a:solidFill>
+                <a:srgbClr val="7030A0"/>
+              </a:solidFill>
+            </a:endParaRPr>
+          </a:p>
+          <a:p>
+            <a:endParaRPr lang="de-CH" dirty="0">
+              <a:solidFill>
+                <a:srgbClr val="7030A0"/>
+              </a:solidFill>
+            </a:endParaRPr>
+          </a:p>
+          <a:p>
+            <a:endParaRPr lang="de-CH" b="0" dirty="0"/>
+          </a:p>
+          <a:p>
+            <a:endParaRPr lang="de-CH" b="0" dirty="0"/>
+          </a:p>
+          <a:p>
+            <a:endParaRPr lang="de-CH" b="0" dirty="0"/>
+          </a:p>
+          <a:p>
+            <a:endParaRPr lang="de-CH" b="0" dirty="0"/>
+          </a:p>
+          <a:p>
+            <a:endParaRPr lang="en-US" dirty="0"/>
+          </a:p>
+          <a:p>
+            <a:endParaRPr lang="en-US" dirty="0"/>
+          </a:p>
+        </p:txBody>
+      </p:sp>
+      <p:sp>
+        <p:nvSpPr>
+          <p:cNvPr id="9" name="TextBox 8">
+            <a:extLst>
+              <a:ext uri="{FF2B5EF4-FFF2-40B4-BE49-F238E27FC236}">
+                <a16:creationId xmlns:a16="http://schemas.microsoft.com/office/drawing/2014/main" id="{09318130-4A16-2404-2436-7E62B09CA2A4}"/>
+              </a:ext>
+            </a:extLst>
+          </p:cNvPr>
+          <p:cNvSpPr txBox="1"/>
+          <p:nvPr/>
+        </p:nvSpPr>
+        <p:spPr>
+          <a:xfrm>
+            <a:off x="7776752" y="5399986"/>
+            <a:ext cx="5166360" cy="1188720"/>
+          </a:xfrm>
+          <a:prstGeom prst="rect">
+            <a:avLst/>
+          </a:prstGeom>
+          <a:solidFill>
+            <a:schemeClr val="accent6">
+              <a:lumMod val="20000"/>
+              <a:lumOff val="80000"/>
+            </a:schemeClr>
+          </a:solidFill>
+          <a:ln w="19050">
+            <a:solidFill>
+              <a:schemeClr val="accent6"/>
+            </a:solidFill>
+          </a:ln>
+        </p:spPr>
+        <p:txBody>
+          <a:bodyPr wrap="square" rtlCol="0">
+            <a:spAutoFit/>
+          </a:bodyPr>
+          <a:lstStyle>
+            <a:defPPr>
+              <a:defRPr lang="de-DE"/>
+            </a:defPPr>
+            <a:lvl1pPr>
+              <a:defRPr sz="1200" b="1"/>
+            </a:lvl1pPr>
+          </a:lstStyle>
+          <a:p>
+            <a:r>
+              <a:rPr lang="en-US" dirty="0"/>
+              <a:t>Observation</a:t>
+            </a:r>
+          </a:p>
+          <a:p>
+            <a:r>
+              <a:rPr lang="de-CH" b="0" dirty="0"/>
+              <a:t>identifier (resource) </a:t>
+            </a:r>
+            <a:r>
+              <a:rPr lang="en-US" b="0" dirty="0"/>
+              <a:t>= </a:t>
+            </a:r>
+            <a:r>
+              <a:rPr lang="de-CH" b="0" dirty="0">
+                <a:solidFill>
+                  <a:schemeClr val="accent6"/>
+                </a:solidFill>
+              </a:rPr>
+              <a:t>8ed02d0a-2971-11e6-b67b-9e71128cae77</a:t>
+            </a:r>
+          </a:p>
+          <a:p>
+            <a:endParaRPr lang="de-CH" b="0" dirty="0"/>
+          </a:p>
+          <a:p>
+            <a:r>
+              <a:rPr lang="de-CH" b="0" dirty="0"/>
+              <a:t>extension:treatmentPlan (</a:t>
+            </a:r>
+            <a:r>
+              <a:rPr lang="de-CH" b="0" noProof="1"/>
+              <a:t>ch-emed-ext-treatmentplan</a:t>
+            </a:r>
+            <a:r>
+              <a:rPr lang="de-CH" b="0" dirty="0"/>
+              <a:t>)</a:t>
+            </a:r>
+          </a:p>
+          <a:p>
+            <a:pPr marL="171450" indent="-171450">
+              <a:buFontTx/>
+              <a:buChar char="-"/>
+            </a:pPr>
+            <a:r>
+              <a:rPr lang="de-CH" b="0" dirty="0"/>
+              <a:t>extension:id = </a:t>
+            </a:r>
+            <a:r>
+              <a:rPr lang="de-CH" b="0" dirty="0">
+                <a:solidFill>
+                  <a:srgbClr val="00B0F0"/>
+                </a:solidFill>
+              </a:rPr>
+              <a:t>c9f758a1-296c-4710-84d4-e181db8c7478</a:t>
+            </a:r>
+          </a:p>
+          <a:p>
+            <a:pPr marL="171450" indent="-171450">
+              <a:buFontTx/>
+              <a:buChar char="-"/>
+            </a:pPr>
+            <a:r>
+              <a:rPr lang="de-CH" b="0" dirty="0"/>
+              <a:t>extension:externalDocumentId = </a:t>
+            </a:r>
+            <a:r>
+              <a:rPr lang="de-CH" b="0" dirty="0">
+                <a:solidFill>
+                  <a:srgbClr val="0070C0"/>
+                </a:solidFill>
+              </a:rPr>
+              <a:t>c9f758a1-296c-4710-84d4-e181db8c7478</a:t>
+            </a:r>
+          </a:p>
+        </p:txBody>
+      </p:sp>
+      <p:sp>
+        <p:nvSpPr>
+          <p:cNvPr id="10" name="TextBox 9">
+            <a:extLst>
+              <a:ext uri="{FF2B5EF4-FFF2-40B4-BE49-F238E27FC236}">
+                <a16:creationId xmlns:a16="http://schemas.microsoft.com/office/drawing/2014/main" id="{C6F69B83-311E-D3E9-2A9E-4344877DCEB5}"/>
+              </a:ext>
+            </a:extLst>
+          </p:cNvPr>
+          <p:cNvSpPr txBox="1"/>
+          <p:nvPr/>
+        </p:nvSpPr>
+        <p:spPr>
+          <a:xfrm>
+            <a:off x="1130925" y="1837772"/>
+            <a:ext cx="5486400" cy="1938992"/>
+          </a:xfrm>
+          <a:prstGeom prst="rect">
+            <a:avLst/>
+          </a:prstGeom>
+          <a:noFill/>
+          <a:ln w="19050">
+            <a:solidFill>
+              <a:schemeClr val="bg1">
+                <a:lumMod val="75000"/>
+              </a:schemeClr>
+            </a:solidFill>
+          </a:ln>
+        </p:spPr>
+        <p:txBody>
+          <a:bodyPr wrap="square" rtlCol="0">
+            <a:spAutoFit/>
+          </a:bodyPr>
+          <a:lstStyle>
+            <a:defPPr>
+              <a:defRPr lang="de-DE"/>
+            </a:defPPr>
+            <a:lvl1pPr>
+              <a:defRPr sz="1200" b="1"/>
+            </a:lvl1pPr>
+          </a:lstStyle>
+          <a:p>
+            <a:r>
+              <a:rPr lang="en-US" dirty="0"/>
+              <a:t>1-2 Medication Dispense document</a:t>
+            </a:r>
+          </a:p>
+          <a:p>
+            <a:r>
+              <a:rPr lang="en-US" sz="1200" b="0" dirty="0"/>
+              <a:t>Identifier (document) </a:t>
+            </a:r>
+            <a:r>
+              <a:rPr lang="en-US" b="0" dirty="0"/>
+              <a:t>= </a:t>
+            </a:r>
+            <a:r>
+              <a:rPr lang="de-CH" b="0" dirty="0">
+                <a:solidFill>
+                  <a:srgbClr val="00B050"/>
+                </a:solidFill>
+              </a:rPr>
+              <a:t>488bd23a-20c6-11e6-b67b-9e71128cae77</a:t>
+            </a:r>
+          </a:p>
+          <a:p>
+            <a:endParaRPr lang="de-CH" dirty="0"/>
+          </a:p>
+          <a:p>
+            <a:endParaRPr lang="de-CH" dirty="0"/>
+          </a:p>
+          <a:p>
+            <a:endParaRPr lang="de-CH" dirty="0"/>
+          </a:p>
+          <a:p>
+            <a:endParaRPr lang="de-CH" dirty="0"/>
+          </a:p>
+          <a:p>
+            <a:endParaRPr lang="de-CH" dirty="0"/>
+          </a:p>
+          <a:p>
+            <a:endParaRPr lang="de-CH" dirty="0"/>
+          </a:p>
+          <a:p>
+            <a:endParaRPr lang="de-CH" dirty="0"/>
+          </a:p>
+          <a:p>
+            <a:endParaRPr lang="en-US" dirty="0"/>
+          </a:p>
+        </p:txBody>
+      </p:sp>
+      <p:sp>
+        <p:nvSpPr>
+          <p:cNvPr id="11" name="TextBox 10">
+            <a:extLst>
+              <a:ext uri="{FF2B5EF4-FFF2-40B4-BE49-F238E27FC236}">
+                <a16:creationId xmlns:a16="http://schemas.microsoft.com/office/drawing/2014/main" id="{241A85E2-8E97-A9A0-7F8D-5715C58D64FE}"/>
+              </a:ext>
+            </a:extLst>
+          </p:cNvPr>
+          <p:cNvSpPr txBox="1"/>
+          <p:nvPr/>
+        </p:nvSpPr>
+        <p:spPr>
+          <a:xfrm>
+            <a:off x="1300829" y="2378062"/>
+            <a:ext cx="5166360" cy="1188720"/>
+          </a:xfrm>
+          <a:prstGeom prst="rect">
+            <a:avLst/>
+          </a:prstGeom>
+          <a:solidFill>
+            <a:schemeClr val="accent6">
+              <a:lumMod val="20000"/>
+              <a:lumOff val="80000"/>
+            </a:schemeClr>
+          </a:solidFill>
+          <a:ln w="19050">
+            <a:solidFill>
+              <a:srgbClr val="92D050"/>
+            </a:solidFill>
+          </a:ln>
+        </p:spPr>
+        <p:txBody>
+          <a:bodyPr wrap="square" rtlCol="0">
+            <a:spAutoFit/>
+          </a:bodyPr>
+          <a:lstStyle>
+            <a:defPPr>
+              <a:defRPr lang="de-DE"/>
+            </a:defPPr>
+            <a:lvl1pPr>
+              <a:defRPr sz="1200" b="0"/>
+            </a:lvl1pPr>
+          </a:lstStyle>
+          <a:p>
+            <a:r>
+              <a:rPr lang="de-CH" b="1" dirty="0"/>
+              <a:t>MedicationDispense</a:t>
+            </a:r>
+          </a:p>
+          <a:p>
+            <a:r>
+              <a:rPr lang="de-CH" dirty="0"/>
+              <a:t>identifier (resource) = </a:t>
+            </a:r>
+            <a:r>
+              <a:rPr lang="de-CH" dirty="0">
+                <a:solidFill>
+                  <a:srgbClr val="92D050"/>
+                </a:solidFill>
+              </a:rPr>
+              <a:t>488bd23a-20c6-11e6-b67b-9e71128cae77</a:t>
+            </a:r>
+          </a:p>
+          <a:p>
+            <a:endParaRPr lang="de-CH" dirty="0"/>
+          </a:p>
+          <a:p>
+            <a:r>
+              <a:rPr lang="de-CH" dirty="0"/>
+              <a:t>extension:</a:t>
+            </a:r>
+            <a:r>
+              <a:rPr lang="en-US" noProof="1"/>
+              <a:t>treatmentPlan</a:t>
+            </a:r>
+            <a:r>
+              <a:rPr lang="de-CH" dirty="0"/>
+              <a:t> (</a:t>
+            </a:r>
+            <a:r>
+              <a:rPr lang="en-US" dirty="0"/>
+              <a:t>ch-emed-ext-treatmentplan</a:t>
+            </a:r>
+            <a:r>
+              <a:rPr lang="de-CH" dirty="0"/>
+              <a:t>)</a:t>
+            </a:r>
+          </a:p>
+          <a:p>
+            <a:pPr marL="171450" indent="-171450">
+              <a:buFontTx/>
+              <a:buChar char="-"/>
+            </a:pPr>
+            <a:r>
+              <a:rPr lang="de-CH" dirty="0"/>
+              <a:t>extension:id = </a:t>
+            </a:r>
+            <a:r>
+              <a:rPr lang="de-CH" dirty="0">
+                <a:solidFill>
+                  <a:srgbClr val="00B0F0"/>
+                </a:solidFill>
+              </a:rPr>
+              <a:t>c9f758a1-296c-4710-84d4-e181db8c7478</a:t>
+            </a:r>
+          </a:p>
+          <a:p>
+            <a:pPr marL="171450" indent="-171450">
+              <a:buFontTx/>
+              <a:buChar char="-"/>
+            </a:pPr>
+            <a:r>
+              <a:rPr lang="de-CH" dirty="0"/>
+              <a:t>extension:externalDocumentId = </a:t>
+            </a:r>
+            <a:r>
+              <a:rPr lang="de-CH" dirty="0">
+                <a:solidFill>
+                  <a:srgbClr val="0070C0"/>
+                </a:solidFill>
+              </a:rPr>
+              <a:t>c9f758a1-296c-4710-84d4-e181db8c7478</a:t>
+            </a:r>
+          </a:p>
+        </p:txBody>
+      </p:sp>
+      <p:sp>
+        <p:nvSpPr>
+          <p:cNvPr id="31" name="TextBox 30">
+            <a:extLst>
+              <a:ext uri="{FF2B5EF4-FFF2-40B4-BE49-F238E27FC236}">
+                <a16:creationId xmlns:a16="http://schemas.microsoft.com/office/drawing/2014/main" id="{CB97DD85-0743-4012-DEDF-5F656063C06D}"/>
+              </a:ext>
+            </a:extLst>
+          </p:cNvPr>
+          <p:cNvSpPr txBox="1"/>
+          <p:nvPr/>
+        </p:nvSpPr>
+        <p:spPr>
+          <a:xfrm>
+            <a:off x="7779315" y="884685"/>
+            <a:ext cx="5166360" cy="1188720"/>
+          </a:xfrm>
+          <a:prstGeom prst="rect">
+            <a:avLst/>
+          </a:prstGeom>
+          <a:solidFill>
+            <a:schemeClr val="accent6">
+              <a:lumMod val="20000"/>
+              <a:lumOff val="80000"/>
+            </a:schemeClr>
+          </a:solidFill>
+          <a:ln w="19050">
+            <a:solidFill>
+              <a:srgbClr val="00B0F0"/>
+            </a:solidFill>
+          </a:ln>
+        </p:spPr>
+        <p:txBody>
+          <a:bodyPr wrap="square" rtlCol="0">
+            <a:spAutoFit/>
+          </a:bodyPr>
+          <a:lstStyle>
+            <a:defPPr>
+              <a:defRPr lang="de-DE"/>
+            </a:defPPr>
+            <a:lvl1pPr>
+              <a:defRPr sz="1200" b="0"/>
+            </a:lvl1pPr>
+          </a:lstStyle>
+          <a:p>
+            <a:r>
+              <a:rPr lang="en-US" b="1" dirty="0"/>
+              <a:t>MedicationStatement</a:t>
+            </a:r>
+          </a:p>
+          <a:p>
+            <a:r>
+              <a:rPr lang="de-CH" dirty="0"/>
+              <a:t>identifier (resource) = </a:t>
+            </a:r>
+            <a:r>
+              <a:rPr lang="de-CH" dirty="0">
+                <a:solidFill>
+                  <a:srgbClr val="00B0F0"/>
+                </a:solidFill>
+              </a:rPr>
+              <a:t>c9f758a1-296c-4710-84d4-e181db8c7478</a:t>
+            </a:r>
+          </a:p>
+          <a:p>
+            <a:endParaRPr lang="de-CH" dirty="0">
+              <a:solidFill>
+                <a:srgbClr val="00B0F0"/>
+              </a:solidFill>
+            </a:endParaRPr>
+          </a:p>
+          <a:p>
+            <a:r>
+              <a:rPr lang="de-CH" dirty="0"/>
+              <a:t>extension:parentDocument (</a:t>
+            </a:r>
+            <a:r>
+              <a:rPr lang="en-US" dirty="0"/>
+              <a:t>ch-emed-ext-treatmentplan</a:t>
+            </a:r>
+            <a:r>
+              <a:rPr lang="de-CH" dirty="0"/>
+              <a:t>)</a:t>
+            </a:r>
+          </a:p>
+          <a:p>
+            <a:pPr marL="171450" indent="-171450">
+              <a:buFontTx/>
+              <a:buChar char="-"/>
+            </a:pPr>
+            <a:r>
+              <a:rPr lang="de-CH" dirty="0"/>
+              <a:t>extension:id = </a:t>
+            </a:r>
+            <a:r>
+              <a:rPr lang="de-CH" dirty="0">
+                <a:solidFill>
+                  <a:srgbClr val="00B0F0"/>
+                </a:solidFill>
+              </a:rPr>
+              <a:t>c9f758a1-296c-4710-84d4-e181db8c7478</a:t>
+            </a:r>
+            <a:endParaRPr lang="de-CH" dirty="0"/>
+          </a:p>
+          <a:p>
+            <a:pPr marL="171450" indent="-171450">
+              <a:buFontTx/>
+              <a:buChar char="-"/>
+            </a:pPr>
+            <a:r>
+              <a:rPr lang="de-CH" dirty="0"/>
+              <a:t>extension:</a:t>
+            </a:r>
+            <a:r>
+              <a:rPr lang="de-CH" b="0" dirty="0"/>
+              <a:t>externalDocumentId</a:t>
+            </a:r>
+            <a:r>
+              <a:rPr lang="de-CH" dirty="0"/>
+              <a:t> = </a:t>
+            </a:r>
+            <a:r>
+              <a:rPr lang="de-CH" dirty="0">
+                <a:solidFill>
+                  <a:srgbClr val="0070C0"/>
+                </a:solidFill>
+              </a:rPr>
+              <a:t>c9f758a1-296c-4710-84d4-e181db8c7478</a:t>
+            </a:r>
+            <a:endParaRPr lang="LID4096" dirty="0">
+              <a:solidFill>
+                <a:srgbClr val="0070C0"/>
+              </a:solidFill>
+            </a:endParaRPr>
+          </a:p>
+        </p:txBody>
+      </p:sp>
+      <p:sp>
+        <p:nvSpPr>
+          <p:cNvPr id="39" name="TextBox 38">
+            <a:extLst>
+              <a:ext uri="{FF2B5EF4-FFF2-40B4-BE49-F238E27FC236}">
+                <a16:creationId xmlns:a16="http://schemas.microsoft.com/office/drawing/2014/main" id="{7DE76E44-238D-94DB-E87E-C4746CEC4394}"/>
+              </a:ext>
+            </a:extLst>
+          </p:cNvPr>
+          <p:cNvSpPr txBox="1"/>
+          <p:nvPr/>
+        </p:nvSpPr>
+        <p:spPr>
+          <a:xfrm>
+            <a:off x="7776752" y="2349006"/>
+            <a:ext cx="5166360" cy="1938992"/>
+          </a:xfrm>
+          <a:prstGeom prst="rect">
+            <a:avLst/>
+          </a:prstGeom>
+          <a:solidFill>
+            <a:schemeClr val="accent6">
+              <a:lumMod val="20000"/>
+              <a:lumOff val="80000"/>
+            </a:schemeClr>
+          </a:solidFill>
+          <a:ln w="19050">
+            <a:solidFill>
+              <a:srgbClr val="92D050"/>
+            </a:solidFill>
+          </a:ln>
+        </p:spPr>
+        <p:txBody>
+          <a:bodyPr wrap="square" rtlCol="0">
+            <a:spAutoFit/>
+          </a:bodyPr>
+          <a:lstStyle>
+            <a:defPPr>
+              <a:defRPr lang="de-DE"/>
+            </a:defPPr>
+            <a:lvl1pPr>
+              <a:defRPr sz="1200" b="0"/>
+            </a:lvl1pPr>
+          </a:lstStyle>
+          <a:p>
+            <a:r>
+              <a:rPr lang="de-CH" b="1" dirty="0"/>
+              <a:t>MedicationDispense</a:t>
+            </a:r>
+          </a:p>
+          <a:p>
+            <a:r>
+              <a:rPr lang="de-CH" dirty="0"/>
+              <a:t>identifier (resource) =</a:t>
+            </a:r>
+            <a:r>
+              <a:rPr lang="de-CH" dirty="0">
+                <a:solidFill>
+                  <a:srgbClr val="92D050"/>
+                </a:solidFill>
+              </a:rPr>
+              <a:t> 488bd23a-20c6-11e6-b67b-9e71128cae77</a:t>
+            </a:r>
+          </a:p>
+          <a:p>
+            <a:endParaRPr lang="de-CH" dirty="0"/>
+          </a:p>
+          <a:p>
+            <a:r>
+              <a:rPr lang="de-CH" dirty="0"/>
+              <a:t>extension:treatmentPlan (ch-emed-ext-treatmentplan)</a:t>
+            </a:r>
+          </a:p>
+          <a:p>
+            <a:pPr marL="171450" indent="-171450">
+              <a:buFontTx/>
+              <a:buChar char="-"/>
+            </a:pPr>
+            <a:r>
+              <a:rPr lang="de-CH" dirty="0"/>
+              <a:t>extension:id = </a:t>
+            </a:r>
+            <a:r>
+              <a:rPr lang="de-CH" dirty="0">
+                <a:solidFill>
+                  <a:srgbClr val="00B0F0"/>
+                </a:solidFill>
+              </a:rPr>
+              <a:t>c9f758a1-296c-4710-84d4-e181db8c7478</a:t>
+            </a:r>
+          </a:p>
+          <a:p>
+            <a:pPr marL="171450" indent="-171450">
+              <a:buFontTx/>
+              <a:buChar char="-"/>
+            </a:pPr>
+            <a:r>
+              <a:rPr lang="de-CH" dirty="0"/>
+              <a:t>extension:externalDocumentId = </a:t>
+            </a:r>
+            <a:r>
+              <a:rPr lang="de-CH" dirty="0">
+                <a:solidFill>
+                  <a:srgbClr val="0070C0"/>
+                </a:solidFill>
+              </a:rPr>
+              <a:t>c9f758a1-296c-4710-84d4-e181db8c7478</a:t>
+            </a:r>
+          </a:p>
+          <a:p>
+            <a:pPr marL="171450" indent="-171450">
+              <a:buFontTx/>
+              <a:buChar char="-"/>
+            </a:pPr>
+            <a:endParaRPr lang="de-CH" dirty="0">
+              <a:solidFill>
+                <a:srgbClr val="0070C0"/>
+              </a:solidFill>
+            </a:endParaRPr>
+          </a:p>
+          <a:p>
+            <a:r>
+              <a:rPr lang="de-CH" dirty="0"/>
+              <a:t>extension:parentDocument (ch-emed-ext-dispense)</a:t>
+            </a:r>
+          </a:p>
+          <a:p>
+            <a:pPr marL="171450" indent="-171450">
+              <a:buFontTx/>
+              <a:buChar char="-"/>
+            </a:pPr>
+            <a:r>
+              <a:rPr lang="de-CH" dirty="0"/>
+              <a:t>extension:id = </a:t>
+            </a:r>
+            <a:r>
+              <a:rPr lang="de-CH" dirty="0">
+                <a:solidFill>
+                  <a:srgbClr val="92D050"/>
+                </a:solidFill>
+              </a:rPr>
+              <a:t>488bd23a-20c6-11e6-b67b-9e71128cae77</a:t>
+            </a:r>
+            <a:endParaRPr lang="de-CH" dirty="0"/>
+          </a:p>
+          <a:p>
+            <a:pPr marL="171450" indent="-171450">
+              <a:buFontTx/>
+              <a:buChar char="-"/>
+            </a:pPr>
+            <a:r>
+              <a:rPr lang="de-CH" dirty="0"/>
+              <a:t>extension:</a:t>
+            </a:r>
+            <a:r>
+              <a:rPr lang="de-CH" b="0" dirty="0"/>
+              <a:t>externalDocumentId</a:t>
+            </a:r>
+            <a:r>
+              <a:rPr lang="de-CH" dirty="0"/>
+              <a:t> = </a:t>
+            </a:r>
+            <a:r>
+              <a:rPr lang="de-CH" b="0" dirty="0">
+                <a:solidFill>
+                  <a:srgbClr val="00B050"/>
+                </a:solidFill>
+              </a:rPr>
+              <a:t>488bd23a-20c6-11e6-b67b-9e71128cae77</a:t>
+            </a:r>
+          </a:p>
+        </p:txBody>
+      </p:sp>
+      <p:sp>
+        <p:nvSpPr>
+          <p:cNvPr id="32" name="TextBox 7">
+            <a:extLst>
+              <a:ext uri="{FF2B5EF4-FFF2-40B4-BE49-F238E27FC236}">
+                <a16:creationId xmlns:a16="http://schemas.microsoft.com/office/drawing/2014/main" id="{55EBD200-F5BD-C01D-EA4E-C81271A0020F}"/>
+              </a:ext>
+            </a:extLst>
+          </p:cNvPr>
+          <p:cNvSpPr txBox="1"/>
+          <p:nvPr/>
+        </p:nvSpPr>
+        <p:spPr>
+          <a:xfrm>
+            <a:off x="1130925" y="14212653"/>
+            <a:ext cx="5486400" cy="2123658"/>
+          </a:xfrm>
+          <a:prstGeom prst="rect">
+            <a:avLst/>
+          </a:prstGeom>
+          <a:noFill/>
+          <a:ln w="19050">
+            <a:solidFill>
+              <a:schemeClr val="bg1">
+                <a:lumMod val="85000"/>
+              </a:schemeClr>
+            </a:solidFill>
+          </a:ln>
+        </p:spPr>
+        <p:txBody>
+          <a:bodyPr wrap="square" rtlCol="0">
+            <a:spAutoFit/>
+          </a:bodyPr>
+          <a:lstStyle>
+            <a:defPPr>
+              <a:defRPr lang="de-DE"/>
+            </a:defPPr>
+            <a:lvl1pPr>
+              <a:defRPr sz="1200" b="1"/>
+            </a:lvl1pPr>
+          </a:lstStyle>
+          <a:p>
+            <a:r>
+              <a:rPr lang="en-US" dirty="0"/>
+              <a:t>2-6 Medication Prescription document</a:t>
+            </a:r>
+          </a:p>
+          <a:p>
+            <a:r>
+              <a:rPr lang="en-US" b="0" dirty="0"/>
+              <a:t>i</a:t>
+            </a:r>
+            <a:r>
+              <a:rPr lang="en-US" sz="1200" b="0" dirty="0"/>
+              <a:t>dentifier (document) </a:t>
+            </a:r>
+            <a:r>
+              <a:rPr lang="en-US" b="0" dirty="0"/>
+              <a:t>= </a:t>
+            </a:r>
+            <a:r>
+              <a:rPr lang="de-CH" b="0" dirty="0">
+                <a:solidFill>
+                  <a:srgbClr val="C00000"/>
+                </a:solidFill>
+              </a:rPr>
+              <a:t>d41d72ba-2100-11e6-b67b-9e71128cae77</a:t>
+            </a:r>
+          </a:p>
+          <a:p>
+            <a:endParaRPr lang="de-CH" b="0" dirty="0">
+              <a:solidFill>
+                <a:srgbClr val="9A1916"/>
+              </a:solidFill>
+            </a:endParaRPr>
+          </a:p>
+          <a:p>
+            <a:endParaRPr lang="de-CH" b="0" dirty="0">
+              <a:solidFill>
+                <a:srgbClr val="9A1916"/>
+              </a:solidFill>
+            </a:endParaRPr>
+          </a:p>
+          <a:p>
+            <a:endParaRPr lang="de-CH" b="0" dirty="0">
+              <a:solidFill>
+                <a:srgbClr val="9A1916"/>
+              </a:solidFill>
+            </a:endParaRPr>
+          </a:p>
+          <a:p>
+            <a:endParaRPr lang="de-CH" b="0" dirty="0"/>
+          </a:p>
+          <a:p>
+            <a:endParaRPr lang="de-CH" b="0" dirty="0"/>
+          </a:p>
+          <a:p>
+            <a:endParaRPr lang="de-CH" b="0" dirty="0"/>
+          </a:p>
+          <a:p>
+            <a:endParaRPr lang="de-CH" b="0" dirty="0"/>
+          </a:p>
+          <a:p>
+            <a:endParaRPr lang="en-US" dirty="0"/>
+          </a:p>
+          <a:p>
+            <a:endParaRPr lang="en-US" dirty="0"/>
+          </a:p>
+        </p:txBody>
+      </p:sp>
+      <p:sp>
+        <p:nvSpPr>
+          <p:cNvPr id="33" name="TextBox 8">
+            <a:extLst>
+              <a:ext uri="{FF2B5EF4-FFF2-40B4-BE49-F238E27FC236}">
+                <a16:creationId xmlns:a16="http://schemas.microsoft.com/office/drawing/2014/main" id="{4B4EF78D-8F65-7055-0426-E0CAB498EEA4}"/>
+              </a:ext>
+            </a:extLst>
+          </p:cNvPr>
+          <p:cNvSpPr txBox="1"/>
+          <p:nvPr/>
+        </p:nvSpPr>
+        <p:spPr>
+          <a:xfrm>
+            <a:off x="1290945" y="14866580"/>
+            <a:ext cx="5166360" cy="1188720"/>
+          </a:xfrm>
+          <a:prstGeom prst="rect">
+            <a:avLst/>
+          </a:prstGeom>
+          <a:solidFill>
+            <a:schemeClr val="accent1">
+              <a:lumMod val="20000"/>
+              <a:lumOff val="80000"/>
+            </a:schemeClr>
+          </a:solidFill>
+          <a:ln w="19050">
+            <a:solidFill>
+              <a:schemeClr val="accent5">
+                <a:lumMod val="60000"/>
+                <a:lumOff val="40000"/>
+              </a:schemeClr>
+            </a:solidFill>
+          </a:ln>
+        </p:spPr>
+        <p:txBody>
+          <a:bodyPr wrap="square" rtlCol="0">
+            <a:spAutoFit/>
+          </a:bodyPr>
+          <a:lstStyle>
+            <a:defPPr>
+              <a:defRPr lang="de-DE"/>
+            </a:defPPr>
+            <a:lvl1pPr>
+              <a:defRPr sz="1200" b="0"/>
+            </a:lvl1pPr>
+          </a:lstStyle>
+          <a:p>
+            <a:r>
+              <a:rPr lang="en-US" b="1" dirty="0"/>
+              <a:t>MedicationRequest</a:t>
+            </a:r>
+          </a:p>
+          <a:p>
+            <a:r>
+              <a:rPr lang="de-CH" dirty="0"/>
+              <a:t>identifier (resource) </a:t>
+            </a:r>
+            <a:r>
+              <a:rPr lang="en-US" dirty="0"/>
+              <a:t>= </a:t>
+            </a:r>
+            <a:r>
+              <a:rPr lang="de-CH" dirty="0">
+                <a:solidFill>
+                  <a:schemeClr val="accent6"/>
+                </a:solidFill>
+              </a:rPr>
+              <a:t>d41d72ba-2100-11e6-b67b-9e71128cae77</a:t>
+            </a:r>
+          </a:p>
+          <a:p>
+            <a:endParaRPr lang="de-CH" dirty="0"/>
+          </a:p>
+          <a:p>
+            <a:r>
+              <a:rPr lang="de-CH" dirty="0"/>
+              <a:t>extension:treatmentPlan (</a:t>
+            </a:r>
+            <a:r>
+              <a:rPr lang="en-US" dirty="0"/>
+              <a:t>ch-emed-ext-treatmentplan</a:t>
+            </a:r>
+            <a:r>
+              <a:rPr lang="de-CH" dirty="0"/>
+              <a:t>)</a:t>
+            </a:r>
+          </a:p>
+          <a:p>
+            <a:pPr marL="171450" indent="-171450">
+              <a:buFontTx/>
+              <a:buChar char="-"/>
+            </a:pPr>
+            <a:r>
+              <a:rPr lang="de-CH" dirty="0"/>
+              <a:t>extension:</a:t>
+            </a:r>
+            <a:r>
+              <a:rPr lang="de-CH" dirty="0">
+                <a:solidFill>
+                  <a:srgbClr val="000000"/>
+                </a:solidFill>
+              </a:rPr>
+              <a:t>id = </a:t>
+            </a:r>
+            <a:r>
+              <a:rPr lang="de-CH" dirty="0">
+                <a:solidFill>
+                  <a:srgbClr val="00B0F0"/>
+                </a:solidFill>
+              </a:rPr>
+              <a:t>5712fffe-20c6-11e6-b67b-9e71128cae77</a:t>
+            </a:r>
+          </a:p>
+          <a:p>
+            <a:pPr marL="171450" indent="-171450">
+              <a:buFontTx/>
+              <a:buChar char="-"/>
+            </a:pPr>
+            <a:r>
+              <a:rPr lang="de-CH" dirty="0"/>
+              <a:t>extension:externalDocumentId </a:t>
+            </a:r>
+            <a:r>
+              <a:rPr lang="de-CH" dirty="0">
+                <a:solidFill>
+                  <a:srgbClr val="0070C0"/>
+                </a:solidFill>
+              </a:rPr>
+              <a:t>= 5712fffe-20c6-11e6-b67b-9e71128cae77</a:t>
+            </a:r>
+          </a:p>
+        </p:txBody>
+      </p:sp>
+      <p:sp>
+        <p:nvSpPr>
+          <p:cNvPr id="34" name="TextBox 7">
+            <a:extLst>
+              <a:ext uri="{FF2B5EF4-FFF2-40B4-BE49-F238E27FC236}">
+                <a16:creationId xmlns:a16="http://schemas.microsoft.com/office/drawing/2014/main" id="{FA845ACD-BB97-E109-29CD-AD2425F90197}"/>
+              </a:ext>
+            </a:extLst>
+          </p:cNvPr>
+          <p:cNvSpPr txBox="1"/>
+          <p:nvPr/>
+        </p:nvSpPr>
+        <p:spPr>
+          <a:xfrm>
+            <a:off x="7619295" y="10282131"/>
+            <a:ext cx="5486400" cy="3970318"/>
+          </a:xfrm>
+          <a:prstGeom prst="rect">
+            <a:avLst/>
+          </a:prstGeom>
+          <a:noFill/>
+          <a:ln w="19050">
+            <a:solidFill>
+              <a:schemeClr val="bg1">
+                <a:lumMod val="85000"/>
+              </a:schemeClr>
+            </a:solidFill>
+          </a:ln>
+        </p:spPr>
+        <p:txBody>
+          <a:bodyPr wrap="square" rtlCol="0">
+            <a:spAutoFit/>
+          </a:bodyPr>
+          <a:lstStyle>
+            <a:defPPr>
+              <a:defRPr lang="de-DE"/>
+            </a:defPPr>
+            <a:lvl1pPr>
+              <a:defRPr sz="1200" b="1"/>
+            </a:lvl1pPr>
+          </a:lstStyle>
+          <a:p>
+            <a:r>
+              <a:rPr lang="en-US" dirty="0"/>
+              <a:t>2-7 Medication Card document</a:t>
+            </a:r>
+          </a:p>
+          <a:p>
+            <a:r>
+              <a:rPr lang="en-US" b="0" dirty="0"/>
+              <a:t>i</a:t>
+            </a:r>
+            <a:r>
+              <a:rPr lang="en-US" sz="1200" b="0" dirty="0"/>
+              <a:t>dentifier (document)</a:t>
+            </a:r>
+            <a:r>
+              <a:rPr lang="en-US" b="0" dirty="0"/>
+              <a:t> = </a:t>
+            </a:r>
+            <a:r>
+              <a:rPr lang="de-CH" b="0" dirty="0">
+                <a:solidFill>
+                  <a:schemeClr val="accent4"/>
+                </a:solidFill>
+              </a:rPr>
+              <a:t>6b6ed376-a7da-44cb-92d1-e75ce1ae73b0</a:t>
+            </a:r>
+          </a:p>
+          <a:p>
+            <a:endParaRPr lang="de-CH" b="0" dirty="0">
+              <a:solidFill>
+                <a:srgbClr val="CC6600"/>
+              </a:solidFill>
+            </a:endParaRPr>
+          </a:p>
+          <a:p>
+            <a:endParaRPr lang="de-CH" b="0" dirty="0">
+              <a:solidFill>
+                <a:srgbClr val="CC6600"/>
+              </a:solidFill>
+            </a:endParaRPr>
+          </a:p>
+          <a:p>
+            <a:endParaRPr lang="de-CH" b="0" dirty="0"/>
+          </a:p>
+          <a:p>
+            <a:endParaRPr lang="de-CH" b="0" dirty="0"/>
+          </a:p>
+          <a:p>
+            <a:endParaRPr lang="de-CH" b="0" dirty="0"/>
+          </a:p>
+          <a:p>
+            <a:endParaRPr lang="de-CH" b="0" dirty="0"/>
+          </a:p>
+          <a:p>
+            <a:endParaRPr lang="de-CH" b="0" dirty="0"/>
+          </a:p>
+          <a:p>
+            <a:endParaRPr lang="de-CH" b="0" dirty="0"/>
+          </a:p>
+          <a:p>
+            <a:endParaRPr lang="de-CH" b="0" dirty="0"/>
+          </a:p>
+          <a:p>
+            <a:endParaRPr lang="de-CH" b="0" dirty="0"/>
+          </a:p>
+          <a:p>
+            <a:endParaRPr lang="de-CH" b="0" dirty="0"/>
+          </a:p>
+          <a:p>
+            <a:endParaRPr lang="de-CH" b="0" dirty="0"/>
+          </a:p>
+          <a:p>
+            <a:endParaRPr lang="de-CH" b="0" dirty="0"/>
+          </a:p>
+          <a:p>
+            <a:endParaRPr lang="de-CH" b="0" dirty="0"/>
+          </a:p>
+          <a:p>
+            <a:endParaRPr lang="de-CH" b="0" dirty="0"/>
+          </a:p>
+          <a:p>
+            <a:endParaRPr lang="de-CH" b="0" dirty="0"/>
+          </a:p>
+          <a:p>
+            <a:endParaRPr lang="de-CH" b="0" dirty="0"/>
+          </a:p>
+          <a:p>
+            <a:endParaRPr lang="en-US" b="0" dirty="0"/>
+          </a:p>
+          <a:p>
+            <a:endParaRPr lang="en-US" dirty="0"/>
+          </a:p>
+        </p:txBody>
+      </p:sp>
+      <p:sp>
+        <p:nvSpPr>
+          <p:cNvPr id="35" name="TextBox 8">
+            <a:extLst>
+              <a:ext uri="{FF2B5EF4-FFF2-40B4-BE49-F238E27FC236}">
+                <a16:creationId xmlns:a16="http://schemas.microsoft.com/office/drawing/2014/main" id="{301BC25A-EB47-CCD6-F6AC-1ED6A4B18248}"/>
+              </a:ext>
+            </a:extLst>
+          </p:cNvPr>
+          <p:cNvSpPr txBox="1"/>
+          <p:nvPr/>
+        </p:nvSpPr>
+        <p:spPr>
+          <a:xfrm>
+            <a:off x="7785279" y="10986462"/>
+            <a:ext cx="5166360" cy="1384995"/>
+          </a:xfrm>
+          <a:prstGeom prst="rect">
+            <a:avLst/>
+          </a:prstGeom>
+          <a:solidFill>
+            <a:schemeClr val="accent4">
+              <a:lumMod val="20000"/>
+              <a:lumOff val="80000"/>
+            </a:schemeClr>
+          </a:solidFill>
+          <a:ln w="19050">
+            <a:solidFill>
+              <a:srgbClr val="00B0F0"/>
+            </a:solidFill>
+          </a:ln>
+        </p:spPr>
+        <p:txBody>
+          <a:bodyPr wrap="square" rtlCol="0">
+            <a:spAutoFit/>
+          </a:bodyPr>
+          <a:lstStyle>
+            <a:defPPr>
+              <a:defRPr lang="de-DE"/>
+            </a:defPPr>
+            <a:lvl1pPr>
+              <a:defRPr sz="1200" b="1"/>
+            </a:lvl1pPr>
+          </a:lstStyle>
+          <a:p>
+            <a:r>
+              <a:rPr lang="en-US" dirty="0"/>
+              <a:t>Medication</a:t>
+            </a:r>
+            <a:r>
+              <a:rPr lang="de-CH" dirty="0"/>
+              <a:t>Statement</a:t>
+            </a:r>
+          </a:p>
+          <a:p>
+            <a:r>
+              <a:rPr lang="de-CH" b="0" dirty="0"/>
+              <a:t>identifier (resource) = </a:t>
+            </a:r>
+            <a:r>
+              <a:rPr lang="de-CH" b="0" dirty="0">
+                <a:solidFill>
+                  <a:schemeClr val="accent2">
+                    <a:lumMod val="60000"/>
+                    <a:lumOff val="40000"/>
+                  </a:schemeClr>
+                </a:solidFill>
+              </a:rPr>
+              <a:t>d0f885ca-afa6-4e7e-905d-f7698f9607aa</a:t>
+            </a:r>
+          </a:p>
+          <a:p>
+            <a:endParaRPr lang="de-CH" b="0" dirty="0"/>
+          </a:p>
+          <a:p>
+            <a:r>
+              <a:rPr lang="de-CH" b="0" dirty="0"/>
+              <a:t>extension:treatmentPlan (ch-emed-ext-treatmentplan)</a:t>
+            </a:r>
+          </a:p>
+          <a:p>
+            <a:pPr marL="171450" indent="-171450">
+              <a:buFontTx/>
+              <a:buChar char="-"/>
+            </a:pPr>
+            <a:r>
+              <a:rPr lang="de-CH" b="0" dirty="0"/>
+              <a:t>extension:id = </a:t>
+            </a:r>
+            <a:r>
+              <a:rPr lang="de-CH" b="0" dirty="0">
+                <a:solidFill>
+                  <a:srgbClr val="00B0F0"/>
+                </a:solidFill>
+              </a:rPr>
+              <a:t>17931678-20b4-11e6-b67b-9e71128cca77</a:t>
+            </a:r>
+          </a:p>
+          <a:p>
+            <a:pPr marL="171450" indent="-171450">
+              <a:buFontTx/>
+              <a:buChar char="-"/>
+            </a:pPr>
+            <a:r>
+              <a:rPr lang="de-CH" b="0" dirty="0"/>
+              <a:t>extension:externalDocumentId = </a:t>
+            </a:r>
+            <a:r>
+              <a:rPr lang="de-CH" b="0" dirty="0">
+                <a:solidFill>
+                  <a:srgbClr val="0070C0"/>
+                </a:solidFill>
+              </a:rPr>
+              <a:t>17931678-20b4-11e6-b67b-9e71128cca77</a:t>
+            </a:r>
+          </a:p>
+          <a:p>
+            <a:pPr marL="171450" indent="-171450">
+              <a:buFontTx/>
+              <a:buChar char="-"/>
+            </a:pPr>
+            <a:endParaRPr lang="de-CH" b="0" dirty="0">
+              <a:solidFill>
+                <a:srgbClr val="7030A0"/>
+              </a:solidFill>
+            </a:endParaRPr>
+          </a:p>
+        </p:txBody>
+      </p:sp>
+      <p:sp>
+        <p:nvSpPr>
+          <p:cNvPr id="12" name="TextBox 5">
+            <a:extLst>
+              <a:ext uri="{FF2B5EF4-FFF2-40B4-BE49-F238E27FC236}">
+                <a16:creationId xmlns:a16="http://schemas.microsoft.com/office/drawing/2014/main" id="{879BD315-04A1-1C9E-0387-A300712C3E23}"/>
+              </a:ext>
+            </a:extLst>
+          </p:cNvPr>
+          <p:cNvSpPr txBox="1"/>
+          <p:nvPr/>
+        </p:nvSpPr>
+        <p:spPr>
+          <a:xfrm>
+            <a:off x="1130925" y="8879245"/>
+            <a:ext cx="5486400" cy="1384995"/>
+          </a:xfrm>
+          <a:prstGeom prst="rect">
+            <a:avLst/>
+          </a:prstGeom>
+          <a:noFill/>
+          <a:ln w="19050">
+            <a:solidFill>
+              <a:schemeClr val="bg1">
+                <a:lumMod val="85000"/>
+              </a:schemeClr>
+            </a:solidFill>
+          </a:ln>
+        </p:spPr>
+        <p:txBody>
+          <a:bodyPr wrap="square" rtlCol="0">
+            <a:spAutoFit/>
+          </a:bodyPr>
+          <a:lstStyle/>
+          <a:p>
+            <a:r>
+              <a:rPr lang="en-US" sz="1200" b="1" dirty="0"/>
+              <a:t>2-3 Medication Treatment Plan document</a:t>
+            </a:r>
+          </a:p>
+          <a:p>
+            <a:r>
+              <a:rPr lang="en-US" sz="1200" dirty="0"/>
+              <a:t>identifier (document) = </a:t>
+            </a:r>
+            <a:r>
+              <a:rPr lang="de-CH" sz="1200" dirty="0">
+                <a:solidFill>
+                  <a:srgbClr val="0070C0"/>
+                </a:solidFill>
+              </a:rPr>
+              <a:t>17931678-20b4-11e6-b67b-9e71128cca77</a:t>
+            </a:r>
+          </a:p>
+          <a:p>
+            <a:endParaRPr lang="en-US" sz="1200" dirty="0">
+              <a:solidFill>
+                <a:srgbClr val="C00000"/>
+              </a:solidFill>
+            </a:endParaRPr>
+          </a:p>
+          <a:p>
+            <a:endParaRPr lang="en-US" sz="1200" dirty="0">
+              <a:solidFill>
+                <a:srgbClr val="C00000"/>
+              </a:solidFill>
+            </a:endParaRPr>
+          </a:p>
+          <a:p>
+            <a:endParaRPr lang="en-US" sz="1200" b="1" dirty="0"/>
+          </a:p>
+          <a:p>
+            <a:endParaRPr lang="en-US" sz="1200" b="1" dirty="0"/>
+          </a:p>
+          <a:p>
+            <a:endParaRPr lang="en-US" sz="1200" b="1" dirty="0"/>
+          </a:p>
+        </p:txBody>
+      </p:sp>
+      <p:sp>
+        <p:nvSpPr>
+          <p:cNvPr id="13" name="TextBox 6">
+            <a:extLst>
+              <a:ext uri="{FF2B5EF4-FFF2-40B4-BE49-F238E27FC236}">
+                <a16:creationId xmlns:a16="http://schemas.microsoft.com/office/drawing/2014/main" id="{4DBB7227-D59A-D4BA-2409-6BC26BD0156C}"/>
+              </a:ext>
+            </a:extLst>
+          </p:cNvPr>
+          <p:cNvSpPr txBox="1"/>
+          <p:nvPr/>
+        </p:nvSpPr>
+        <p:spPr>
+          <a:xfrm>
+            <a:off x="1300829" y="9419060"/>
+            <a:ext cx="5166360" cy="457200"/>
+          </a:xfrm>
+          <a:prstGeom prst="rect">
+            <a:avLst/>
+          </a:prstGeom>
+          <a:solidFill>
+            <a:schemeClr val="accent4">
+              <a:lumMod val="20000"/>
+              <a:lumOff val="80000"/>
+            </a:schemeClr>
+          </a:solidFill>
+          <a:ln w="19050">
+            <a:solidFill>
+              <a:srgbClr val="00B0F0"/>
+            </a:solidFill>
+          </a:ln>
+        </p:spPr>
+        <p:txBody>
+          <a:bodyPr wrap="square" rtlCol="0">
+            <a:spAutoFit/>
+          </a:bodyPr>
+          <a:lstStyle>
+            <a:defPPr>
+              <a:defRPr lang="de-DE"/>
+            </a:defPPr>
+            <a:lvl1pPr>
+              <a:defRPr sz="1200" b="1"/>
+            </a:lvl1pPr>
+          </a:lstStyle>
+          <a:p>
+            <a:r>
+              <a:rPr lang="de-CH" dirty="0"/>
+              <a:t>MedicationStatement</a:t>
+            </a:r>
+          </a:p>
+          <a:p>
+            <a:r>
+              <a:rPr lang="de-CH" b="0" dirty="0"/>
+              <a:t>identifier (resource) = </a:t>
+            </a:r>
+            <a:r>
+              <a:rPr lang="de-CH" b="0" dirty="0">
+                <a:solidFill>
+                  <a:srgbClr val="00B0F0"/>
+                </a:solidFill>
+              </a:rPr>
+              <a:t>17931678-20b4-11e6-b67b-9e71128cca77</a:t>
+            </a:r>
+          </a:p>
+        </p:txBody>
+      </p:sp>
+      <p:sp>
+        <p:nvSpPr>
+          <p:cNvPr id="14" name="TextBox 9">
+            <a:extLst>
+              <a:ext uri="{FF2B5EF4-FFF2-40B4-BE49-F238E27FC236}">
+                <a16:creationId xmlns:a16="http://schemas.microsoft.com/office/drawing/2014/main" id="{F6C1B186-314F-C611-C769-2966B95500E4}"/>
+              </a:ext>
+            </a:extLst>
+          </p:cNvPr>
+          <p:cNvSpPr txBox="1"/>
+          <p:nvPr/>
+        </p:nvSpPr>
+        <p:spPr>
+          <a:xfrm>
+            <a:off x="1130925" y="10349143"/>
+            <a:ext cx="5486400" cy="2123658"/>
+          </a:xfrm>
+          <a:prstGeom prst="rect">
+            <a:avLst/>
+          </a:prstGeom>
+          <a:noFill/>
+          <a:ln w="19050">
+            <a:solidFill>
+              <a:schemeClr val="bg1">
+                <a:lumMod val="85000"/>
+              </a:schemeClr>
+            </a:solidFill>
+          </a:ln>
+        </p:spPr>
+        <p:txBody>
+          <a:bodyPr wrap="square" rtlCol="0">
+            <a:spAutoFit/>
+          </a:bodyPr>
+          <a:lstStyle>
+            <a:defPPr>
+              <a:defRPr lang="de-DE"/>
+            </a:defPPr>
+            <a:lvl1pPr>
+              <a:defRPr sz="1200" b="1"/>
+            </a:lvl1pPr>
+          </a:lstStyle>
+          <a:p>
+            <a:r>
+              <a:rPr lang="en-US" dirty="0"/>
+              <a:t>2-4  Medication Dispense document</a:t>
+            </a:r>
+          </a:p>
+          <a:p>
+            <a:r>
+              <a:rPr lang="en-US" b="0" dirty="0"/>
+              <a:t>i</a:t>
+            </a:r>
+            <a:r>
+              <a:rPr lang="en-US" sz="1200" b="0" dirty="0"/>
+              <a:t>dentifier (document)</a:t>
+            </a:r>
+            <a:r>
+              <a:rPr lang="en-US" b="0" dirty="0"/>
+              <a:t> = </a:t>
+            </a:r>
+            <a:r>
+              <a:rPr lang="de-CH" b="0" dirty="0">
+                <a:solidFill>
+                  <a:srgbClr val="00B050"/>
+                </a:solidFill>
+              </a:rPr>
+              <a:t>d8143fea-4778-11e6-beb8-9e71128cae77</a:t>
+            </a:r>
+          </a:p>
+          <a:p>
+            <a:endParaRPr lang="de-CH" b="0" dirty="0">
+              <a:solidFill>
+                <a:srgbClr val="00B050"/>
+              </a:solidFill>
+            </a:endParaRPr>
+          </a:p>
+          <a:p>
+            <a:endParaRPr lang="de-CH" b="0" dirty="0">
+              <a:solidFill>
+                <a:srgbClr val="CC0099"/>
+              </a:solidFill>
+            </a:endParaRPr>
+          </a:p>
+          <a:p>
+            <a:endParaRPr lang="de-CH" b="0" dirty="0"/>
+          </a:p>
+          <a:p>
+            <a:endParaRPr lang="de-CH" b="0" dirty="0"/>
+          </a:p>
+          <a:p>
+            <a:endParaRPr lang="de-CH" b="0" dirty="0"/>
+          </a:p>
+          <a:p>
+            <a:endParaRPr lang="de-CH" b="0" dirty="0"/>
+          </a:p>
+          <a:p>
+            <a:endParaRPr lang="en-US" b="0" dirty="0"/>
+          </a:p>
+          <a:p>
+            <a:endParaRPr lang="en-US" dirty="0"/>
+          </a:p>
+          <a:p>
+            <a:endParaRPr lang="en-US" dirty="0"/>
+          </a:p>
+        </p:txBody>
+      </p:sp>
+      <p:sp>
+        <p:nvSpPr>
+          <p:cNvPr id="15" name="TextBox 10">
+            <a:extLst>
+              <a:ext uri="{FF2B5EF4-FFF2-40B4-BE49-F238E27FC236}">
+                <a16:creationId xmlns:a16="http://schemas.microsoft.com/office/drawing/2014/main" id="{E7CFF42B-2186-017D-91EF-AF8E257BCB0A}"/>
+              </a:ext>
+            </a:extLst>
+          </p:cNvPr>
+          <p:cNvSpPr txBox="1"/>
+          <p:nvPr/>
+        </p:nvSpPr>
+        <p:spPr>
+          <a:xfrm>
+            <a:off x="1290945" y="11000125"/>
+            <a:ext cx="5166360" cy="1188720"/>
+          </a:xfrm>
+          <a:prstGeom prst="rect">
+            <a:avLst/>
+          </a:prstGeom>
+          <a:solidFill>
+            <a:schemeClr val="accent4">
+              <a:lumMod val="20000"/>
+              <a:lumOff val="80000"/>
+            </a:schemeClr>
+          </a:solidFill>
+          <a:ln w="19050">
+            <a:solidFill>
+              <a:srgbClr val="92D050"/>
+            </a:solidFill>
+          </a:ln>
+        </p:spPr>
+        <p:txBody>
+          <a:bodyPr wrap="square" rtlCol="0">
+            <a:spAutoFit/>
+          </a:bodyPr>
+          <a:lstStyle>
+            <a:defPPr>
+              <a:defRPr lang="de-DE"/>
+            </a:defPPr>
+            <a:lvl1pPr>
+              <a:defRPr sz="1200" b="0"/>
+            </a:lvl1pPr>
+          </a:lstStyle>
+          <a:p>
+            <a:r>
+              <a:rPr lang="de-CH" b="1" dirty="0"/>
+              <a:t>MedicationDispense</a:t>
+            </a:r>
+          </a:p>
+          <a:p>
+            <a:r>
+              <a:rPr lang="de-CH" dirty="0"/>
+              <a:t>identifier (resource) = </a:t>
+            </a:r>
+            <a:r>
+              <a:rPr lang="de-CH" dirty="0">
+                <a:solidFill>
+                  <a:srgbClr val="92D050"/>
+                </a:solidFill>
+              </a:rPr>
+              <a:t>d8143fea-4778-11e6-beb8-9e71128cae77</a:t>
+            </a:r>
+          </a:p>
+          <a:p>
+            <a:endParaRPr lang="de-CH" dirty="0"/>
+          </a:p>
+          <a:p>
+            <a:r>
+              <a:rPr lang="de-CH" dirty="0"/>
+              <a:t>extension:treatmentPlan (</a:t>
+            </a:r>
+            <a:r>
+              <a:rPr lang="de-CH" b="0" dirty="0"/>
+              <a:t>ch-emed-ext-treatmentplan )</a:t>
+            </a:r>
+            <a:endParaRPr lang="de-CH" dirty="0"/>
+          </a:p>
+          <a:p>
+            <a:pPr marL="171450" indent="-171450">
+              <a:buFontTx/>
+              <a:buChar char="-"/>
+            </a:pPr>
+            <a:r>
+              <a:rPr lang="de-CH" dirty="0"/>
+              <a:t>extension:id = </a:t>
+            </a:r>
+            <a:r>
+              <a:rPr lang="de-CH" dirty="0">
+                <a:solidFill>
+                  <a:srgbClr val="00B0F0"/>
+                </a:solidFill>
+              </a:rPr>
+              <a:t>17931678-20b4-11e6-b67b-9e71128cca77</a:t>
+            </a:r>
+          </a:p>
+          <a:p>
+            <a:pPr marL="171450" indent="-171450">
+              <a:buFontTx/>
+              <a:buChar char="-"/>
+            </a:pPr>
+            <a:r>
+              <a:rPr lang="de-CH" dirty="0"/>
+              <a:t>extension:externalDocumentId </a:t>
+            </a:r>
+            <a:r>
+              <a:rPr lang="de-CH" dirty="0">
+                <a:solidFill>
+                  <a:srgbClr val="7030A0"/>
+                </a:solidFill>
+              </a:rPr>
+              <a:t>= </a:t>
+            </a:r>
+            <a:r>
+              <a:rPr lang="de-CH" dirty="0">
+                <a:solidFill>
+                  <a:srgbClr val="0070C0"/>
+                </a:solidFill>
+              </a:rPr>
+              <a:t>17931678-20b4-11e6-b67b-9e71128cca77</a:t>
+            </a:r>
+          </a:p>
+        </p:txBody>
+      </p:sp>
+      <p:sp>
+        <p:nvSpPr>
+          <p:cNvPr id="16" name="TextBox 9">
+            <a:extLst>
+              <a:ext uri="{FF2B5EF4-FFF2-40B4-BE49-F238E27FC236}">
+                <a16:creationId xmlns:a16="http://schemas.microsoft.com/office/drawing/2014/main" id="{3D6A90CD-33AD-B3BD-31F7-A1F8F7C5ADD3}"/>
+              </a:ext>
+            </a:extLst>
+          </p:cNvPr>
+          <p:cNvSpPr txBox="1"/>
+          <p:nvPr/>
+        </p:nvSpPr>
+        <p:spPr>
+          <a:xfrm>
+            <a:off x="1130925" y="12736312"/>
+            <a:ext cx="5486400" cy="1384995"/>
+          </a:xfrm>
+          <a:prstGeom prst="rect">
+            <a:avLst/>
+          </a:prstGeom>
+          <a:noFill/>
+          <a:ln w="19050">
+            <a:solidFill>
+              <a:schemeClr val="bg1">
+                <a:lumMod val="85000"/>
+              </a:schemeClr>
+            </a:solidFill>
+          </a:ln>
+        </p:spPr>
+        <p:txBody>
+          <a:bodyPr wrap="square" rtlCol="0">
+            <a:spAutoFit/>
+          </a:bodyPr>
+          <a:lstStyle>
+            <a:defPPr>
+              <a:defRPr lang="de-DE"/>
+            </a:defPPr>
+            <a:lvl1pPr>
+              <a:defRPr sz="1200" b="1"/>
+            </a:lvl1pPr>
+          </a:lstStyle>
+          <a:p>
+            <a:r>
+              <a:rPr lang="en-US" dirty="0"/>
+              <a:t>2-5 </a:t>
+            </a:r>
+            <a:r>
+              <a:rPr lang="de-CH" dirty="0"/>
+              <a:t>Medication Treatment Plan document</a:t>
+            </a:r>
+          </a:p>
+          <a:p>
+            <a:r>
+              <a:rPr lang="en-US" b="0" dirty="0"/>
+              <a:t>i</a:t>
+            </a:r>
+            <a:r>
+              <a:rPr lang="en-US" sz="1200" b="0" dirty="0"/>
+              <a:t>dentifier (document)</a:t>
+            </a:r>
+            <a:r>
+              <a:rPr lang="de-CH" b="0" dirty="0"/>
+              <a:t> = </a:t>
+            </a:r>
+            <a:r>
+              <a:rPr lang="de-CH" b="0" dirty="0">
+                <a:solidFill>
+                  <a:srgbClr val="0070C0"/>
+                </a:solidFill>
+              </a:rPr>
+              <a:t>5712fffe-20c6-11e6-b67b-9e71128cae77</a:t>
+            </a:r>
+          </a:p>
+          <a:p>
+            <a:endParaRPr lang="de-CH" b="0" dirty="0">
+              <a:solidFill>
+                <a:srgbClr val="C8BA02"/>
+              </a:solidFill>
+            </a:endParaRPr>
+          </a:p>
+          <a:p>
+            <a:endParaRPr lang="de-CH" b="0" dirty="0">
+              <a:solidFill>
+                <a:srgbClr val="C8BA02"/>
+              </a:solidFill>
+            </a:endParaRPr>
+          </a:p>
+          <a:p>
+            <a:endParaRPr lang="de-CH" b="0" dirty="0"/>
+          </a:p>
+          <a:p>
+            <a:endParaRPr lang="en-US" dirty="0"/>
+          </a:p>
+          <a:p>
+            <a:endParaRPr lang="en-US" dirty="0"/>
+          </a:p>
+        </p:txBody>
+      </p:sp>
+      <p:sp>
+        <p:nvSpPr>
+          <p:cNvPr id="17" name="TextBox 10">
+            <a:extLst>
+              <a:ext uri="{FF2B5EF4-FFF2-40B4-BE49-F238E27FC236}">
+                <a16:creationId xmlns:a16="http://schemas.microsoft.com/office/drawing/2014/main" id="{7DD7EE78-9A53-5013-2BF6-C5862D49B517}"/>
+              </a:ext>
+            </a:extLst>
+          </p:cNvPr>
+          <p:cNvSpPr txBox="1"/>
+          <p:nvPr/>
+        </p:nvSpPr>
+        <p:spPr>
+          <a:xfrm>
+            <a:off x="1290945" y="13258165"/>
+            <a:ext cx="5166360" cy="457200"/>
+          </a:xfrm>
+          <a:prstGeom prst="rect">
+            <a:avLst/>
+          </a:prstGeom>
+          <a:solidFill>
+            <a:schemeClr val="accent1">
+              <a:lumMod val="20000"/>
+              <a:lumOff val="80000"/>
+            </a:schemeClr>
+          </a:solidFill>
+          <a:ln w="19050">
+            <a:solidFill>
+              <a:srgbClr val="00B0F0"/>
+            </a:solidFill>
+          </a:ln>
+        </p:spPr>
+        <p:txBody>
+          <a:bodyPr wrap="square" rtlCol="0">
+            <a:spAutoFit/>
+          </a:bodyPr>
+          <a:lstStyle>
+            <a:defPPr>
+              <a:defRPr lang="de-DE"/>
+            </a:defPPr>
+            <a:lvl1pPr>
+              <a:defRPr sz="1200" b="1"/>
+            </a:lvl1pPr>
+          </a:lstStyle>
+          <a:p>
+            <a:r>
+              <a:rPr lang="de-CH" dirty="0"/>
+              <a:t>MedicationStatement</a:t>
+            </a:r>
+          </a:p>
+          <a:p>
+            <a:r>
+              <a:rPr lang="de-CH" b="0" dirty="0"/>
+              <a:t>identifier (resource) = </a:t>
+            </a:r>
+            <a:r>
+              <a:rPr lang="de-CH" b="0" dirty="0">
+                <a:solidFill>
+                  <a:srgbClr val="00B0F0"/>
+                </a:solidFill>
+              </a:rPr>
+              <a:t>5712fffe-20c6-11e6-b67b-9e71128cae77</a:t>
+            </a:r>
+            <a:endParaRPr lang="LID4096" b="0" dirty="0">
+              <a:solidFill>
+                <a:srgbClr val="00B0F0"/>
+              </a:solidFill>
+            </a:endParaRPr>
+          </a:p>
+        </p:txBody>
+      </p:sp>
+      <p:sp>
+        <p:nvSpPr>
+          <p:cNvPr id="51" name="TextBox 5">
+            <a:extLst>
+              <a:ext uri="{FF2B5EF4-FFF2-40B4-BE49-F238E27FC236}">
+                <a16:creationId xmlns:a16="http://schemas.microsoft.com/office/drawing/2014/main" id="{931FE6BD-2E04-05F3-46CD-E20F0FB0516B}"/>
+              </a:ext>
+            </a:extLst>
+          </p:cNvPr>
+          <p:cNvSpPr txBox="1"/>
+          <p:nvPr/>
+        </p:nvSpPr>
+        <p:spPr>
+          <a:xfrm rot="16200000">
+            <a:off x="-2661966" y="3448523"/>
+            <a:ext cx="6427077" cy="276999"/>
+          </a:xfrm>
+          <a:prstGeom prst="rect">
+            <a:avLst/>
+          </a:prstGeom>
+          <a:solidFill>
+            <a:schemeClr val="accent6">
+              <a:lumMod val="20000"/>
+              <a:lumOff val="80000"/>
+            </a:schemeClr>
+          </a:solidFill>
+          <a:ln w="19050">
+            <a:solidFill>
+              <a:schemeClr val="bg1">
+                <a:lumMod val="75000"/>
+              </a:schemeClr>
+            </a:solidFill>
+          </a:ln>
+        </p:spPr>
+        <p:txBody>
+          <a:bodyPr wrap="square" rtlCol="0">
+            <a:spAutoFit/>
+          </a:bodyPr>
+          <a:lstStyle/>
+          <a:p>
+            <a:pPr algn="ctr"/>
+            <a:r>
+              <a:rPr lang="en-US" sz="1200" b="1" dirty="0"/>
+              <a:t>Triatec</a:t>
+            </a:r>
+          </a:p>
+        </p:txBody>
+      </p:sp>
+      <p:sp>
+        <p:nvSpPr>
+          <p:cNvPr id="52" name="TextBox 5">
+            <a:extLst>
+              <a:ext uri="{FF2B5EF4-FFF2-40B4-BE49-F238E27FC236}">
+                <a16:creationId xmlns:a16="http://schemas.microsoft.com/office/drawing/2014/main" id="{D6AE6F55-FE9B-42CD-4861-76C204C58519}"/>
+              </a:ext>
+            </a:extLst>
+          </p:cNvPr>
+          <p:cNvSpPr txBox="1"/>
+          <p:nvPr/>
+        </p:nvSpPr>
+        <p:spPr>
+          <a:xfrm rot="16200000">
+            <a:off x="-1248164" y="10537524"/>
+            <a:ext cx="3593556" cy="276999"/>
+          </a:xfrm>
+          <a:prstGeom prst="rect">
+            <a:avLst/>
+          </a:prstGeom>
+          <a:solidFill>
+            <a:schemeClr val="accent4">
+              <a:lumMod val="20000"/>
+              <a:lumOff val="80000"/>
+            </a:schemeClr>
+          </a:solidFill>
+          <a:ln w="19050">
+            <a:solidFill>
+              <a:schemeClr val="bg1">
+                <a:lumMod val="75000"/>
+              </a:schemeClr>
+            </a:solidFill>
+          </a:ln>
+        </p:spPr>
+        <p:txBody>
+          <a:bodyPr wrap="square" rtlCol="0">
+            <a:spAutoFit/>
+          </a:bodyPr>
+          <a:lstStyle/>
+          <a:p>
+            <a:r>
+              <a:rPr lang="en-US" sz="1200" b="1" dirty="0"/>
+              <a:t>Beloc Zok</a:t>
+            </a:r>
+          </a:p>
+        </p:txBody>
+      </p:sp>
+      <p:sp>
+        <p:nvSpPr>
+          <p:cNvPr id="53" name="TextBox 5">
+            <a:extLst>
+              <a:ext uri="{FF2B5EF4-FFF2-40B4-BE49-F238E27FC236}">
+                <a16:creationId xmlns:a16="http://schemas.microsoft.com/office/drawing/2014/main" id="{F5991543-1D70-B304-9D94-3DFC5A6819FB}"/>
+              </a:ext>
+            </a:extLst>
+          </p:cNvPr>
+          <p:cNvSpPr txBox="1"/>
+          <p:nvPr/>
+        </p:nvSpPr>
+        <p:spPr>
+          <a:xfrm rot="16200000">
+            <a:off x="-1248165" y="14401032"/>
+            <a:ext cx="3593557" cy="276999"/>
+          </a:xfrm>
+          <a:prstGeom prst="rect">
+            <a:avLst/>
+          </a:prstGeom>
+          <a:solidFill>
+            <a:schemeClr val="accent1">
+              <a:lumMod val="20000"/>
+              <a:lumOff val="80000"/>
+            </a:schemeClr>
+          </a:solidFill>
+          <a:ln w="19050">
+            <a:solidFill>
+              <a:schemeClr val="bg1">
+                <a:lumMod val="75000"/>
+              </a:schemeClr>
+            </a:solidFill>
+          </a:ln>
+        </p:spPr>
+        <p:txBody>
+          <a:bodyPr wrap="square" rtlCol="0">
+            <a:spAutoFit/>
+          </a:bodyPr>
+          <a:lstStyle/>
+          <a:p>
+            <a:r>
+              <a:rPr lang="en-US" sz="1200" b="1" dirty="0"/>
+              <a:t>Norvasc</a:t>
+            </a:r>
+          </a:p>
+        </p:txBody>
+      </p:sp>
+      <p:sp>
+        <p:nvSpPr>
+          <p:cNvPr id="100" name="TextBox 8">
+            <a:extLst>
+              <a:ext uri="{FF2B5EF4-FFF2-40B4-BE49-F238E27FC236}">
+                <a16:creationId xmlns:a16="http://schemas.microsoft.com/office/drawing/2014/main" id="{D03AF73B-8B75-C6A4-30AE-30F605B5D5C4}"/>
+              </a:ext>
+            </a:extLst>
+          </p:cNvPr>
+          <p:cNvSpPr txBox="1"/>
+          <p:nvPr/>
+        </p:nvSpPr>
+        <p:spPr>
+          <a:xfrm>
+            <a:off x="7779315" y="12674512"/>
+            <a:ext cx="5166360" cy="1384995"/>
+          </a:xfrm>
+          <a:prstGeom prst="rect">
+            <a:avLst/>
+          </a:prstGeom>
+          <a:solidFill>
+            <a:schemeClr val="accent1">
+              <a:lumMod val="20000"/>
+              <a:lumOff val="80000"/>
+            </a:schemeClr>
+          </a:solidFill>
+          <a:ln w="19050">
+            <a:solidFill>
+              <a:srgbClr val="00B0F0"/>
+            </a:solidFill>
+          </a:ln>
+        </p:spPr>
+        <p:txBody>
+          <a:bodyPr wrap="square" rtlCol="0">
+            <a:spAutoFit/>
+          </a:bodyPr>
+          <a:lstStyle>
+            <a:defPPr>
+              <a:defRPr lang="de-DE"/>
+            </a:defPPr>
+            <a:lvl1pPr>
+              <a:defRPr sz="1200" b="1"/>
+            </a:lvl1pPr>
+          </a:lstStyle>
+          <a:p>
+            <a:r>
+              <a:rPr lang="en-US" dirty="0"/>
+              <a:t>Medication</a:t>
+            </a:r>
+            <a:r>
+              <a:rPr lang="de-CH" dirty="0"/>
+              <a:t>Statement</a:t>
+            </a:r>
+          </a:p>
+          <a:p>
+            <a:r>
+              <a:rPr lang="de-CH" b="0" dirty="0"/>
+              <a:t>identifier (resource) = </a:t>
+            </a:r>
+            <a:r>
+              <a:rPr lang="de-CH" b="0" dirty="0">
+                <a:solidFill>
+                  <a:schemeClr val="accent2">
+                    <a:lumMod val="60000"/>
+                    <a:lumOff val="40000"/>
+                  </a:schemeClr>
+                </a:solidFill>
+              </a:rPr>
+              <a:t>534996fe-5e45-40ed-9388-06fa268e13d8</a:t>
+            </a:r>
+          </a:p>
+          <a:p>
+            <a:endParaRPr lang="de-CH" b="0" dirty="0"/>
+          </a:p>
+          <a:p>
+            <a:r>
+              <a:rPr lang="de-CH" b="0" dirty="0"/>
+              <a:t>extension:treatmentPlan (ch-emed-ext-treatmentplan)</a:t>
+            </a:r>
+          </a:p>
+          <a:p>
+            <a:pPr marL="171450" indent="-171450">
+              <a:buFontTx/>
+              <a:buChar char="-"/>
+            </a:pPr>
+            <a:r>
+              <a:rPr lang="de-CH" b="0" dirty="0"/>
+              <a:t>extension:id = </a:t>
+            </a:r>
+            <a:r>
+              <a:rPr lang="de-CH" b="0" dirty="0">
+                <a:solidFill>
+                  <a:srgbClr val="00B0F0"/>
+                </a:solidFill>
+              </a:rPr>
+              <a:t>5712fffe-20c6-11e6-b67b-9e71128cae77</a:t>
+            </a:r>
+          </a:p>
+          <a:p>
+            <a:pPr marL="171450" indent="-171450">
+              <a:buFontTx/>
+              <a:buChar char="-"/>
+            </a:pPr>
+            <a:r>
+              <a:rPr lang="de-CH" b="0" dirty="0"/>
+              <a:t>extension:externalDocumentId = </a:t>
+            </a:r>
+            <a:r>
+              <a:rPr lang="de-CH" b="0" dirty="0">
+                <a:solidFill>
+                  <a:srgbClr val="0070C0"/>
+                </a:solidFill>
+              </a:rPr>
+              <a:t>5712fffe-20c6-11e6-b67b-9e71128cae77</a:t>
+            </a:r>
+          </a:p>
+          <a:p>
+            <a:pPr marL="171450" indent="-171450">
+              <a:buFontTx/>
+              <a:buChar char="-"/>
+            </a:pPr>
+            <a:endParaRPr lang="de-CH" b="0" dirty="0">
+              <a:solidFill>
+                <a:srgbClr val="7030A0"/>
+              </a:solidFill>
+            </a:endParaRPr>
+          </a:p>
+        </p:txBody>
+      </p:sp>
+      <p:cxnSp>
+        <p:nvCxnSpPr>
+          <p:cNvPr id="119" name="Verbinder: gewinkelt 118">
+            <a:extLst>
+              <a:ext uri="{FF2B5EF4-FFF2-40B4-BE49-F238E27FC236}">
+                <a16:creationId xmlns:a16="http://schemas.microsoft.com/office/drawing/2014/main" id="{4559B659-6D2A-C55B-35A8-3206A1B84935}"/>
+              </a:ext>
+            </a:extLst>
+          </p:cNvPr>
+          <p:cNvCxnSpPr>
+            <a:cxnSpLocks/>
+          </p:cNvCxnSpPr>
+          <p:nvPr/>
+        </p:nvCxnSpPr>
+        <p:spPr>
+          <a:xfrm rot="16200000" flipV="1">
+            <a:off x="114077" y="1819141"/>
+            <a:ext cx="2271994" cy="238296"/>
+          </a:xfrm>
+          <a:prstGeom prst="bentConnector4">
+            <a:avLst>
+              <a:gd name="adj1" fmla="val -77"/>
+              <a:gd name="adj2" fmla="val 195931"/>
+            </a:avLst>
+          </a:prstGeom>
+          <a:ln>
+            <a:solidFill>
+              <a:schemeClr val="bg1">
+                <a:lumMod val="75000"/>
+              </a:schemeClr>
+            </a:solidFill>
+            <a:tailEnd type="triangle"/>
+          </a:ln>
+        </p:spPr>
+        <p:style>
+          <a:lnRef idx="1">
+            <a:schemeClr val="accent6"/>
+          </a:lnRef>
+          <a:fillRef idx="0">
+            <a:schemeClr val="accent6"/>
+          </a:fillRef>
+          <a:effectRef idx="0">
+            <a:schemeClr val="accent6"/>
+          </a:effectRef>
+          <a:fontRef idx="minor">
+            <a:schemeClr val="tx1"/>
+          </a:fontRef>
+        </p:style>
+      </p:cxnSp>
+      <p:cxnSp>
+        <p:nvCxnSpPr>
+          <p:cNvPr id="120" name="Verbinder: gewinkelt 119">
+            <a:extLst>
+              <a:ext uri="{FF2B5EF4-FFF2-40B4-BE49-F238E27FC236}">
+                <a16:creationId xmlns:a16="http://schemas.microsoft.com/office/drawing/2014/main" id="{CB1CDD7D-2FBA-50B0-8DDE-6A87EF18AA5D}"/>
+              </a:ext>
+            </a:extLst>
+          </p:cNvPr>
+          <p:cNvCxnSpPr>
+            <a:cxnSpLocks/>
+            <a:endCxn id="6" idx="3"/>
+          </p:cNvCxnSpPr>
+          <p:nvPr/>
+        </p:nvCxnSpPr>
+        <p:spPr>
+          <a:xfrm rot="16200000" flipV="1">
+            <a:off x="4180844" y="3410131"/>
+            <a:ext cx="5123164" cy="250199"/>
+          </a:xfrm>
+          <a:prstGeom prst="bentConnector2">
+            <a:avLst/>
+          </a:prstGeom>
+          <a:ln>
+            <a:solidFill>
+              <a:schemeClr val="bg1">
+                <a:lumMod val="75000"/>
+              </a:schemeClr>
+            </a:solidFill>
+            <a:tailEnd type="triangle"/>
+          </a:ln>
+        </p:spPr>
+        <p:style>
+          <a:lnRef idx="1">
+            <a:schemeClr val="accent6"/>
+          </a:lnRef>
+          <a:fillRef idx="0">
+            <a:schemeClr val="accent6"/>
+          </a:fillRef>
+          <a:effectRef idx="0">
+            <a:schemeClr val="accent6"/>
+          </a:effectRef>
+          <a:fontRef idx="minor">
+            <a:schemeClr val="tx1"/>
+          </a:fontRef>
+        </p:style>
+      </p:cxnSp>
+      <p:cxnSp>
+        <p:nvCxnSpPr>
+          <p:cNvPr id="57" name="Verbinder: gewinkelt 56">
+            <a:extLst>
+              <a:ext uri="{FF2B5EF4-FFF2-40B4-BE49-F238E27FC236}">
+                <a16:creationId xmlns:a16="http://schemas.microsoft.com/office/drawing/2014/main" id="{5650D608-FA28-6EAF-9C14-0A0984FD66A7}"/>
+              </a:ext>
+            </a:extLst>
+          </p:cNvPr>
+          <p:cNvCxnSpPr>
+            <a:cxnSpLocks/>
+          </p:cNvCxnSpPr>
+          <p:nvPr/>
+        </p:nvCxnSpPr>
+        <p:spPr>
+          <a:xfrm rot="16200000" flipV="1">
+            <a:off x="5670830" y="1596354"/>
+            <a:ext cx="2406380" cy="518546"/>
+          </a:xfrm>
+          <a:prstGeom prst="bentConnector3">
+            <a:avLst>
+              <a:gd name="adj1" fmla="val 100138"/>
+            </a:avLst>
+          </a:prstGeom>
+          <a:ln>
+            <a:solidFill>
+              <a:schemeClr val="bg1">
+                <a:lumMod val="75000"/>
+              </a:schemeClr>
+            </a:solidFill>
+            <a:tailEnd type="triangle"/>
+          </a:ln>
+        </p:spPr>
+        <p:style>
+          <a:lnRef idx="1">
+            <a:schemeClr val="accent6"/>
+          </a:lnRef>
+          <a:fillRef idx="0">
+            <a:schemeClr val="accent6"/>
+          </a:fillRef>
+          <a:effectRef idx="0">
+            <a:schemeClr val="accent6"/>
+          </a:effectRef>
+          <a:fontRef idx="minor">
+            <a:schemeClr val="tx1"/>
+          </a:fontRef>
+        </p:style>
+      </p:cxnSp>
+      <p:cxnSp>
+        <p:nvCxnSpPr>
+          <p:cNvPr id="66" name="Verbinder: gewinkelt 65">
+            <a:extLst>
+              <a:ext uri="{FF2B5EF4-FFF2-40B4-BE49-F238E27FC236}">
+                <a16:creationId xmlns:a16="http://schemas.microsoft.com/office/drawing/2014/main" id="{390DA7CB-BF53-F249-5BC5-44DE372EF4B1}"/>
+              </a:ext>
+            </a:extLst>
+          </p:cNvPr>
+          <p:cNvCxnSpPr>
+            <a:cxnSpLocks/>
+          </p:cNvCxnSpPr>
+          <p:nvPr/>
+        </p:nvCxnSpPr>
+        <p:spPr>
+          <a:xfrm rot="16200000" flipV="1">
+            <a:off x="6412418" y="630687"/>
+            <a:ext cx="1162194" cy="743110"/>
+          </a:xfrm>
+          <a:prstGeom prst="bentConnector3">
+            <a:avLst>
+              <a:gd name="adj1" fmla="val 100199"/>
+            </a:avLst>
+          </a:prstGeom>
+          <a:ln>
+            <a:solidFill>
+              <a:schemeClr val="bg1">
+                <a:lumMod val="75000"/>
+              </a:schemeClr>
+            </a:solidFill>
+            <a:tailEnd type="triangle"/>
+          </a:ln>
+        </p:spPr>
+        <p:style>
+          <a:lnRef idx="1">
+            <a:schemeClr val="accent6"/>
+          </a:lnRef>
+          <a:fillRef idx="0">
+            <a:schemeClr val="accent6"/>
+          </a:fillRef>
+          <a:effectRef idx="0">
+            <a:schemeClr val="accent6"/>
+          </a:effectRef>
+          <a:fontRef idx="minor">
+            <a:schemeClr val="tx1"/>
+          </a:fontRef>
+        </p:style>
+      </p:cxnSp>
+      <p:cxnSp>
+        <p:nvCxnSpPr>
+          <p:cNvPr id="80" name="Straight Connector 79">
+            <a:extLst>
+              <a:ext uri="{FF2B5EF4-FFF2-40B4-BE49-F238E27FC236}">
+                <a16:creationId xmlns:a16="http://schemas.microsoft.com/office/drawing/2014/main" id="{755C8F5D-E170-3400-8261-63868275E8AA}"/>
+              </a:ext>
+            </a:extLst>
+          </p:cNvPr>
+          <p:cNvCxnSpPr>
+            <a:cxnSpLocks/>
+          </p:cNvCxnSpPr>
+          <p:nvPr/>
+        </p:nvCxnSpPr>
+        <p:spPr>
+          <a:xfrm flipV="1">
+            <a:off x="6867526" y="6096812"/>
+            <a:ext cx="947262" cy="1"/>
+          </a:xfrm>
+          <a:prstGeom prst="line">
+            <a:avLst/>
+          </a:prstGeom>
+          <a:ln>
+            <a:solidFill>
+              <a:schemeClr val="bg1">
+                <a:lumMod val="75000"/>
+              </a:schemeClr>
+            </a:solidFill>
+          </a:ln>
+        </p:spPr>
+        <p:style>
+          <a:lnRef idx="1">
+            <a:schemeClr val="accent6"/>
+          </a:lnRef>
+          <a:fillRef idx="0">
+            <a:schemeClr val="accent6"/>
+          </a:fillRef>
+          <a:effectRef idx="0">
+            <a:schemeClr val="accent6"/>
+          </a:effectRef>
+          <a:fontRef idx="minor">
+            <a:schemeClr val="tx1"/>
+          </a:fontRef>
+        </p:style>
+      </p:cxnSp>
+      <p:cxnSp>
+        <p:nvCxnSpPr>
+          <p:cNvPr id="95" name="Straight Connector 94">
+            <a:extLst>
+              <a:ext uri="{FF2B5EF4-FFF2-40B4-BE49-F238E27FC236}">
+                <a16:creationId xmlns:a16="http://schemas.microsoft.com/office/drawing/2014/main" id="{E4574F48-59F3-DE86-682F-62D00722A8E1}"/>
+              </a:ext>
+            </a:extLst>
+          </p:cNvPr>
+          <p:cNvCxnSpPr>
+            <a:cxnSpLocks/>
+          </p:cNvCxnSpPr>
+          <p:nvPr/>
+        </p:nvCxnSpPr>
+        <p:spPr>
+          <a:xfrm>
+            <a:off x="7134155" y="3058817"/>
+            <a:ext cx="693038" cy="0"/>
+          </a:xfrm>
+          <a:prstGeom prst="line">
+            <a:avLst/>
+          </a:prstGeom>
+          <a:ln>
+            <a:solidFill>
+              <a:schemeClr val="bg1">
+                <a:lumMod val="75000"/>
+              </a:schemeClr>
+            </a:solidFill>
+          </a:ln>
+        </p:spPr>
+        <p:style>
+          <a:lnRef idx="1">
+            <a:schemeClr val="accent6"/>
+          </a:lnRef>
+          <a:fillRef idx="0">
+            <a:schemeClr val="accent6"/>
+          </a:fillRef>
+          <a:effectRef idx="0">
+            <a:schemeClr val="accent6"/>
+          </a:effectRef>
+          <a:fontRef idx="minor">
+            <a:schemeClr val="tx1"/>
+          </a:fontRef>
+        </p:style>
+      </p:cxnSp>
+      <p:cxnSp>
+        <p:nvCxnSpPr>
+          <p:cNvPr id="108" name="Straight Connector 107">
+            <a:extLst>
+              <a:ext uri="{FF2B5EF4-FFF2-40B4-BE49-F238E27FC236}">
+                <a16:creationId xmlns:a16="http://schemas.microsoft.com/office/drawing/2014/main" id="{A717A270-6C6C-08D9-41B0-C062F2B0BD5A}"/>
+              </a:ext>
+            </a:extLst>
+          </p:cNvPr>
+          <p:cNvCxnSpPr>
+            <a:cxnSpLocks/>
+          </p:cNvCxnSpPr>
+          <p:nvPr/>
+        </p:nvCxnSpPr>
+        <p:spPr>
+          <a:xfrm>
+            <a:off x="7365070" y="1583339"/>
+            <a:ext cx="449718" cy="0"/>
+          </a:xfrm>
+          <a:prstGeom prst="line">
+            <a:avLst/>
+          </a:prstGeom>
+          <a:ln>
+            <a:solidFill>
+              <a:schemeClr val="bg1">
+                <a:lumMod val="75000"/>
+              </a:schemeClr>
+            </a:solidFill>
+          </a:ln>
+        </p:spPr>
+        <p:style>
+          <a:lnRef idx="1">
+            <a:schemeClr val="accent6"/>
+          </a:lnRef>
+          <a:fillRef idx="0">
+            <a:schemeClr val="accent6"/>
+          </a:fillRef>
+          <a:effectRef idx="0">
+            <a:schemeClr val="accent6"/>
+          </a:effectRef>
+          <a:fontRef idx="minor">
+            <a:schemeClr val="tx1"/>
+          </a:fontRef>
+        </p:style>
+      </p:cxnSp>
+      <p:cxnSp>
+        <p:nvCxnSpPr>
+          <p:cNvPr id="208" name="Verbinder: gewinkelt 119">
+            <a:extLst>
+              <a:ext uri="{FF2B5EF4-FFF2-40B4-BE49-F238E27FC236}">
+                <a16:creationId xmlns:a16="http://schemas.microsoft.com/office/drawing/2014/main" id="{0A4EE844-75E5-625D-3E53-F4D6FDCD5E7D}"/>
+              </a:ext>
+            </a:extLst>
+          </p:cNvPr>
+          <p:cNvCxnSpPr>
+            <a:cxnSpLocks/>
+            <a:endCxn id="12" idx="1"/>
+          </p:cNvCxnSpPr>
+          <p:nvPr/>
+        </p:nvCxnSpPr>
+        <p:spPr>
+          <a:xfrm rot="16200000" flipV="1">
+            <a:off x="186315" y="10516353"/>
+            <a:ext cx="2127518" cy="238298"/>
+          </a:xfrm>
+          <a:prstGeom prst="bentConnector4">
+            <a:avLst>
+              <a:gd name="adj1" fmla="val 209"/>
+              <a:gd name="adj2" fmla="val 195930"/>
+            </a:avLst>
+          </a:prstGeom>
+          <a:ln>
+            <a:solidFill>
+              <a:schemeClr val="bg1">
+                <a:lumMod val="75000"/>
+              </a:schemeClr>
+            </a:solidFill>
+            <a:tailEnd type="triangle"/>
+          </a:ln>
+        </p:spPr>
+        <p:style>
+          <a:lnRef idx="1">
+            <a:schemeClr val="accent6"/>
+          </a:lnRef>
+          <a:fillRef idx="0">
+            <a:schemeClr val="accent6"/>
+          </a:fillRef>
+          <a:effectRef idx="0">
+            <a:schemeClr val="accent6"/>
+          </a:effectRef>
+          <a:fontRef idx="minor">
+            <a:schemeClr val="tx1"/>
+          </a:fontRef>
+        </p:style>
+      </p:cxnSp>
+      <p:cxnSp>
+        <p:nvCxnSpPr>
+          <p:cNvPr id="211" name="Verbinder: gewinkelt 119">
+            <a:extLst>
+              <a:ext uri="{FF2B5EF4-FFF2-40B4-BE49-F238E27FC236}">
+                <a16:creationId xmlns:a16="http://schemas.microsoft.com/office/drawing/2014/main" id="{DA1D97C0-C833-E07F-68FB-317F93E82789}"/>
+              </a:ext>
+            </a:extLst>
+          </p:cNvPr>
+          <p:cNvCxnSpPr>
+            <a:cxnSpLocks/>
+            <a:endCxn id="12" idx="3"/>
+          </p:cNvCxnSpPr>
+          <p:nvPr/>
+        </p:nvCxnSpPr>
+        <p:spPr>
+          <a:xfrm rot="16200000" flipV="1">
+            <a:off x="5840376" y="10348693"/>
+            <a:ext cx="2127517" cy="573618"/>
+          </a:xfrm>
+          <a:prstGeom prst="bentConnector2">
+            <a:avLst/>
+          </a:prstGeom>
+          <a:ln>
+            <a:solidFill>
+              <a:schemeClr val="bg1">
+                <a:lumMod val="75000"/>
+              </a:schemeClr>
+            </a:solidFill>
+            <a:tailEnd type="triangle"/>
+          </a:ln>
+        </p:spPr>
+        <p:style>
+          <a:lnRef idx="1">
+            <a:schemeClr val="accent6"/>
+          </a:lnRef>
+          <a:fillRef idx="0">
+            <a:schemeClr val="accent6"/>
+          </a:fillRef>
+          <a:effectRef idx="0">
+            <a:schemeClr val="accent6"/>
+          </a:effectRef>
+          <a:fontRef idx="minor">
+            <a:schemeClr val="tx1"/>
+          </a:fontRef>
+        </p:style>
+      </p:cxnSp>
+      <p:cxnSp>
+        <p:nvCxnSpPr>
+          <p:cNvPr id="231" name="Straight Connector 230">
+            <a:extLst>
+              <a:ext uri="{FF2B5EF4-FFF2-40B4-BE49-F238E27FC236}">
+                <a16:creationId xmlns:a16="http://schemas.microsoft.com/office/drawing/2014/main" id="{59C3942F-61D0-D72B-8274-436EE99B694E}"/>
+              </a:ext>
+            </a:extLst>
+          </p:cNvPr>
+          <p:cNvCxnSpPr>
+            <a:cxnSpLocks/>
+          </p:cNvCxnSpPr>
+          <p:nvPr/>
+        </p:nvCxnSpPr>
+        <p:spPr>
+          <a:xfrm flipV="1">
+            <a:off x="7190942" y="11699260"/>
+            <a:ext cx="651578" cy="1"/>
+          </a:xfrm>
+          <a:prstGeom prst="line">
+            <a:avLst/>
+          </a:prstGeom>
+          <a:ln>
+            <a:solidFill>
+              <a:schemeClr val="bg1">
+                <a:lumMod val="75000"/>
+              </a:schemeClr>
+            </a:solidFill>
+          </a:ln>
+        </p:spPr>
+        <p:style>
+          <a:lnRef idx="1">
+            <a:schemeClr val="accent6"/>
+          </a:lnRef>
+          <a:fillRef idx="0">
+            <a:schemeClr val="accent6"/>
+          </a:fillRef>
+          <a:effectRef idx="0">
+            <a:schemeClr val="accent6"/>
+          </a:effectRef>
+          <a:fontRef idx="minor">
+            <a:schemeClr val="tx1"/>
+          </a:fontRef>
+        </p:style>
+      </p:cxnSp>
+      <p:cxnSp>
+        <p:nvCxnSpPr>
+          <p:cNvPr id="235" name="Verbinder: gewinkelt 119">
+            <a:extLst>
+              <a:ext uri="{FF2B5EF4-FFF2-40B4-BE49-F238E27FC236}">
+                <a16:creationId xmlns:a16="http://schemas.microsoft.com/office/drawing/2014/main" id="{4EA69642-CD5E-E2D3-625B-38066E2B0159}"/>
+              </a:ext>
+            </a:extLst>
+          </p:cNvPr>
+          <p:cNvCxnSpPr>
+            <a:cxnSpLocks/>
+          </p:cNvCxnSpPr>
+          <p:nvPr/>
+        </p:nvCxnSpPr>
+        <p:spPr>
+          <a:xfrm rot="16200000" flipV="1">
+            <a:off x="111853" y="14333739"/>
+            <a:ext cx="2225656" cy="238298"/>
+          </a:xfrm>
+          <a:prstGeom prst="bentConnector4">
+            <a:avLst>
+              <a:gd name="adj1" fmla="val 128"/>
+              <a:gd name="adj2" fmla="val 195930"/>
+            </a:avLst>
+          </a:prstGeom>
+          <a:ln>
+            <a:solidFill>
+              <a:schemeClr val="bg1">
+                <a:lumMod val="75000"/>
+              </a:schemeClr>
+            </a:solidFill>
+            <a:tailEnd type="triangle"/>
+          </a:ln>
+        </p:spPr>
+        <p:style>
+          <a:lnRef idx="1">
+            <a:schemeClr val="accent6"/>
+          </a:lnRef>
+          <a:fillRef idx="0">
+            <a:schemeClr val="accent6"/>
+          </a:fillRef>
+          <a:effectRef idx="0">
+            <a:schemeClr val="accent6"/>
+          </a:effectRef>
+          <a:fontRef idx="minor">
+            <a:schemeClr val="tx1"/>
+          </a:fontRef>
+        </p:style>
+      </p:cxnSp>
+      <p:cxnSp>
+        <p:nvCxnSpPr>
+          <p:cNvPr id="236" name="Verbinder: gewinkelt 119">
+            <a:extLst>
+              <a:ext uri="{FF2B5EF4-FFF2-40B4-BE49-F238E27FC236}">
+                <a16:creationId xmlns:a16="http://schemas.microsoft.com/office/drawing/2014/main" id="{9EE1AE21-DD65-4E49-272B-B00CF847E193}"/>
+              </a:ext>
+            </a:extLst>
+          </p:cNvPr>
+          <p:cNvCxnSpPr>
+            <a:cxnSpLocks/>
+          </p:cNvCxnSpPr>
+          <p:nvPr/>
+        </p:nvCxnSpPr>
+        <p:spPr>
+          <a:xfrm rot="10800000">
+            <a:off x="6616841" y="13366777"/>
+            <a:ext cx="1210337" cy="2"/>
+          </a:xfrm>
+          <a:prstGeom prst="bentConnector3">
+            <a:avLst>
+              <a:gd name="adj1" fmla="val 50000"/>
+            </a:avLst>
+          </a:prstGeom>
+          <a:ln>
+            <a:solidFill>
+              <a:schemeClr val="bg1">
+                <a:lumMod val="75000"/>
+              </a:schemeClr>
+            </a:solidFill>
+            <a:tailEnd type="triangle"/>
+          </a:ln>
+        </p:spPr>
+        <p:style>
+          <a:lnRef idx="1">
+            <a:schemeClr val="accent6"/>
+          </a:lnRef>
+          <a:fillRef idx="0">
+            <a:schemeClr val="accent6"/>
+          </a:fillRef>
+          <a:effectRef idx="0">
+            <a:schemeClr val="accent6"/>
+          </a:effectRef>
+          <a:fontRef idx="minor">
+            <a:schemeClr val="tx1"/>
+          </a:fontRef>
+        </p:style>
+      </p:cxnSp>
+      <p:cxnSp>
+        <p:nvCxnSpPr>
+          <p:cNvPr id="242" name="Straight Connector 241">
+            <a:extLst>
+              <a:ext uri="{FF2B5EF4-FFF2-40B4-BE49-F238E27FC236}">
+                <a16:creationId xmlns:a16="http://schemas.microsoft.com/office/drawing/2014/main" id="{13A5CD18-ABE5-672C-5DC2-B260AA25AE73}"/>
+              </a:ext>
+            </a:extLst>
+          </p:cNvPr>
+          <p:cNvCxnSpPr>
+            <a:cxnSpLocks/>
+          </p:cNvCxnSpPr>
+          <p:nvPr/>
+        </p:nvCxnSpPr>
+        <p:spPr>
+          <a:xfrm>
+            <a:off x="7190942" y="3781615"/>
+            <a:ext cx="623846" cy="0"/>
+          </a:xfrm>
+          <a:prstGeom prst="line">
+            <a:avLst/>
+          </a:prstGeom>
+          <a:ln>
+            <a:solidFill>
+              <a:schemeClr val="bg1">
+                <a:lumMod val="75000"/>
+              </a:schemeClr>
+            </a:solidFill>
+          </a:ln>
+        </p:spPr>
+        <p:style>
+          <a:lnRef idx="1">
+            <a:schemeClr val="accent6"/>
+          </a:lnRef>
+          <a:fillRef idx="0">
+            <a:schemeClr val="accent6"/>
+          </a:fillRef>
+          <a:effectRef idx="0">
+            <a:schemeClr val="accent6"/>
+          </a:effectRef>
+          <a:fontRef idx="minor">
+            <a:schemeClr val="tx1"/>
+          </a:fontRef>
+        </p:style>
+      </p:cxnSp>
+      <p:cxnSp>
+        <p:nvCxnSpPr>
+          <p:cNvPr id="243" name="Verbinder: gewinkelt 56">
+            <a:extLst>
+              <a:ext uri="{FF2B5EF4-FFF2-40B4-BE49-F238E27FC236}">
+                <a16:creationId xmlns:a16="http://schemas.microsoft.com/office/drawing/2014/main" id="{30B66D06-5458-05C9-DA75-EB906F028E85}"/>
+              </a:ext>
+            </a:extLst>
+          </p:cNvPr>
+          <p:cNvCxnSpPr>
+            <a:cxnSpLocks/>
+          </p:cNvCxnSpPr>
+          <p:nvPr/>
+        </p:nvCxnSpPr>
+        <p:spPr>
+          <a:xfrm rot="10800000">
+            <a:off x="6623402" y="3241961"/>
+            <a:ext cx="567540" cy="539655"/>
+          </a:xfrm>
+          <a:prstGeom prst="bentConnector3">
+            <a:avLst>
+              <a:gd name="adj1" fmla="val 770"/>
+            </a:avLst>
+          </a:prstGeom>
+          <a:ln>
+            <a:solidFill>
+              <a:schemeClr val="bg1">
+                <a:lumMod val="75000"/>
+              </a:schemeClr>
+            </a:solidFill>
+            <a:tailEnd type="triangle"/>
+          </a:ln>
+        </p:spPr>
+        <p:style>
+          <a:lnRef idx="1">
+            <a:schemeClr val="accent6"/>
+          </a:lnRef>
+          <a:fillRef idx="0">
+            <a:schemeClr val="accent6"/>
+          </a:fillRef>
+          <a:effectRef idx="0">
+            <a:schemeClr val="accent6"/>
+          </a:effectRef>
+          <a:fontRef idx="minor">
+            <a:schemeClr val="tx1"/>
+          </a:fontRef>
+        </p:style>
+      </p:cxnSp>
+    </p:spTree>
+    <p:extLst>
+      <p:ext uri="{BB962C8B-B14F-4D97-AF65-F5344CB8AC3E}">
+        <p14:creationId xmlns:p14="http://schemas.microsoft.com/office/powerpoint/2010/main" val="909188520"/>
       </p:ext>
     </p:extLst>
   </p:cSld>
@@ -13805,4 +17563,299 @@
   </a:objectDefaults>
   <a:extraClrSchemeLst/>
 </a:theme>
+</file>
+
+<file path=ppt/theme/theme2.xml><?xml version="1.0" encoding="utf-8"?>
+<a:theme xmlns:a="http://schemas.openxmlformats.org/drawingml/2006/main" name="Office">
+  <a:themeElements>
+    <a:clrScheme name="Office">
+      <a:dk1>
+        <a:sysClr val="windowText" lastClr="000000"/>
+      </a:dk1>
+      <a:lt1>
+        <a:sysClr val="window" lastClr="FFFFFF"/>
+      </a:lt1>
+      <a:dk2>
+        <a:srgbClr val="44546A"/>
+      </a:dk2>
+      <a:lt2>
+        <a:srgbClr val="E7E6E6"/>
+      </a:lt2>
+      <a:accent1>
+        <a:srgbClr val="4472C4"/>
+      </a:accent1>
+      <a:accent2>
+        <a:srgbClr val="ED7D31"/>
+      </a:accent2>
+      <a:accent3>
+        <a:srgbClr val="A5A5A5"/>
+      </a:accent3>
+      <a:accent4>
+        <a:srgbClr val="FFC000"/>
+      </a:accent4>
+      <a:accent5>
+        <a:srgbClr val="5B9BD5"/>
+      </a:accent5>
+      <a:accent6>
+        <a:srgbClr val="70AD47"/>
+      </a:accent6>
+      <a:hlink>
+        <a:srgbClr val="0563C1"/>
+      </a:hlink>
+      <a:folHlink>
+        <a:srgbClr val="954F72"/>
+      </a:folHlink>
+    </a:clrScheme>
+    <a:fontScheme name="Office">
+      <a:majorFont>
+        <a:latin typeface="Calibri Light" panose="020F0302020204030204"/>
+        <a:ea typeface=""/>
+        <a:cs typeface=""/>
+        <a:font script="Jpan" typeface="游ゴシック Light"/>
+        <a:font script="Hang" typeface="맑은 고딕"/>
+        <a:font script="Hans" typeface="等线 Light"/>
+        <a:font script="Hant" typeface="新細明體"/>
+        <a:font script="Arab" typeface="Times New Roman"/>
+        <a:font script="Hebr" typeface="Times New Roman"/>
+        <a:font script="Thai" typeface="Angsana New"/>
+        <a:font script="Ethi" typeface="Nyala"/>
+        <a:font script="Beng" typeface="Vrinda"/>
+        <a:font script="Gujr" typeface="Shruti"/>
+        <a:font script="Khmr" typeface="MoolBoran"/>
+        <a:font script="Knda" typeface="Tunga"/>
+        <a:font script="Guru" typeface="Raavi"/>
+        <a:font script="Cans" typeface="Euphemia"/>
+        <a:font script="Cher" typeface="Plantagenet Cherokee"/>
+        <a:font script="Yiii" typeface="Microsoft Yi Baiti"/>
+        <a:font script="Tibt" typeface="Microsoft Himalaya"/>
+        <a:font script="Thaa" typeface="MV Boli"/>
+        <a:font script="Deva" typeface="Mangal"/>
+        <a:font script="Telu" typeface="Gautami"/>
+        <a:font script="Taml" typeface="Latha"/>
+        <a:font script="Syrc" typeface="Estrangelo Edessa"/>
+        <a:font script="Orya" typeface="Kalinga"/>
+        <a:font script="Mlym" typeface="Kartika"/>
+        <a:font script="Laoo" typeface="DokChampa"/>
+        <a:font script="Sinh" typeface="Iskoola Pota"/>
+        <a:font script="Mong" typeface="Mongolian Baiti"/>
+        <a:font script="Viet" typeface="Times New Roman"/>
+        <a:font script="Uigh" typeface="Microsoft Uighur"/>
+        <a:font script="Geor" typeface="Sylfaen"/>
+        <a:font script="Armn" typeface="Arial"/>
+        <a:font script="Bugi" typeface="Leelawadee UI"/>
+        <a:font script="Bopo" typeface="Microsoft JhengHei"/>
+        <a:font script="Java" typeface="Javanese Text"/>
+        <a:font script="Lisu" typeface="Segoe UI"/>
+        <a:font script="Mymr" typeface="Myanmar Text"/>
+        <a:font script="Nkoo" typeface="Ebrima"/>
+        <a:font script="Olck" typeface="Nirmala UI"/>
+        <a:font script="Osma" typeface="Ebrima"/>
+        <a:font script="Phag" typeface="Phagspa"/>
+        <a:font script="Syrn" typeface="Estrangelo Edessa"/>
+        <a:font script="Syrj" typeface="Estrangelo Edessa"/>
+        <a:font script="Syre" typeface="Estrangelo Edessa"/>
+        <a:font script="Sora" typeface="Nirmala UI"/>
+        <a:font script="Tale" typeface="Microsoft Tai Le"/>
+        <a:font script="Talu" typeface="Microsoft New Tai Lue"/>
+        <a:font script="Tfng" typeface="Ebrima"/>
+      </a:majorFont>
+      <a:minorFont>
+        <a:latin typeface="Calibri" panose="020F0502020204030204"/>
+        <a:ea typeface=""/>
+        <a:cs typeface=""/>
+        <a:font script="Jpan" typeface="游ゴシック"/>
+        <a:font script="Hang" typeface="맑은 고딕"/>
+        <a:font script="Hans" typeface="等线"/>
+        <a:font script="Hant" typeface="新細明體"/>
+        <a:font script="Arab" typeface="Arial"/>
+        <a:font script="Hebr" typeface="Arial"/>
+        <a:font script="Thai" typeface="Cordia New"/>
+        <a:font script="Ethi" typeface="Nyala"/>
+        <a:font script="Beng" typeface="Vrinda"/>
+        <a:font script="Gujr" typeface="Shruti"/>
+        <a:font script="Khmr" typeface="DaunPenh"/>
+        <a:font script="Knda" typeface="Tunga"/>
+        <a:font script="Guru" typeface="Raavi"/>
+        <a:font script="Cans" typeface="Euphemia"/>
+        <a:font script="Cher" typeface="Plantagenet Cherokee"/>
+        <a:font script="Yiii" typeface="Microsoft Yi Baiti"/>
+        <a:font script="Tibt" typeface="Microsoft Himalaya"/>
+        <a:font script="Thaa" typeface="MV Boli"/>
+        <a:font script="Deva" typeface="Mangal"/>
+        <a:font script="Telu" typeface="Gautami"/>
+        <a:font script="Taml" typeface="Latha"/>
+        <a:font script="Syrc" typeface="Estrangelo Edessa"/>
+        <a:font script="Orya" typeface="Kalinga"/>
+        <a:font script="Mlym" typeface="Kartika"/>
+        <a:font script="Laoo" typeface="DokChampa"/>
+        <a:font script="Sinh" typeface="Iskoola Pota"/>
+        <a:font script="Mong" typeface="Mongolian Baiti"/>
+        <a:font script="Viet" typeface="Arial"/>
+        <a:font script="Uigh" typeface="Microsoft Uighur"/>
+        <a:font script="Geor" typeface="Sylfaen"/>
+        <a:font script="Armn" typeface="Arial"/>
+        <a:font script="Bugi" typeface="Leelawadee UI"/>
+        <a:font script="Bopo" typeface="Microsoft JhengHei"/>
+        <a:font script="Java" typeface="Javanese Text"/>
+        <a:font script="Lisu" typeface="Segoe UI"/>
+        <a:font script="Mymr" typeface="Myanmar Text"/>
+        <a:font script="Nkoo" typeface="Ebrima"/>
+        <a:font script="Olck" typeface="Nirmala UI"/>
+        <a:font script="Osma" typeface="Ebrima"/>
+        <a:font script="Phag" typeface="Phagspa"/>
+        <a:font script="Syrn" typeface="Estrangelo Edessa"/>
+        <a:font script="Syrj" typeface="Estrangelo Edessa"/>
+        <a:font script="Syre" typeface="Estrangelo Edessa"/>
+        <a:font script="Sora" typeface="Nirmala UI"/>
+        <a:font script="Tale" typeface="Microsoft Tai Le"/>
+        <a:font script="Talu" typeface="Microsoft New Tai Lue"/>
+        <a:font script="Tfng" typeface="Ebrima"/>
+      </a:minorFont>
+    </a:fontScheme>
+    <a:fmtScheme name="Office">
+      <a:fillStyleLst>
+        <a:solidFill>
+          <a:schemeClr val="phClr"/>
+        </a:solidFill>
+        <a:gradFill rotWithShape="1">
+          <a:gsLst>
+            <a:gs pos="0">
+              <a:schemeClr val="phClr">
+                <a:lumMod val="110000"/>
+                <a:satMod val="105000"/>
+                <a:tint val="67000"/>
+              </a:schemeClr>
+            </a:gs>
+            <a:gs pos="50000">
+              <a:schemeClr val="phClr">
+                <a:lumMod val="105000"/>
+                <a:satMod val="103000"/>
+                <a:tint val="73000"/>
+              </a:schemeClr>
+            </a:gs>
+            <a:gs pos="100000">
+              <a:schemeClr val="phClr">
+                <a:lumMod val="105000"/>
+                <a:satMod val="109000"/>
+                <a:tint val="81000"/>
+              </a:schemeClr>
+            </a:gs>
+          </a:gsLst>
+          <a:lin ang="5400000" scaled="0"/>
+        </a:gradFill>
+        <a:gradFill rotWithShape="1">
+          <a:gsLst>
+            <a:gs pos="0">
+              <a:schemeClr val="phClr">
+                <a:satMod val="103000"/>
+                <a:lumMod val="102000"/>
+                <a:tint val="94000"/>
+              </a:schemeClr>
+            </a:gs>
+            <a:gs pos="50000">
+              <a:schemeClr val="phClr">
+                <a:satMod val="110000"/>
+                <a:lumMod val="100000"/>
+                <a:shade val="100000"/>
+              </a:schemeClr>
+            </a:gs>
+            <a:gs pos="100000">
+              <a:schemeClr val="phClr">
+                <a:lumMod val="99000"/>
+                <a:satMod val="120000"/>
+                <a:shade val="78000"/>
+              </a:schemeClr>
+            </a:gs>
+          </a:gsLst>
+          <a:lin ang="5400000" scaled="0"/>
+        </a:gradFill>
+      </a:fillStyleLst>
+      <a:lnStyleLst>
+        <a:ln w="6350" cap="flat" cmpd="sng" algn="ctr">
+          <a:solidFill>
+            <a:schemeClr val="phClr"/>
+          </a:solidFill>
+          <a:prstDash val="solid"/>
+          <a:miter lim="800000"/>
+        </a:ln>
+        <a:ln w="12700" cap="flat" cmpd="sng" algn="ctr">
+          <a:solidFill>
+            <a:schemeClr val="phClr"/>
+          </a:solidFill>
+          <a:prstDash val="solid"/>
+          <a:miter lim="800000"/>
+        </a:ln>
+        <a:ln w="19050" cap="flat" cmpd="sng" algn="ctr">
+          <a:solidFill>
+            <a:schemeClr val="phClr"/>
+          </a:solidFill>
+          <a:prstDash val="solid"/>
+          <a:miter lim="800000"/>
+        </a:ln>
+      </a:lnStyleLst>
+      <a:effectStyleLst>
+        <a:effectStyle>
+          <a:effectLst/>
+        </a:effectStyle>
+        <a:effectStyle>
+          <a:effectLst/>
+        </a:effectStyle>
+        <a:effectStyle>
+          <a:effectLst>
+            <a:outerShdw blurRad="57150" dist="19050" dir="5400000" algn="ctr" rotWithShape="0">
+              <a:srgbClr val="000000">
+                <a:alpha val="63000"/>
+              </a:srgbClr>
+            </a:outerShdw>
+          </a:effectLst>
+        </a:effectStyle>
+      </a:effectStyleLst>
+      <a:bgFillStyleLst>
+        <a:solidFill>
+          <a:schemeClr val="phClr"/>
+        </a:solidFill>
+        <a:solidFill>
+          <a:schemeClr val="phClr">
+            <a:tint val="95000"/>
+            <a:satMod val="170000"/>
+          </a:schemeClr>
+        </a:solidFill>
+        <a:gradFill rotWithShape="1">
+          <a:gsLst>
+            <a:gs pos="0">
+              <a:schemeClr val="phClr">
+                <a:tint val="93000"/>
+                <a:satMod val="150000"/>
+                <a:shade val="98000"/>
+                <a:lumMod val="102000"/>
+              </a:schemeClr>
+            </a:gs>
+            <a:gs pos="50000">
+              <a:schemeClr val="phClr">
+                <a:tint val="98000"/>
+                <a:satMod val="130000"/>
+                <a:shade val="90000"/>
+                <a:lumMod val="103000"/>
+              </a:schemeClr>
+            </a:gs>
+            <a:gs pos="100000">
+              <a:schemeClr val="phClr">
+                <a:shade val="63000"/>
+                <a:satMod val="120000"/>
+              </a:schemeClr>
+            </a:gs>
+          </a:gsLst>
+          <a:lin ang="5400000" scaled="0"/>
+        </a:gradFill>
+      </a:bgFillStyleLst>
+    </a:fmtScheme>
+  </a:themeElements>
+  <a:objectDefaults/>
+  <a:extraClrSchemeLst/>
+  <a:extLst>
+    <a:ext uri="{05A4C25C-085E-4340-85A3-A5531E510DB2}">
+      <thm15:themeFamily xmlns:thm15="http://schemas.microsoft.com/office/thememl/2012/main" name="Office Theme" id="{62F939B6-93AF-4DB8-9C6B-D6C7DFDC589F}" vid="{4A3C46E8-61CC-4603-A589-7422A47A8E4A}"/>
+    </a:ext>
+  </a:extLst>
+</a:theme>
 </file>
</xml_diff>

<commit_message>
usage of random and 'real' uuids
</commit_message>
<xml_diff>
--- a/illustrations.pptx
+++ b/illustrations.pptx
@@ -5,7 +5,7 @@
     <p:sldMasterId id="2147483648" r:id="rId1"/>
   </p:sldMasterIdLst>
   <p:notesMasterIdLst>
-    <p:notesMasterId r:id="rId11"/>
+    <p:notesMasterId r:id="rId12"/>
   </p:notesMasterIdLst>
   <p:sldIdLst>
     <p:sldId id="267" r:id="rId2"/>
@@ -17,6 +17,7 @@
     <p:sldId id="273" r:id="rId8"/>
     <p:sldId id="274" r:id="rId9"/>
     <p:sldId id="276" r:id="rId10"/>
+    <p:sldId id="277" r:id="rId11"/>
   </p:sldIdLst>
   <p:sldSz cx="9144000" cy="6858000" type="screen4x3"/>
   <p:notesSz cx="6858000" cy="9144000"/>
@@ -528,78 +529,7 @@
           <a:bodyPr/>
           <a:lstStyle/>
           <a:p>
-            <a:r>
-              <a:rPr lang="de-CH" dirty="0"/>
-              <a:t>2-1 Medication List document -&gt; dynamisch generiertes Dokument</a:t>
-            </a:r>
-          </a:p>
-          <a:p>
-            <a:r>
-              <a:rPr lang="de-CH" dirty="0"/>
-              <a:t>Medication Card gleiche Farbe wie Medication List</a:t>
-            </a:r>
-          </a:p>
-          <a:p>
-            <a:r>
-              <a:rPr lang="de-CH" dirty="0"/>
-              <a:t>TODO: </a:t>
-            </a:r>
-            <a:r>
-              <a:rPr lang="de-CH" dirty="0" err="1"/>
-              <a:t>Beloc</a:t>
-            </a:r>
-            <a:r>
-              <a:rPr lang="de-CH" dirty="0"/>
-              <a:t> Zok </a:t>
-            </a:r>
-            <a:r>
-              <a:rPr lang="de-CH" dirty="0" err="1"/>
-              <a:t>Medication</a:t>
-            </a:r>
-            <a:r>
-              <a:rPr lang="de-CH" dirty="0"/>
-              <a:t> Statement Farbe 2-7</a:t>
-            </a:r>
-          </a:p>
-          <a:p>
-            <a:r>
-              <a:rPr lang="de-CH" dirty="0"/>
-              <a:t>Boxen alle gleich</a:t>
-            </a:r>
-          </a:p>
-          <a:p>
             <a:endParaRPr lang="de-CH" dirty="0"/>
-          </a:p>
-          <a:p>
-            <a:r>
-              <a:rPr lang="de-CH" dirty="0"/>
-              <a:t>Nicht mehr Entry </a:t>
-            </a:r>
-            <a:r>
-              <a:rPr lang="de-CH" dirty="0">
-                <a:sym typeface="Wingdings" panose="05000000000000000000" pitchFamily="2" charset="2"/>
-              </a:rPr>
-              <a:t> Ressource</a:t>
-            </a:r>
-            <a:endParaRPr lang="de-CH" dirty="0"/>
-          </a:p>
-          <a:p>
-            <a:r>
-              <a:rPr lang="de-CH" dirty="0"/>
-              <a:t>TODO: identifier klein schreibe</a:t>
-            </a:r>
-          </a:p>
-          <a:p>
-            <a:r>
-              <a:rPr lang="de-CH" dirty="0"/>
-              <a:t>Pfeil</a:t>
-            </a:r>
-          </a:p>
-          <a:p>
-            <a:r>
-              <a:rPr lang="de-CH" dirty="0"/>
-              <a:t>Screenshot auf Laptop</a:t>
-            </a:r>
           </a:p>
         </p:txBody>
       </p:sp>
@@ -630,6 +560,90 @@
     <p:extLst>
       <p:ext uri="{BB962C8B-B14F-4D97-AF65-F5344CB8AC3E}">
         <p14:creationId xmlns:p14="http://schemas.microsoft.com/office/powerpoint/2010/main" val="2281108298"/>
+      </p:ext>
+    </p:extLst>
+  </p:cSld>
+  <p:clrMapOvr>
+    <a:masterClrMapping/>
+  </p:clrMapOvr>
+</p:notes>
+</file>
+
+<file path=ppt/notesSlides/notesSlide2.xml><?xml version="1.0" encoding="utf-8"?>
+<p:notes xmlns:a="http://schemas.openxmlformats.org/drawingml/2006/main" xmlns:r="http://schemas.openxmlformats.org/officeDocument/2006/relationships" xmlns:p="http://schemas.openxmlformats.org/presentationml/2006/main">
+  <p:cSld>
+    <p:spTree>
+      <p:nvGrpSpPr>
+        <p:cNvPr id="1" name=""/>
+        <p:cNvGrpSpPr/>
+        <p:nvPr/>
+      </p:nvGrpSpPr>
+      <p:grpSpPr>
+        <a:xfrm>
+          <a:off x="0" y="0"/>
+          <a:ext cx="0" cy="0"/>
+          <a:chOff x="0" y="0"/>
+          <a:chExt cx="0" cy="0"/>
+        </a:xfrm>
+      </p:grpSpPr>
+      <p:sp>
+        <p:nvSpPr>
+          <p:cNvPr id="2" name="Folienbildplatzhalter 1"/>
+          <p:cNvSpPr>
+            <a:spLocks noGrp="1" noRot="1" noChangeAspect="1"/>
+          </p:cNvSpPr>
+          <p:nvPr>
+            <p:ph type="sldImg"/>
+          </p:nvPr>
+        </p:nvSpPr>
+        <p:spPr/>
+      </p:sp>
+      <p:sp>
+        <p:nvSpPr>
+          <p:cNvPr id="3" name="Notizenplatzhalter 2"/>
+          <p:cNvSpPr>
+            <a:spLocks noGrp="1"/>
+          </p:cNvSpPr>
+          <p:nvPr>
+            <p:ph type="body" idx="1"/>
+          </p:nvPr>
+        </p:nvSpPr>
+        <p:spPr/>
+        <p:txBody>
+          <a:bodyPr/>
+          <a:lstStyle/>
+          <a:p>
+            <a:endParaRPr lang="de-CH" dirty="0"/>
+          </a:p>
+        </p:txBody>
+      </p:sp>
+      <p:sp>
+        <p:nvSpPr>
+          <p:cNvPr id="4" name="Foliennummernplatzhalter 3"/>
+          <p:cNvSpPr>
+            <a:spLocks noGrp="1"/>
+          </p:cNvSpPr>
+          <p:nvPr>
+            <p:ph type="sldNum" sz="quarter" idx="5"/>
+          </p:nvPr>
+        </p:nvSpPr>
+        <p:spPr/>
+        <p:txBody>
+          <a:bodyPr/>
+          <a:lstStyle/>
+          <a:p>
+            <a:fld id="{5C75C527-47DF-48F9-A085-BFEDB02C25E1}" type="slidenum">
+              <a:rPr lang="de-CH" smtClean="0"/>
+              <a:t>10</a:t>
+            </a:fld>
+            <a:endParaRPr lang="de-CH"/>
+          </a:p>
+        </p:txBody>
+      </p:sp>
+    </p:spTree>
+    <p:extLst>
+      <p:ext uri="{BB962C8B-B14F-4D97-AF65-F5344CB8AC3E}">
+        <p14:creationId xmlns:p14="http://schemas.microsoft.com/office/powerpoint/2010/main" val="3591446959"/>
       </p:ext>
     </p:extLst>
   </p:cSld>
@@ -4691,6 +4705,1653 @@
 </p:sld>
 </file>
 
+<file path=ppt/slides/slide10.xml><?xml version="1.0" encoding="utf-8"?>
+<p:sld xmlns:a="http://schemas.openxmlformats.org/drawingml/2006/main" xmlns:r="http://schemas.openxmlformats.org/officeDocument/2006/relationships" xmlns:p="http://schemas.openxmlformats.org/presentationml/2006/main">
+  <p:cSld>
+    <p:spTree>
+      <p:nvGrpSpPr>
+        <p:cNvPr id="1" name=""/>
+        <p:cNvGrpSpPr/>
+        <p:nvPr/>
+      </p:nvGrpSpPr>
+      <p:grpSpPr>
+        <a:xfrm>
+          <a:off x="0" y="0"/>
+          <a:ext cx="0" cy="0"/>
+          <a:chOff x="0" y="0"/>
+          <a:chExt cx="0" cy="0"/>
+        </a:xfrm>
+      </p:grpSpPr>
+      <p:sp>
+        <p:nvSpPr>
+          <p:cNvPr id="217" name="Rectangle 109">
+            <a:extLst>
+              <a:ext uri="{FF2B5EF4-FFF2-40B4-BE49-F238E27FC236}">
+                <a16:creationId xmlns:a16="http://schemas.microsoft.com/office/drawing/2014/main" id="{15B3D0BF-9126-9439-4878-6909A479EF64}"/>
+              </a:ext>
+            </a:extLst>
+          </p:cNvPr>
+          <p:cNvSpPr/>
+          <p:nvPr/>
+        </p:nvSpPr>
+        <p:spPr>
+          <a:xfrm rot="10800000">
+            <a:off x="-1" y="6379413"/>
+            <a:ext cx="13584483" cy="1938991"/>
+          </a:xfrm>
+          <a:prstGeom prst="rect">
+            <a:avLst/>
+          </a:prstGeom>
+          <a:solidFill>
+            <a:schemeClr val="bg1"/>
+          </a:solidFill>
+          <a:ln>
+            <a:noFill/>
+          </a:ln>
+          <a:effectLst/>
+        </p:spPr>
+        <p:style>
+          <a:lnRef idx="1">
+            <a:schemeClr val="accent1"/>
+          </a:lnRef>
+          <a:fillRef idx="3">
+            <a:schemeClr val="accent1"/>
+          </a:fillRef>
+          <a:effectRef idx="2">
+            <a:schemeClr val="accent1"/>
+          </a:effectRef>
+          <a:fontRef idx="minor">
+            <a:schemeClr val="lt1"/>
+          </a:fontRef>
+        </p:style>
+        <p:txBody>
+          <a:bodyPr rtlCol="0" anchor="ctr"/>
+          <a:lstStyle/>
+          <a:p>
+            <a:pPr algn="ctr"/>
+            <a:endParaRPr lang="LID4096" dirty="0"/>
+          </a:p>
+        </p:txBody>
+      </p:sp>
+      <p:sp>
+        <p:nvSpPr>
+          <p:cNvPr id="28" name="Rectangle 109">
+            <a:extLst>
+              <a:ext uri="{FF2B5EF4-FFF2-40B4-BE49-F238E27FC236}">
+                <a16:creationId xmlns:a16="http://schemas.microsoft.com/office/drawing/2014/main" id="{F75F3411-E984-9023-34BE-DC5586DF2D2E}"/>
+              </a:ext>
+            </a:extLst>
+          </p:cNvPr>
+          <p:cNvSpPr/>
+          <p:nvPr/>
+        </p:nvSpPr>
+        <p:spPr>
+          <a:xfrm rot="10800000">
+            <a:off x="9136914" y="-5399"/>
+            <a:ext cx="4447569" cy="6858001"/>
+          </a:xfrm>
+          <a:prstGeom prst="rect">
+            <a:avLst/>
+          </a:prstGeom>
+          <a:solidFill>
+            <a:schemeClr val="bg1"/>
+          </a:solidFill>
+          <a:ln>
+            <a:noFill/>
+          </a:ln>
+          <a:effectLst/>
+        </p:spPr>
+        <p:style>
+          <a:lnRef idx="1">
+            <a:schemeClr val="accent1"/>
+          </a:lnRef>
+          <a:fillRef idx="3">
+            <a:schemeClr val="accent1"/>
+          </a:fillRef>
+          <a:effectRef idx="2">
+            <a:schemeClr val="accent1"/>
+          </a:effectRef>
+          <a:fontRef idx="minor">
+            <a:schemeClr val="lt1"/>
+          </a:fontRef>
+        </p:style>
+        <p:txBody>
+          <a:bodyPr rtlCol="0" anchor="ctr"/>
+          <a:lstStyle/>
+          <a:p>
+            <a:pPr algn="ctr"/>
+            <a:endParaRPr lang="LID4096"/>
+          </a:p>
+        </p:txBody>
+      </p:sp>
+      <p:sp>
+        <p:nvSpPr>
+          <p:cNvPr id="32" name="TextBox 7">
+            <a:extLst>
+              <a:ext uri="{FF2B5EF4-FFF2-40B4-BE49-F238E27FC236}">
+                <a16:creationId xmlns:a16="http://schemas.microsoft.com/office/drawing/2014/main" id="{55EBD200-F5BD-C01D-EA4E-C81271A0020F}"/>
+              </a:ext>
+            </a:extLst>
+          </p:cNvPr>
+          <p:cNvSpPr txBox="1"/>
+          <p:nvPr/>
+        </p:nvSpPr>
+        <p:spPr>
+          <a:xfrm>
+            <a:off x="1130925" y="5710339"/>
+            <a:ext cx="5486400" cy="2123658"/>
+          </a:xfrm>
+          <a:prstGeom prst="rect">
+            <a:avLst/>
+          </a:prstGeom>
+          <a:noFill/>
+          <a:ln w="19050">
+            <a:solidFill>
+              <a:schemeClr val="bg1">
+                <a:lumMod val="85000"/>
+              </a:schemeClr>
+            </a:solidFill>
+          </a:ln>
+        </p:spPr>
+        <p:txBody>
+          <a:bodyPr wrap="square" rtlCol="0">
+            <a:spAutoFit/>
+          </a:bodyPr>
+          <a:lstStyle>
+            <a:defPPr>
+              <a:defRPr lang="de-DE"/>
+            </a:defPPr>
+            <a:lvl1pPr>
+              <a:defRPr sz="1200" b="1"/>
+            </a:lvl1pPr>
+          </a:lstStyle>
+          <a:p>
+            <a:r>
+              <a:rPr lang="en-US" dirty="0"/>
+              <a:t>2-6 Medication Prescription document</a:t>
+            </a:r>
+          </a:p>
+          <a:p>
+            <a:r>
+              <a:rPr lang="en-US" b="0" dirty="0"/>
+              <a:t>i</a:t>
+            </a:r>
+            <a:r>
+              <a:rPr lang="en-US" sz="1200" b="0" dirty="0"/>
+              <a:t>dentifier (document) </a:t>
+            </a:r>
+            <a:r>
+              <a:rPr lang="en-US" b="0" dirty="0"/>
+              <a:t>= </a:t>
+            </a:r>
+            <a:r>
+              <a:rPr lang="de-CH" b="0" dirty="0">
+                <a:solidFill>
+                  <a:srgbClr val="C00000"/>
+                </a:solidFill>
+              </a:rPr>
+              <a:t>1c5b5e9b-24f7-45ed-ae9c-6e2ec53e7b05</a:t>
+            </a:r>
+          </a:p>
+          <a:p>
+            <a:endParaRPr lang="de-CH" b="0" dirty="0">
+              <a:solidFill>
+                <a:srgbClr val="9A1916"/>
+              </a:solidFill>
+            </a:endParaRPr>
+          </a:p>
+          <a:p>
+            <a:endParaRPr lang="de-CH" b="0" dirty="0">
+              <a:solidFill>
+                <a:srgbClr val="9A1916"/>
+              </a:solidFill>
+            </a:endParaRPr>
+          </a:p>
+          <a:p>
+            <a:endParaRPr lang="de-CH" b="0" dirty="0">
+              <a:solidFill>
+                <a:srgbClr val="9A1916"/>
+              </a:solidFill>
+            </a:endParaRPr>
+          </a:p>
+          <a:p>
+            <a:endParaRPr lang="de-CH" b="0" dirty="0"/>
+          </a:p>
+          <a:p>
+            <a:endParaRPr lang="de-CH" b="0" dirty="0"/>
+          </a:p>
+          <a:p>
+            <a:endParaRPr lang="de-CH" b="0" dirty="0"/>
+          </a:p>
+          <a:p>
+            <a:endParaRPr lang="de-CH" b="0" dirty="0"/>
+          </a:p>
+          <a:p>
+            <a:endParaRPr lang="en-US" dirty="0"/>
+          </a:p>
+          <a:p>
+            <a:endParaRPr lang="en-US" dirty="0"/>
+          </a:p>
+        </p:txBody>
+      </p:sp>
+      <p:sp>
+        <p:nvSpPr>
+          <p:cNvPr id="33" name="TextBox 8">
+            <a:extLst>
+              <a:ext uri="{FF2B5EF4-FFF2-40B4-BE49-F238E27FC236}">
+                <a16:creationId xmlns:a16="http://schemas.microsoft.com/office/drawing/2014/main" id="{4B4EF78D-8F65-7055-0426-E0CAB498EEA4}"/>
+              </a:ext>
+            </a:extLst>
+          </p:cNvPr>
+          <p:cNvSpPr txBox="1"/>
+          <p:nvPr/>
+        </p:nvSpPr>
+        <p:spPr>
+          <a:xfrm>
+            <a:off x="1290945" y="6364266"/>
+            <a:ext cx="5166360" cy="1188720"/>
+          </a:xfrm>
+          <a:prstGeom prst="rect">
+            <a:avLst/>
+          </a:prstGeom>
+          <a:solidFill>
+            <a:schemeClr val="accent1">
+              <a:lumMod val="20000"/>
+              <a:lumOff val="80000"/>
+            </a:schemeClr>
+          </a:solidFill>
+          <a:ln w="19050">
+            <a:solidFill>
+              <a:schemeClr val="accent5">
+                <a:lumMod val="60000"/>
+                <a:lumOff val="40000"/>
+              </a:schemeClr>
+            </a:solidFill>
+          </a:ln>
+        </p:spPr>
+        <p:txBody>
+          <a:bodyPr wrap="square" rtlCol="0">
+            <a:spAutoFit/>
+          </a:bodyPr>
+          <a:lstStyle>
+            <a:defPPr>
+              <a:defRPr lang="de-DE"/>
+            </a:defPPr>
+            <a:lvl1pPr>
+              <a:defRPr sz="1200" b="0"/>
+            </a:lvl1pPr>
+          </a:lstStyle>
+          <a:p>
+            <a:r>
+              <a:rPr lang="en-US" b="1" dirty="0"/>
+              <a:t>MedicationRequest</a:t>
+            </a:r>
+          </a:p>
+          <a:p>
+            <a:r>
+              <a:rPr lang="de-CH" dirty="0"/>
+              <a:t>identifier (resource) </a:t>
+            </a:r>
+            <a:r>
+              <a:rPr lang="en-US" dirty="0"/>
+              <a:t>= </a:t>
+            </a:r>
+            <a:r>
+              <a:rPr lang="de-CH" dirty="0">
+                <a:solidFill>
+                  <a:schemeClr val="accent6"/>
+                </a:solidFill>
+              </a:rPr>
+              <a:t>1c5b5e9b-24f7-45ed-ae9c-6e2ec53e7b05</a:t>
+            </a:r>
+          </a:p>
+          <a:p>
+            <a:endParaRPr lang="de-CH" dirty="0"/>
+          </a:p>
+          <a:p>
+            <a:r>
+              <a:rPr lang="de-CH" dirty="0"/>
+              <a:t>extension:treatmentPlan (</a:t>
+            </a:r>
+            <a:r>
+              <a:rPr lang="en-US" dirty="0"/>
+              <a:t>ch-emed-ext-treatmentplan</a:t>
+            </a:r>
+            <a:r>
+              <a:rPr lang="de-CH" dirty="0"/>
+              <a:t>)</a:t>
+            </a:r>
+          </a:p>
+          <a:p>
+            <a:pPr marL="171450" indent="-171450">
+              <a:buFontTx/>
+              <a:buChar char="-"/>
+            </a:pPr>
+            <a:r>
+              <a:rPr lang="de-CH" dirty="0"/>
+              <a:t>extension:</a:t>
+            </a:r>
+            <a:r>
+              <a:rPr lang="de-CH" dirty="0">
+                <a:solidFill>
+                  <a:srgbClr val="000000"/>
+                </a:solidFill>
+              </a:rPr>
+              <a:t>id = </a:t>
+            </a:r>
+            <a:r>
+              <a:rPr lang="de-CH" dirty="0">
+                <a:solidFill>
+                  <a:srgbClr val="00B0F0"/>
+                </a:solidFill>
+              </a:rPr>
+              <a:t>0e9a0b8a-8306-4e35-bb92-0ba424696349</a:t>
+            </a:r>
+          </a:p>
+          <a:p>
+            <a:pPr marL="171450" indent="-171450">
+              <a:buFontTx/>
+              <a:buChar char="-"/>
+            </a:pPr>
+            <a:r>
+              <a:rPr lang="de-CH" dirty="0"/>
+              <a:t>extension:externalDocumentId </a:t>
+            </a:r>
+            <a:r>
+              <a:rPr lang="de-CH" dirty="0">
+                <a:solidFill>
+                  <a:srgbClr val="0070C0"/>
+                </a:solidFill>
+              </a:rPr>
+              <a:t>= 0e9a0b8a-8306-4e35-bb92-0ba424696349</a:t>
+            </a:r>
+          </a:p>
+        </p:txBody>
+      </p:sp>
+      <p:sp>
+        <p:nvSpPr>
+          <p:cNvPr id="34" name="TextBox 7">
+            <a:extLst>
+              <a:ext uri="{FF2B5EF4-FFF2-40B4-BE49-F238E27FC236}">
+                <a16:creationId xmlns:a16="http://schemas.microsoft.com/office/drawing/2014/main" id="{FA845ACD-BB97-E109-29CD-AD2425F90197}"/>
+              </a:ext>
+            </a:extLst>
+          </p:cNvPr>
+          <p:cNvSpPr txBox="1"/>
+          <p:nvPr/>
+        </p:nvSpPr>
+        <p:spPr>
+          <a:xfrm>
+            <a:off x="7619295" y="1779817"/>
+            <a:ext cx="5486400" cy="3970318"/>
+          </a:xfrm>
+          <a:prstGeom prst="rect">
+            <a:avLst/>
+          </a:prstGeom>
+          <a:noFill/>
+          <a:ln w="19050">
+            <a:solidFill>
+              <a:schemeClr val="bg1">
+                <a:lumMod val="85000"/>
+              </a:schemeClr>
+            </a:solidFill>
+          </a:ln>
+        </p:spPr>
+        <p:txBody>
+          <a:bodyPr wrap="square" rtlCol="0">
+            <a:spAutoFit/>
+          </a:bodyPr>
+          <a:lstStyle>
+            <a:defPPr>
+              <a:defRPr lang="de-DE"/>
+            </a:defPPr>
+            <a:lvl1pPr>
+              <a:defRPr sz="1200" b="1"/>
+            </a:lvl1pPr>
+          </a:lstStyle>
+          <a:p>
+            <a:r>
+              <a:rPr lang="en-US" dirty="0"/>
+              <a:t>2-7 Medication Card document</a:t>
+            </a:r>
+          </a:p>
+          <a:p>
+            <a:r>
+              <a:rPr lang="en-US" b="0" dirty="0"/>
+              <a:t>i</a:t>
+            </a:r>
+            <a:r>
+              <a:rPr lang="en-US" sz="1200" b="0" dirty="0"/>
+              <a:t>dentifier (document)</a:t>
+            </a:r>
+            <a:r>
+              <a:rPr lang="en-US" b="0" dirty="0"/>
+              <a:t> = </a:t>
+            </a:r>
+            <a:r>
+              <a:rPr lang="de-CH" b="0" dirty="0">
+                <a:solidFill>
+                  <a:schemeClr val="accent4"/>
+                </a:solidFill>
+              </a:rPr>
+              <a:t>b4bbd9ed-bada-41b5-a513-b4bc73ca0ebb</a:t>
+            </a:r>
+          </a:p>
+          <a:p>
+            <a:endParaRPr lang="de-CH" b="0" dirty="0">
+              <a:solidFill>
+                <a:srgbClr val="CC6600"/>
+              </a:solidFill>
+            </a:endParaRPr>
+          </a:p>
+          <a:p>
+            <a:endParaRPr lang="de-CH" b="0" dirty="0">
+              <a:solidFill>
+                <a:srgbClr val="CC6600"/>
+              </a:solidFill>
+            </a:endParaRPr>
+          </a:p>
+          <a:p>
+            <a:endParaRPr lang="de-CH" b="0" dirty="0"/>
+          </a:p>
+          <a:p>
+            <a:endParaRPr lang="de-CH" b="0" dirty="0"/>
+          </a:p>
+          <a:p>
+            <a:endParaRPr lang="de-CH" b="0" dirty="0"/>
+          </a:p>
+          <a:p>
+            <a:endParaRPr lang="de-CH" b="0" dirty="0"/>
+          </a:p>
+          <a:p>
+            <a:endParaRPr lang="de-CH" b="0" dirty="0"/>
+          </a:p>
+          <a:p>
+            <a:endParaRPr lang="de-CH" b="0" dirty="0"/>
+          </a:p>
+          <a:p>
+            <a:endParaRPr lang="de-CH" b="0" dirty="0"/>
+          </a:p>
+          <a:p>
+            <a:endParaRPr lang="de-CH" b="0" dirty="0"/>
+          </a:p>
+          <a:p>
+            <a:endParaRPr lang="de-CH" b="0" dirty="0"/>
+          </a:p>
+          <a:p>
+            <a:endParaRPr lang="de-CH" b="0" dirty="0"/>
+          </a:p>
+          <a:p>
+            <a:endParaRPr lang="de-CH" b="0" dirty="0"/>
+          </a:p>
+          <a:p>
+            <a:endParaRPr lang="de-CH" b="0" dirty="0"/>
+          </a:p>
+          <a:p>
+            <a:endParaRPr lang="de-CH" b="0" dirty="0"/>
+          </a:p>
+          <a:p>
+            <a:endParaRPr lang="de-CH" b="0" dirty="0"/>
+          </a:p>
+          <a:p>
+            <a:endParaRPr lang="de-CH" b="0" dirty="0"/>
+          </a:p>
+          <a:p>
+            <a:endParaRPr lang="en-US" b="0" dirty="0"/>
+          </a:p>
+          <a:p>
+            <a:endParaRPr lang="en-US" dirty="0"/>
+          </a:p>
+        </p:txBody>
+      </p:sp>
+      <p:sp>
+        <p:nvSpPr>
+          <p:cNvPr id="35" name="TextBox 8">
+            <a:extLst>
+              <a:ext uri="{FF2B5EF4-FFF2-40B4-BE49-F238E27FC236}">
+                <a16:creationId xmlns:a16="http://schemas.microsoft.com/office/drawing/2014/main" id="{301BC25A-EB47-CCD6-F6AC-1ED6A4B18248}"/>
+              </a:ext>
+            </a:extLst>
+          </p:cNvPr>
+          <p:cNvSpPr txBox="1"/>
+          <p:nvPr/>
+        </p:nvSpPr>
+        <p:spPr>
+          <a:xfrm>
+            <a:off x="7785279" y="2484148"/>
+            <a:ext cx="5166360" cy="1384995"/>
+          </a:xfrm>
+          <a:prstGeom prst="rect">
+            <a:avLst/>
+          </a:prstGeom>
+          <a:solidFill>
+            <a:schemeClr val="accent4">
+              <a:lumMod val="20000"/>
+              <a:lumOff val="80000"/>
+            </a:schemeClr>
+          </a:solidFill>
+          <a:ln w="19050">
+            <a:solidFill>
+              <a:srgbClr val="00B0F0"/>
+            </a:solidFill>
+          </a:ln>
+        </p:spPr>
+        <p:txBody>
+          <a:bodyPr wrap="square" rtlCol="0">
+            <a:spAutoFit/>
+          </a:bodyPr>
+          <a:lstStyle>
+            <a:defPPr>
+              <a:defRPr lang="de-DE"/>
+            </a:defPPr>
+            <a:lvl1pPr>
+              <a:defRPr sz="1200" b="1"/>
+            </a:lvl1pPr>
+          </a:lstStyle>
+          <a:p>
+            <a:r>
+              <a:rPr lang="en-US" dirty="0"/>
+              <a:t>Medication</a:t>
+            </a:r>
+            <a:r>
+              <a:rPr lang="de-CH" dirty="0"/>
+              <a:t>Statement</a:t>
+            </a:r>
+          </a:p>
+          <a:p>
+            <a:r>
+              <a:rPr lang="de-CH" b="0" dirty="0"/>
+              <a:t>identifier (resource) = </a:t>
+            </a:r>
+            <a:r>
+              <a:rPr lang="de-CH" b="0" dirty="0">
+                <a:solidFill>
+                  <a:schemeClr val="accent2">
+                    <a:lumMod val="60000"/>
+                    <a:lumOff val="40000"/>
+                  </a:schemeClr>
+                </a:solidFill>
+              </a:rPr>
+              <a:t>af9e960d-99bf-46d5-8a72-8f863512246b</a:t>
+            </a:r>
+          </a:p>
+          <a:p>
+            <a:endParaRPr lang="de-CH" b="0" dirty="0"/>
+          </a:p>
+          <a:p>
+            <a:r>
+              <a:rPr lang="de-CH" b="0" dirty="0"/>
+              <a:t>extension:treatmentPlan (ch-emed-ext-treatmentplan)</a:t>
+            </a:r>
+          </a:p>
+          <a:p>
+            <a:pPr marL="171450" indent="-171450">
+              <a:buFontTx/>
+              <a:buChar char="-"/>
+            </a:pPr>
+            <a:r>
+              <a:rPr lang="de-CH" b="0" dirty="0"/>
+              <a:t>extension:id = </a:t>
+            </a:r>
+            <a:r>
+              <a:rPr lang="de-CH" b="0" dirty="0">
+                <a:solidFill>
+                  <a:srgbClr val="00B0F0"/>
+                </a:solidFill>
+              </a:rPr>
+              <a:t>56c82cf2-123e-4401-80a4-28a5dd059979</a:t>
+            </a:r>
+          </a:p>
+          <a:p>
+            <a:pPr marL="171450" indent="-171450">
+              <a:buFontTx/>
+              <a:buChar char="-"/>
+            </a:pPr>
+            <a:r>
+              <a:rPr lang="de-CH" b="0" dirty="0"/>
+              <a:t>extension:externalDocumentId = </a:t>
+            </a:r>
+            <a:r>
+              <a:rPr lang="de-CH" b="0" dirty="0">
+                <a:solidFill>
+                  <a:srgbClr val="0070C0"/>
+                </a:solidFill>
+              </a:rPr>
+              <a:t>56c82cf2-123e-4401-80a4-28a5dd059979</a:t>
+            </a:r>
+          </a:p>
+          <a:p>
+            <a:pPr marL="171450" indent="-171450">
+              <a:buFontTx/>
+              <a:buChar char="-"/>
+            </a:pPr>
+            <a:endParaRPr lang="de-CH" b="0" dirty="0">
+              <a:solidFill>
+                <a:srgbClr val="7030A0"/>
+              </a:solidFill>
+            </a:endParaRPr>
+          </a:p>
+        </p:txBody>
+      </p:sp>
+      <p:sp>
+        <p:nvSpPr>
+          <p:cNvPr id="12" name="TextBox 5">
+            <a:extLst>
+              <a:ext uri="{FF2B5EF4-FFF2-40B4-BE49-F238E27FC236}">
+                <a16:creationId xmlns:a16="http://schemas.microsoft.com/office/drawing/2014/main" id="{879BD315-04A1-1C9E-0387-A300712C3E23}"/>
+              </a:ext>
+            </a:extLst>
+          </p:cNvPr>
+          <p:cNvSpPr txBox="1"/>
+          <p:nvPr/>
+        </p:nvSpPr>
+        <p:spPr>
+          <a:xfrm>
+            <a:off x="1130925" y="376931"/>
+            <a:ext cx="5486400" cy="1384995"/>
+          </a:xfrm>
+          <a:prstGeom prst="rect">
+            <a:avLst/>
+          </a:prstGeom>
+          <a:noFill/>
+          <a:ln w="19050">
+            <a:solidFill>
+              <a:schemeClr val="bg1">
+                <a:lumMod val="85000"/>
+              </a:schemeClr>
+            </a:solidFill>
+          </a:ln>
+        </p:spPr>
+        <p:txBody>
+          <a:bodyPr wrap="square" rtlCol="0">
+            <a:spAutoFit/>
+          </a:bodyPr>
+          <a:lstStyle/>
+          <a:p>
+            <a:r>
+              <a:rPr lang="en-US" sz="1200" b="1" dirty="0"/>
+              <a:t>2-3 Medication Treatment Plan document</a:t>
+            </a:r>
+          </a:p>
+          <a:p>
+            <a:r>
+              <a:rPr lang="en-US" sz="1200" dirty="0"/>
+              <a:t>identifier (document) = </a:t>
+            </a:r>
+            <a:r>
+              <a:rPr lang="de-CH" sz="1200" dirty="0">
+                <a:solidFill>
+                  <a:srgbClr val="0070C0"/>
+                </a:solidFill>
+              </a:rPr>
+              <a:t>56c82cf2-123e-4401-80a4-28a5dd059979</a:t>
+            </a:r>
+          </a:p>
+          <a:p>
+            <a:endParaRPr lang="en-US" sz="1200" dirty="0">
+              <a:solidFill>
+                <a:srgbClr val="C00000"/>
+              </a:solidFill>
+            </a:endParaRPr>
+          </a:p>
+          <a:p>
+            <a:endParaRPr lang="en-US" sz="1200" dirty="0">
+              <a:solidFill>
+                <a:srgbClr val="C00000"/>
+              </a:solidFill>
+            </a:endParaRPr>
+          </a:p>
+          <a:p>
+            <a:endParaRPr lang="en-US" sz="1200" b="1" dirty="0"/>
+          </a:p>
+          <a:p>
+            <a:endParaRPr lang="en-US" sz="1200" b="1" dirty="0"/>
+          </a:p>
+          <a:p>
+            <a:endParaRPr lang="en-US" sz="1200" b="1" dirty="0"/>
+          </a:p>
+        </p:txBody>
+      </p:sp>
+      <p:sp>
+        <p:nvSpPr>
+          <p:cNvPr id="13" name="TextBox 6">
+            <a:extLst>
+              <a:ext uri="{FF2B5EF4-FFF2-40B4-BE49-F238E27FC236}">
+                <a16:creationId xmlns:a16="http://schemas.microsoft.com/office/drawing/2014/main" id="{4DBB7227-D59A-D4BA-2409-6BC26BD0156C}"/>
+              </a:ext>
+            </a:extLst>
+          </p:cNvPr>
+          <p:cNvSpPr txBox="1"/>
+          <p:nvPr/>
+        </p:nvSpPr>
+        <p:spPr>
+          <a:xfrm>
+            <a:off x="1300829" y="916746"/>
+            <a:ext cx="5166360" cy="457200"/>
+          </a:xfrm>
+          <a:prstGeom prst="rect">
+            <a:avLst/>
+          </a:prstGeom>
+          <a:solidFill>
+            <a:schemeClr val="accent4">
+              <a:lumMod val="20000"/>
+              <a:lumOff val="80000"/>
+            </a:schemeClr>
+          </a:solidFill>
+          <a:ln w="19050">
+            <a:solidFill>
+              <a:srgbClr val="00B0F0"/>
+            </a:solidFill>
+          </a:ln>
+        </p:spPr>
+        <p:txBody>
+          <a:bodyPr wrap="square" rtlCol="0">
+            <a:spAutoFit/>
+          </a:bodyPr>
+          <a:lstStyle>
+            <a:defPPr>
+              <a:defRPr lang="de-DE"/>
+            </a:defPPr>
+            <a:lvl1pPr>
+              <a:defRPr sz="1200" b="1"/>
+            </a:lvl1pPr>
+          </a:lstStyle>
+          <a:p>
+            <a:r>
+              <a:rPr lang="de-CH" dirty="0"/>
+              <a:t>MedicationStatement</a:t>
+            </a:r>
+          </a:p>
+          <a:p>
+            <a:r>
+              <a:rPr lang="de-CH" b="0" dirty="0"/>
+              <a:t>identifier (resource) = </a:t>
+            </a:r>
+            <a:r>
+              <a:rPr lang="de-CH" b="0" dirty="0">
+                <a:solidFill>
+                  <a:srgbClr val="00B0F0"/>
+                </a:solidFill>
+              </a:rPr>
+              <a:t>56c82cf2-123e-4401-80a4-28a5dd059979  </a:t>
+            </a:r>
+          </a:p>
+        </p:txBody>
+      </p:sp>
+      <p:sp>
+        <p:nvSpPr>
+          <p:cNvPr id="14" name="TextBox 9">
+            <a:extLst>
+              <a:ext uri="{FF2B5EF4-FFF2-40B4-BE49-F238E27FC236}">
+                <a16:creationId xmlns:a16="http://schemas.microsoft.com/office/drawing/2014/main" id="{F6C1B186-314F-C611-C769-2966B95500E4}"/>
+              </a:ext>
+            </a:extLst>
+          </p:cNvPr>
+          <p:cNvSpPr txBox="1"/>
+          <p:nvPr/>
+        </p:nvSpPr>
+        <p:spPr>
+          <a:xfrm>
+            <a:off x="1130925" y="1846829"/>
+            <a:ext cx="5486400" cy="2123658"/>
+          </a:xfrm>
+          <a:prstGeom prst="rect">
+            <a:avLst/>
+          </a:prstGeom>
+          <a:noFill/>
+          <a:ln w="19050">
+            <a:solidFill>
+              <a:schemeClr val="bg1">
+                <a:lumMod val="85000"/>
+              </a:schemeClr>
+            </a:solidFill>
+          </a:ln>
+        </p:spPr>
+        <p:txBody>
+          <a:bodyPr wrap="square" rtlCol="0">
+            <a:spAutoFit/>
+          </a:bodyPr>
+          <a:lstStyle>
+            <a:defPPr>
+              <a:defRPr lang="de-DE"/>
+            </a:defPPr>
+            <a:lvl1pPr>
+              <a:defRPr sz="1200" b="1"/>
+            </a:lvl1pPr>
+          </a:lstStyle>
+          <a:p>
+            <a:r>
+              <a:rPr lang="en-US" dirty="0"/>
+              <a:t>2-4  Medication Dispense document</a:t>
+            </a:r>
+          </a:p>
+          <a:p>
+            <a:r>
+              <a:rPr lang="en-US" b="0" dirty="0"/>
+              <a:t>i</a:t>
+            </a:r>
+            <a:r>
+              <a:rPr lang="en-US" sz="1200" b="0" dirty="0"/>
+              <a:t>dentifier (document)</a:t>
+            </a:r>
+            <a:r>
+              <a:rPr lang="en-US" b="0" dirty="0"/>
+              <a:t> = </a:t>
+            </a:r>
+            <a:r>
+              <a:rPr lang="de-CH" b="0" dirty="0">
+                <a:solidFill>
+                  <a:srgbClr val="00B050"/>
+                </a:solidFill>
+              </a:rPr>
+              <a:t>874d3dae-2304-499a-96e3-f7e139480991</a:t>
+            </a:r>
+          </a:p>
+          <a:p>
+            <a:endParaRPr lang="de-CH" b="0" dirty="0">
+              <a:solidFill>
+                <a:srgbClr val="00B050"/>
+              </a:solidFill>
+            </a:endParaRPr>
+          </a:p>
+          <a:p>
+            <a:endParaRPr lang="de-CH" b="0" dirty="0">
+              <a:solidFill>
+                <a:srgbClr val="CC0099"/>
+              </a:solidFill>
+            </a:endParaRPr>
+          </a:p>
+          <a:p>
+            <a:endParaRPr lang="de-CH" b="0" dirty="0"/>
+          </a:p>
+          <a:p>
+            <a:endParaRPr lang="de-CH" b="0" dirty="0"/>
+          </a:p>
+          <a:p>
+            <a:endParaRPr lang="de-CH" b="0" dirty="0"/>
+          </a:p>
+          <a:p>
+            <a:endParaRPr lang="de-CH" b="0" dirty="0"/>
+          </a:p>
+          <a:p>
+            <a:endParaRPr lang="en-US" b="0" dirty="0"/>
+          </a:p>
+          <a:p>
+            <a:endParaRPr lang="en-US" dirty="0"/>
+          </a:p>
+          <a:p>
+            <a:endParaRPr lang="en-US" dirty="0"/>
+          </a:p>
+        </p:txBody>
+      </p:sp>
+      <p:sp>
+        <p:nvSpPr>
+          <p:cNvPr id="15" name="TextBox 10">
+            <a:extLst>
+              <a:ext uri="{FF2B5EF4-FFF2-40B4-BE49-F238E27FC236}">
+                <a16:creationId xmlns:a16="http://schemas.microsoft.com/office/drawing/2014/main" id="{E7CFF42B-2186-017D-91EF-AF8E257BCB0A}"/>
+              </a:ext>
+            </a:extLst>
+          </p:cNvPr>
+          <p:cNvSpPr txBox="1"/>
+          <p:nvPr/>
+        </p:nvSpPr>
+        <p:spPr>
+          <a:xfrm>
+            <a:off x="1290945" y="2497811"/>
+            <a:ext cx="5166360" cy="1188720"/>
+          </a:xfrm>
+          <a:prstGeom prst="rect">
+            <a:avLst/>
+          </a:prstGeom>
+          <a:solidFill>
+            <a:schemeClr val="accent4">
+              <a:lumMod val="20000"/>
+              <a:lumOff val="80000"/>
+            </a:schemeClr>
+          </a:solidFill>
+          <a:ln w="19050">
+            <a:solidFill>
+              <a:srgbClr val="92D050"/>
+            </a:solidFill>
+          </a:ln>
+        </p:spPr>
+        <p:txBody>
+          <a:bodyPr wrap="square" rtlCol="0">
+            <a:spAutoFit/>
+          </a:bodyPr>
+          <a:lstStyle>
+            <a:defPPr>
+              <a:defRPr lang="de-DE"/>
+            </a:defPPr>
+            <a:lvl1pPr>
+              <a:defRPr sz="1200" b="0"/>
+            </a:lvl1pPr>
+          </a:lstStyle>
+          <a:p>
+            <a:r>
+              <a:rPr lang="de-CH" b="1" dirty="0"/>
+              <a:t>MedicationDispense</a:t>
+            </a:r>
+          </a:p>
+          <a:p>
+            <a:r>
+              <a:rPr lang="de-CH" dirty="0"/>
+              <a:t>identifier (resource) = </a:t>
+            </a:r>
+            <a:r>
+              <a:rPr lang="de-CH" dirty="0">
+                <a:solidFill>
+                  <a:srgbClr val="92D050"/>
+                </a:solidFill>
+              </a:rPr>
+              <a:t>874d3dae-2304-499a-96e3-f7e139480991</a:t>
+            </a:r>
+          </a:p>
+          <a:p>
+            <a:endParaRPr lang="de-CH" dirty="0"/>
+          </a:p>
+          <a:p>
+            <a:r>
+              <a:rPr lang="de-CH" dirty="0"/>
+              <a:t>extension:treatmentPlan (</a:t>
+            </a:r>
+            <a:r>
+              <a:rPr lang="de-CH" b="0" dirty="0"/>
+              <a:t>ch-emed-ext-treatmentplan )</a:t>
+            </a:r>
+            <a:endParaRPr lang="de-CH" dirty="0"/>
+          </a:p>
+          <a:p>
+            <a:pPr marL="171450" indent="-171450">
+              <a:buFontTx/>
+              <a:buChar char="-"/>
+            </a:pPr>
+            <a:r>
+              <a:rPr lang="de-CH" dirty="0"/>
+              <a:t>extension:id = </a:t>
+            </a:r>
+            <a:r>
+              <a:rPr lang="de-CH" dirty="0">
+                <a:solidFill>
+                  <a:srgbClr val="00B0F0"/>
+                </a:solidFill>
+              </a:rPr>
+              <a:t>56c82cf2-123e-4401-80a4-28a5dd059979</a:t>
+            </a:r>
+          </a:p>
+          <a:p>
+            <a:pPr marL="171450" indent="-171450">
+              <a:buFontTx/>
+              <a:buChar char="-"/>
+            </a:pPr>
+            <a:r>
+              <a:rPr lang="de-CH" dirty="0"/>
+              <a:t>extension:externalDocumentId </a:t>
+            </a:r>
+            <a:r>
+              <a:rPr lang="de-CH" dirty="0">
+                <a:solidFill>
+                  <a:srgbClr val="7030A0"/>
+                </a:solidFill>
+              </a:rPr>
+              <a:t>= </a:t>
+            </a:r>
+            <a:r>
+              <a:rPr lang="de-CH" dirty="0">
+                <a:solidFill>
+                  <a:srgbClr val="0070C0"/>
+                </a:solidFill>
+              </a:rPr>
+              <a:t>56c82cf2-123e-4401-80a4-28a5dd059979</a:t>
+            </a:r>
+          </a:p>
+        </p:txBody>
+      </p:sp>
+      <p:sp>
+        <p:nvSpPr>
+          <p:cNvPr id="16" name="TextBox 9">
+            <a:extLst>
+              <a:ext uri="{FF2B5EF4-FFF2-40B4-BE49-F238E27FC236}">
+                <a16:creationId xmlns:a16="http://schemas.microsoft.com/office/drawing/2014/main" id="{3D6A90CD-33AD-B3BD-31F7-A1F8F7C5ADD3}"/>
+              </a:ext>
+            </a:extLst>
+          </p:cNvPr>
+          <p:cNvSpPr txBox="1"/>
+          <p:nvPr/>
+        </p:nvSpPr>
+        <p:spPr>
+          <a:xfrm>
+            <a:off x="1130925" y="4233998"/>
+            <a:ext cx="5486400" cy="1384995"/>
+          </a:xfrm>
+          <a:prstGeom prst="rect">
+            <a:avLst/>
+          </a:prstGeom>
+          <a:noFill/>
+          <a:ln w="19050">
+            <a:solidFill>
+              <a:schemeClr val="bg1">
+                <a:lumMod val="85000"/>
+              </a:schemeClr>
+            </a:solidFill>
+          </a:ln>
+        </p:spPr>
+        <p:txBody>
+          <a:bodyPr wrap="square" rtlCol="0">
+            <a:spAutoFit/>
+          </a:bodyPr>
+          <a:lstStyle>
+            <a:defPPr>
+              <a:defRPr lang="de-DE"/>
+            </a:defPPr>
+            <a:lvl1pPr>
+              <a:defRPr sz="1200" b="1"/>
+            </a:lvl1pPr>
+          </a:lstStyle>
+          <a:p>
+            <a:r>
+              <a:rPr lang="en-US" dirty="0"/>
+              <a:t>2-5 </a:t>
+            </a:r>
+            <a:r>
+              <a:rPr lang="de-CH" dirty="0"/>
+              <a:t>Medication Treatment Plan document</a:t>
+            </a:r>
+          </a:p>
+          <a:p>
+            <a:r>
+              <a:rPr lang="en-US" b="0" dirty="0"/>
+              <a:t>i</a:t>
+            </a:r>
+            <a:r>
+              <a:rPr lang="en-US" sz="1200" b="0" dirty="0"/>
+              <a:t>dentifier (document)</a:t>
+            </a:r>
+            <a:r>
+              <a:rPr lang="de-CH" b="0" dirty="0"/>
+              <a:t> = </a:t>
+            </a:r>
+            <a:r>
+              <a:rPr lang="de-CH" b="0" dirty="0">
+                <a:solidFill>
+                  <a:srgbClr val="0070C0"/>
+                </a:solidFill>
+              </a:rPr>
+              <a:t>0e9a0b8a-8306-4e35-bb92-0ba424696349</a:t>
+            </a:r>
+          </a:p>
+          <a:p>
+            <a:endParaRPr lang="de-CH" b="0" dirty="0">
+              <a:solidFill>
+                <a:srgbClr val="C8BA02"/>
+              </a:solidFill>
+            </a:endParaRPr>
+          </a:p>
+          <a:p>
+            <a:endParaRPr lang="de-CH" b="0" dirty="0">
+              <a:solidFill>
+                <a:srgbClr val="C8BA02"/>
+              </a:solidFill>
+            </a:endParaRPr>
+          </a:p>
+          <a:p>
+            <a:endParaRPr lang="de-CH" b="0" dirty="0"/>
+          </a:p>
+          <a:p>
+            <a:endParaRPr lang="en-US" dirty="0"/>
+          </a:p>
+          <a:p>
+            <a:endParaRPr lang="en-US" dirty="0"/>
+          </a:p>
+        </p:txBody>
+      </p:sp>
+      <p:sp>
+        <p:nvSpPr>
+          <p:cNvPr id="17" name="TextBox 10">
+            <a:extLst>
+              <a:ext uri="{FF2B5EF4-FFF2-40B4-BE49-F238E27FC236}">
+                <a16:creationId xmlns:a16="http://schemas.microsoft.com/office/drawing/2014/main" id="{7DD7EE78-9A53-5013-2BF6-C5862D49B517}"/>
+              </a:ext>
+            </a:extLst>
+          </p:cNvPr>
+          <p:cNvSpPr txBox="1"/>
+          <p:nvPr/>
+        </p:nvSpPr>
+        <p:spPr>
+          <a:xfrm>
+            <a:off x="1290945" y="4755851"/>
+            <a:ext cx="5166360" cy="457200"/>
+          </a:xfrm>
+          <a:prstGeom prst="rect">
+            <a:avLst/>
+          </a:prstGeom>
+          <a:solidFill>
+            <a:schemeClr val="accent1">
+              <a:lumMod val="20000"/>
+              <a:lumOff val="80000"/>
+            </a:schemeClr>
+          </a:solidFill>
+          <a:ln w="19050">
+            <a:solidFill>
+              <a:srgbClr val="00B0F0"/>
+            </a:solidFill>
+          </a:ln>
+        </p:spPr>
+        <p:txBody>
+          <a:bodyPr wrap="square" rtlCol="0">
+            <a:spAutoFit/>
+          </a:bodyPr>
+          <a:lstStyle>
+            <a:defPPr>
+              <a:defRPr lang="de-DE"/>
+            </a:defPPr>
+            <a:lvl1pPr>
+              <a:defRPr sz="1200" b="1"/>
+            </a:lvl1pPr>
+          </a:lstStyle>
+          <a:p>
+            <a:r>
+              <a:rPr lang="de-CH" dirty="0"/>
+              <a:t>MedicationStatement</a:t>
+            </a:r>
+          </a:p>
+          <a:p>
+            <a:r>
+              <a:rPr lang="de-CH" b="0" dirty="0"/>
+              <a:t>identifier (resource) = </a:t>
+            </a:r>
+            <a:r>
+              <a:rPr lang="de-CH" b="0" dirty="0">
+                <a:solidFill>
+                  <a:srgbClr val="00B0F0"/>
+                </a:solidFill>
+              </a:rPr>
+              <a:t>0e9a0b8a-8306-4e35-bb92-0ba424696349</a:t>
+            </a:r>
+            <a:endParaRPr lang="LID4096" b="0" dirty="0">
+              <a:solidFill>
+                <a:srgbClr val="00B0F0"/>
+              </a:solidFill>
+            </a:endParaRPr>
+          </a:p>
+        </p:txBody>
+      </p:sp>
+      <p:sp>
+        <p:nvSpPr>
+          <p:cNvPr id="52" name="TextBox 5">
+            <a:extLst>
+              <a:ext uri="{FF2B5EF4-FFF2-40B4-BE49-F238E27FC236}">
+                <a16:creationId xmlns:a16="http://schemas.microsoft.com/office/drawing/2014/main" id="{D6AE6F55-FE9B-42CD-4861-76C204C58519}"/>
+              </a:ext>
+            </a:extLst>
+          </p:cNvPr>
+          <p:cNvSpPr txBox="1"/>
+          <p:nvPr/>
+        </p:nvSpPr>
+        <p:spPr>
+          <a:xfrm rot="16200000">
+            <a:off x="-1248164" y="2035210"/>
+            <a:ext cx="3593556" cy="276999"/>
+          </a:xfrm>
+          <a:prstGeom prst="rect">
+            <a:avLst/>
+          </a:prstGeom>
+          <a:solidFill>
+            <a:schemeClr val="accent4">
+              <a:lumMod val="20000"/>
+              <a:lumOff val="80000"/>
+            </a:schemeClr>
+          </a:solidFill>
+          <a:ln w="19050">
+            <a:solidFill>
+              <a:schemeClr val="bg1">
+                <a:lumMod val="75000"/>
+              </a:schemeClr>
+            </a:solidFill>
+          </a:ln>
+        </p:spPr>
+        <p:txBody>
+          <a:bodyPr wrap="square" rtlCol="0">
+            <a:spAutoFit/>
+          </a:bodyPr>
+          <a:lstStyle/>
+          <a:p>
+            <a:r>
+              <a:rPr lang="en-US" sz="1200" b="1" dirty="0"/>
+              <a:t>Beloc Zok</a:t>
+            </a:r>
+          </a:p>
+        </p:txBody>
+      </p:sp>
+      <p:sp>
+        <p:nvSpPr>
+          <p:cNvPr id="53" name="TextBox 5">
+            <a:extLst>
+              <a:ext uri="{FF2B5EF4-FFF2-40B4-BE49-F238E27FC236}">
+                <a16:creationId xmlns:a16="http://schemas.microsoft.com/office/drawing/2014/main" id="{F5991543-1D70-B304-9D94-3DFC5A6819FB}"/>
+              </a:ext>
+            </a:extLst>
+          </p:cNvPr>
+          <p:cNvSpPr txBox="1"/>
+          <p:nvPr/>
+        </p:nvSpPr>
+        <p:spPr>
+          <a:xfrm rot="16200000">
+            <a:off x="-1248165" y="5898718"/>
+            <a:ext cx="3593557" cy="276999"/>
+          </a:xfrm>
+          <a:prstGeom prst="rect">
+            <a:avLst/>
+          </a:prstGeom>
+          <a:solidFill>
+            <a:schemeClr val="accent1">
+              <a:lumMod val="20000"/>
+              <a:lumOff val="80000"/>
+            </a:schemeClr>
+          </a:solidFill>
+          <a:ln w="19050">
+            <a:solidFill>
+              <a:schemeClr val="bg1">
+                <a:lumMod val="75000"/>
+              </a:schemeClr>
+            </a:solidFill>
+          </a:ln>
+        </p:spPr>
+        <p:txBody>
+          <a:bodyPr wrap="square" rtlCol="0">
+            <a:spAutoFit/>
+          </a:bodyPr>
+          <a:lstStyle/>
+          <a:p>
+            <a:r>
+              <a:rPr lang="en-US" sz="1200" b="1" dirty="0"/>
+              <a:t>Norvasc</a:t>
+            </a:r>
+          </a:p>
+        </p:txBody>
+      </p:sp>
+      <p:sp>
+        <p:nvSpPr>
+          <p:cNvPr id="100" name="TextBox 8">
+            <a:extLst>
+              <a:ext uri="{FF2B5EF4-FFF2-40B4-BE49-F238E27FC236}">
+                <a16:creationId xmlns:a16="http://schemas.microsoft.com/office/drawing/2014/main" id="{D03AF73B-8B75-C6A4-30AE-30F605B5D5C4}"/>
+              </a:ext>
+            </a:extLst>
+          </p:cNvPr>
+          <p:cNvSpPr txBox="1"/>
+          <p:nvPr/>
+        </p:nvSpPr>
+        <p:spPr>
+          <a:xfrm>
+            <a:off x="7779315" y="4172198"/>
+            <a:ext cx="5166360" cy="1384995"/>
+          </a:xfrm>
+          <a:prstGeom prst="rect">
+            <a:avLst/>
+          </a:prstGeom>
+          <a:solidFill>
+            <a:schemeClr val="accent1">
+              <a:lumMod val="20000"/>
+              <a:lumOff val="80000"/>
+            </a:schemeClr>
+          </a:solidFill>
+          <a:ln w="19050">
+            <a:solidFill>
+              <a:srgbClr val="00B0F0"/>
+            </a:solidFill>
+          </a:ln>
+        </p:spPr>
+        <p:txBody>
+          <a:bodyPr wrap="square" rtlCol="0">
+            <a:spAutoFit/>
+          </a:bodyPr>
+          <a:lstStyle>
+            <a:defPPr>
+              <a:defRPr lang="de-DE"/>
+            </a:defPPr>
+            <a:lvl1pPr>
+              <a:defRPr sz="1200" b="1"/>
+            </a:lvl1pPr>
+          </a:lstStyle>
+          <a:p>
+            <a:r>
+              <a:rPr lang="en-US" dirty="0"/>
+              <a:t>Medication</a:t>
+            </a:r>
+            <a:r>
+              <a:rPr lang="de-CH" dirty="0"/>
+              <a:t>Statement</a:t>
+            </a:r>
+          </a:p>
+          <a:p>
+            <a:r>
+              <a:rPr lang="de-CH" b="0" dirty="0"/>
+              <a:t>identifier (resource) = </a:t>
+            </a:r>
+            <a:r>
+              <a:rPr lang="de-CH" b="0" dirty="0">
+                <a:solidFill>
+                  <a:schemeClr val="accent2">
+                    <a:lumMod val="60000"/>
+                    <a:lumOff val="40000"/>
+                  </a:schemeClr>
+                </a:solidFill>
+              </a:rPr>
+              <a:t>92f5d646-2b51-4266-84e3-a50f531ca287</a:t>
+            </a:r>
+          </a:p>
+          <a:p>
+            <a:endParaRPr lang="de-CH" b="0" dirty="0"/>
+          </a:p>
+          <a:p>
+            <a:r>
+              <a:rPr lang="de-CH" b="0" dirty="0"/>
+              <a:t>extension:treatmentPlan (ch-emed-ext-treatmentplan)</a:t>
+            </a:r>
+          </a:p>
+          <a:p>
+            <a:pPr marL="171450" indent="-171450">
+              <a:buFontTx/>
+              <a:buChar char="-"/>
+            </a:pPr>
+            <a:r>
+              <a:rPr lang="de-CH" b="0" dirty="0"/>
+              <a:t>extension:id = </a:t>
+            </a:r>
+            <a:r>
+              <a:rPr lang="de-CH" b="0" dirty="0">
+                <a:solidFill>
+                  <a:srgbClr val="00B0F0"/>
+                </a:solidFill>
+              </a:rPr>
+              <a:t>0e9a0b8a-8306-4e35-bb92-0ba424696349</a:t>
+            </a:r>
+          </a:p>
+          <a:p>
+            <a:pPr marL="171450" indent="-171450">
+              <a:buFontTx/>
+              <a:buChar char="-"/>
+            </a:pPr>
+            <a:r>
+              <a:rPr lang="de-CH" b="0" dirty="0"/>
+              <a:t>extension:externalDocumentId = </a:t>
+            </a:r>
+            <a:r>
+              <a:rPr lang="de-CH" b="0" dirty="0">
+                <a:solidFill>
+                  <a:srgbClr val="0070C0"/>
+                </a:solidFill>
+              </a:rPr>
+              <a:t>0e9a0b8a-8306-4e35-bb92-0ba424696349</a:t>
+            </a:r>
+          </a:p>
+          <a:p>
+            <a:pPr marL="171450" indent="-171450">
+              <a:buFontTx/>
+              <a:buChar char="-"/>
+            </a:pPr>
+            <a:endParaRPr lang="de-CH" b="0" dirty="0">
+              <a:solidFill>
+                <a:srgbClr val="7030A0"/>
+              </a:solidFill>
+            </a:endParaRPr>
+          </a:p>
+        </p:txBody>
+      </p:sp>
+      <p:cxnSp>
+        <p:nvCxnSpPr>
+          <p:cNvPr id="208" name="Verbinder: gewinkelt 119">
+            <a:extLst>
+              <a:ext uri="{FF2B5EF4-FFF2-40B4-BE49-F238E27FC236}">
+                <a16:creationId xmlns:a16="http://schemas.microsoft.com/office/drawing/2014/main" id="{0A4EE844-75E5-625D-3E53-F4D6FDCD5E7D}"/>
+              </a:ext>
+            </a:extLst>
+          </p:cNvPr>
+          <p:cNvCxnSpPr>
+            <a:cxnSpLocks/>
+            <a:endCxn id="12" idx="1"/>
+          </p:cNvCxnSpPr>
+          <p:nvPr/>
+        </p:nvCxnSpPr>
+        <p:spPr>
+          <a:xfrm rot="16200000" flipV="1">
+            <a:off x="186315" y="2014039"/>
+            <a:ext cx="2127518" cy="238298"/>
+          </a:xfrm>
+          <a:prstGeom prst="bentConnector4">
+            <a:avLst>
+              <a:gd name="adj1" fmla="val 209"/>
+              <a:gd name="adj2" fmla="val 195930"/>
+            </a:avLst>
+          </a:prstGeom>
+          <a:ln>
+            <a:solidFill>
+              <a:schemeClr val="bg1">
+                <a:lumMod val="75000"/>
+              </a:schemeClr>
+            </a:solidFill>
+            <a:tailEnd type="triangle"/>
+          </a:ln>
+        </p:spPr>
+        <p:style>
+          <a:lnRef idx="1">
+            <a:schemeClr val="accent6"/>
+          </a:lnRef>
+          <a:fillRef idx="0">
+            <a:schemeClr val="accent6"/>
+          </a:fillRef>
+          <a:effectRef idx="0">
+            <a:schemeClr val="accent6"/>
+          </a:effectRef>
+          <a:fontRef idx="minor">
+            <a:schemeClr val="tx1"/>
+          </a:fontRef>
+        </p:style>
+      </p:cxnSp>
+      <p:cxnSp>
+        <p:nvCxnSpPr>
+          <p:cNvPr id="211" name="Verbinder: gewinkelt 119">
+            <a:extLst>
+              <a:ext uri="{FF2B5EF4-FFF2-40B4-BE49-F238E27FC236}">
+                <a16:creationId xmlns:a16="http://schemas.microsoft.com/office/drawing/2014/main" id="{DA1D97C0-C833-E07F-68FB-317F93E82789}"/>
+              </a:ext>
+            </a:extLst>
+          </p:cNvPr>
+          <p:cNvCxnSpPr>
+            <a:cxnSpLocks/>
+            <a:endCxn id="12" idx="3"/>
+          </p:cNvCxnSpPr>
+          <p:nvPr/>
+        </p:nvCxnSpPr>
+        <p:spPr>
+          <a:xfrm rot="16200000" flipV="1">
+            <a:off x="5840376" y="1846379"/>
+            <a:ext cx="2127517" cy="573618"/>
+          </a:xfrm>
+          <a:prstGeom prst="bentConnector2">
+            <a:avLst/>
+          </a:prstGeom>
+          <a:ln>
+            <a:solidFill>
+              <a:schemeClr val="bg1">
+                <a:lumMod val="75000"/>
+              </a:schemeClr>
+            </a:solidFill>
+            <a:tailEnd type="triangle"/>
+          </a:ln>
+        </p:spPr>
+        <p:style>
+          <a:lnRef idx="1">
+            <a:schemeClr val="accent6"/>
+          </a:lnRef>
+          <a:fillRef idx="0">
+            <a:schemeClr val="accent6"/>
+          </a:fillRef>
+          <a:effectRef idx="0">
+            <a:schemeClr val="accent6"/>
+          </a:effectRef>
+          <a:fontRef idx="minor">
+            <a:schemeClr val="tx1"/>
+          </a:fontRef>
+        </p:style>
+      </p:cxnSp>
+      <p:cxnSp>
+        <p:nvCxnSpPr>
+          <p:cNvPr id="231" name="Straight Connector 230">
+            <a:extLst>
+              <a:ext uri="{FF2B5EF4-FFF2-40B4-BE49-F238E27FC236}">
+                <a16:creationId xmlns:a16="http://schemas.microsoft.com/office/drawing/2014/main" id="{59C3942F-61D0-D72B-8274-436EE99B694E}"/>
+              </a:ext>
+            </a:extLst>
+          </p:cNvPr>
+          <p:cNvCxnSpPr>
+            <a:cxnSpLocks/>
+          </p:cNvCxnSpPr>
+          <p:nvPr/>
+        </p:nvCxnSpPr>
+        <p:spPr>
+          <a:xfrm flipV="1">
+            <a:off x="7190942" y="3196946"/>
+            <a:ext cx="651578" cy="1"/>
+          </a:xfrm>
+          <a:prstGeom prst="line">
+            <a:avLst/>
+          </a:prstGeom>
+          <a:ln>
+            <a:solidFill>
+              <a:schemeClr val="bg1">
+                <a:lumMod val="75000"/>
+              </a:schemeClr>
+            </a:solidFill>
+          </a:ln>
+        </p:spPr>
+        <p:style>
+          <a:lnRef idx="1">
+            <a:schemeClr val="accent6"/>
+          </a:lnRef>
+          <a:fillRef idx="0">
+            <a:schemeClr val="accent6"/>
+          </a:fillRef>
+          <a:effectRef idx="0">
+            <a:schemeClr val="accent6"/>
+          </a:effectRef>
+          <a:fontRef idx="minor">
+            <a:schemeClr val="tx1"/>
+          </a:fontRef>
+        </p:style>
+      </p:cxnSp>
+      <p:cxnSp>
+        <p:nvCxnSpPr>
+          <p:cNvPr id="235" name="Verbinder: gewinkelt 119">
+            <a:extLst>
+              <a:ext uri="{FF2B5EF4-FFF2-40B4-BE49-F238E27FC236}">
+                <a16:creationId xmlns:a16="http://schemas.microsoft.com/office/drawing/2014/main" id="{4EA69642-CD5E-E2D3-625B-38066E2B0159}"/>
+              </a:ext>
+            </a:extLst>
+          </p:cNvPr>
+          <p:cNvCxnSpPr>
+            <a:cxnSpLocks/>
+          </p:cNvCxnSpPr>
+          <p:nvPr/>
+        </p:nvCxnSpPr>
+        <p:spPr>
+          <a:xfrm rot="16200000" flipV="1">
+            <a:off x="111853" y="5831425"/>
+            <a:ext cx="2225656" cy="238298"/>
+          </a:xfrm>
+          <a:prstGeom prst="bentConnector4">
+            <a:avLst>
+              <a:gd name="adj1" fmla="val 128"/>
+              <a:gd name="adj2" fmla="val 195930"/>
+            </a:avLst>
+          </a:prstGeom>
+          <a:ln>
+            <a:solidFill>
+              <a:schemeClr val="bg1">
+                <a:lumMod val="75000"/>
+              </a:schemeClr>
+            </a:solidFill>
+            <a:tailEnd type="triangle"/>
+          </a:ln>
+        </p:spPr>
+        <p:style>
+          <a:lnRef idx="1">
+            <a:schemeClr val="accent6"/>
+          </a:lnRef>
+          <a:fillRef idx="0">
+            <a:schemeClr val="accent6"/>
+          </a:fillRef>
+          <a:effectRef idx="0">
+            <a:schemeClr val="accent6"/>
+          </a:effectRef>
+          <a:fontRef idx="minor">
+            <a:schemeClr val="tx1"/>
+          </a:fontRef>
+        </p:style>
+      </p:cxnSp>
+      <p:cxnSp>
+        <p:nvCxnSpPr>
+          <p:cNvPr id="236" name="Verbinder: gewinkelt 119">
+            <a:extLst>
+              <a:ext uri="{FF2B5EF4-FFF2-40B4-BE49-F238E27FC236}">
+                <a16:creationId xmlns:a16="http://schemas.microsoft.com/office/drawing/2014/main" id="{9EE1AE21-DD65-4E49-272B-B00CF847E193}"/>
+              </a:ext>
+            </a:extLst>
+          </p:cNvPr>
+          <p:cNvCxnSpPr>
+            <a:cxnSpLocks/>
+          </p:cNvCxnSpPr>
+          <p:nvPr/>
+        </p:nvCxnSpPr>
+        <p:spPr>
+          <a:xfrm rot="10800000">
+            <a:off x="6616841" y="4864463"/>
+            <a:ext cx="1210337" cy="2"/>
+          </a:xfrm>
+          <a:prstGeom prst="bentConnector3">
+            <a:avLst>
+              <a:gd name="adj1" fmla="val 50000"/>
+            </a:avLst>
+          </a:prstGeom>
+          <a:ln>
+            <a:solidFill>
+              <a:schemeClr val="bg1">
+                <a:lumMod val="75000"/>
+              </a:schemeClr>
+            </a:solidFill>
+            <a:tailEnd type="triangle"/>
+          </a:ln>
+        </p:spPr>
+        <p:style>
+          <a:lnRef idx="1">
+            <a:schemeClr val="accent6"/>
+          </a:lnRef>
+          <a:fillRef idx="0">
+            <a:schemeClr val="accent6"/>
+          </a:fillRef>
+          <a:effectRef idx="0">
+            <a:schemeClr val="accent6"/>
+          </a:effectRef>
+          <a:fontRef idx="minor">
+            <a:schemeClr val="tx1"/>
+          </a:fontRef>
+        </p:style>
+      </p:cxnSp>
+    </p:spTree>
+    <p:extLst>
+      <p:ext uri="{BB962C8B-B14F-4D97-AF65-F5344CB8AC3E}">
+        <p14:creationId xmlns:p14="http://schemas.microsoft.com/office/powerpoint/2010/main" val="1852766988"/>
+      </p:ext>
+    </p:extLst>
+  </p:cSld>
+  <p:clrMapOvr>
+    <a:masterClrMapping/>
+  </p:clrMapOvr>
+</p:sld>
+</file>
+
 <file path=ppt/slides/slide2.xml><?xml version="1.0" encoding="utf-8"?>
 <p:sld xmlns:a="http://schemas.openxmlformats.org/drawingml/2006/main" xmlns:r="http://schemas.openxmlformats.org/officeDocument/2006/relationships" xmlns:p="http://schemas.openxmlformats.org/presentationml/2006/main">
   <p:cSld>
@@ -12153,7 +13814,7 @@
 </file>
 
 <file path=ppt/slides/slide8.xml><?xml version="1.0" encoding="utf-8"?>
-<p:sld xmlns:a="http://schemas.openxmlformats.org/drawingml/2006/main" xmlns:r="http://schemas.openxmlformats.org/officeDocument/2006/relationships" xmlns:p="http://schemas.openxmlformats.org/presentationml/2006/main">
+<p:sld xmlns:a="http://schemas.openxmlformats.org/drawingml/2006/main" xmlns:r="http://schemas.openxmlformats.org/officeDocument/2006/relationships" xmlns:p="http://schemas.openxmlformats.org/presentationml/2006/main" show="0">
   <p:cSld>
     <p:spTree>
       <p:nvGrpSpPr>
@@ -14015,10 +15676,10 @@
       </p:grpSpPr>
       <p:sp>
         <p:nvSpPr>
-          <p:cNvPr id="36" name="Rectangle 109">
+          <p:cNvPr id="217" name="Rectangle 109">
             <a:extLst>
               <a:ext uri="{FF2B5EF4-FFF2-40B4-BE49-F238E27FC236}">
-                <a16:creationId xmlns:a16="http://schemas.microsoft.com/office/drawing/2014/main" id="{0F614727-B373-7848-CFF6-E8382204E0C9}"/>
+                <a16:creationId xmlns:a16="http://schemas.microsoft.com/office/drawing/2014/main" id="{15B3D0BF-9126-9439-4878-6909A479EF64}"/>
               </a:ext>
             </a:extLst>
           </p:cNvPr>
@@ -14026,9 +15687,9 @@
           <p:nvPr/>
         </p:nvSpPr>
         <p:spPr>
-          <a:xfrm rot="5400000">
-            <a:off x="2139075" y="6252747"/>
-            <a:ext cx="9306333" cy="13584483"/>
+          <a:xfrm rot="10800000">
+            <a:off x="-1" y="6379413"/>
+            <a:ext cx="13584483" cy="1938991"/>
           </a:xfrm>
           <a:prstGeom prst="rect">
             <a:avLst/>
@@ -14037,11 +15698,7 @@
             <a:schemeClr val="bg1"/>
           </a:solidFill>
           <a:ln>
-            <a:solidFill>
-              <a:schemeClr val="bg1">
-                <a:lumMod val="85000"/>
-              </a:schemeClr>
-            </a:solidFill>
+            <a:noFill/>
           </a:ln>
           <a:effectLst/>
         </p:spPr>
@@ -14064,16 +15721,16 @@
           <a:lstStyle/>
           <a:p>
             <a:pPr algn="ctr"/>
-            <a:endParaRPr lang="en-US" dirty="0"/>
-          </a:p>
-        </p:txBody>
-      </p:sp>
-      <p:sp>
-        <p:nvSpPr>
-          <p:cNvPr id="217" name="Rectangle 109">
+            <a:endParaRPr lang="LID4096" dirty="0"/>
+          </a:p>
+        </p:txBody>
+      </p:sp>
+      <p:sp>
+        <p:nvSpPr>
+          <p:cNvPr id="28" name="Rectangle 109">
             <a:extLst>
               <a:ext uri="{FF2B5EF4-FFF2-40B4-BE49-F238E27FC236}">
-                <a16:creationId xmlns:a16="http://schemas.microsoft.com/office/drawing/2014/main" id="{15B3D0BF-9126-9439-4878-6909A479EF64}"/>
+                <a16:creationId xmlns:a16="http://schemas.microsoft.com/office/drawing/2014/main" id="{F75F3411-E984-9023-34BE-DC5586DF2D2E}"/>
               </a:ext>
             </a:extLst>
           </p:cNvPr>
@@ -14082,8 +15739,8 @@
         </p:nvSpPr>
         <p:spPr>
           <a:xfrm rot="10800000">
-            <a:off x="-1" y="6379413"/>
-            <a:ext cx="13584483" cy="1938991"/>
+            <a:off x="9136914" y="-5399"/>
+            <a:ext cx="4447569" cy="6858001"/>
           </a:xfrm>
           <a:prstGeom prst="rect">
             <a:avLst/>
@@ -14115,57 +15772,6 @@
           <a:lstStyle/>
           <a:p>
             <a:pPr algn="ctr"/>
-            <a:endParaRPr lang="LID4096" dirty="0"/>
-          </a:p>
-        </p:txBody>
-      </p:sp>
-      <p:sp>
-        <p:nvSpPr>
-          <p:cNvPr id="28" name="Rectangle 109">
-            <a:extLst>
-              <a:ext uri="{FF2B5EF4-FFF2-40B4-BE49-F238E27FC236}">
-                <a16:creationId xmlns:a16="http://schemas.microsoft.com/office/drawing/2014/main" id="{F75F3411-E984-9023-34BE-DC5586DF2D2E}"/>
-              </a:ext>
-            </a:extLst>
-          </p:cNvPr>
-          <p:cNvSpPr/>
-          <p:nvPr/>
-        </p:nvSpPr>
-        <p:spPr>
-          <a:xfrm rot="10800000">
-            <a:off x="9136914" y="-5399"/>
-            <a:ext cx="4447569" cy="6858001"/>
-          </a:xfrm>
-          <a:prstGeom prst="rect">
-            <a:avLst/>
-          </a:prstGeom>
-          <a:solidFill>
-            <a:schemeClr val="bg1"/>
-          </a:solidFill>
-          <a:ln>
-            <a:noFill/>
-          </a:ln>
-          <a:effectLst/>
-        </p:spPr>
-        <p:style>
-          <a:lnRef idx="1">
-            <a:schemeClr val="accent1"/>
-          </a:lnRef>
-          <a:fillRef idx="3">
-            <a:schemeClr val="accent1"/>
-          </a:fillRef>
-          <a:effectRef idx="2">
-            <a:schemeClr val="accent1"/>
-          </a:effectRef>
-          <a:fontRef idx="minor">
-            <a:schemeClr val="lt1"/>
-          </a:fontRef>
-        </p:style>
-        <p:txBody>
-          <a:bodyPr rtlCol="0" anchor="ctr"/>
-          <a:lstStyle/>
-          <a:p>
-            <a:pPr algn="ctr"/>
             <a:endParaRPr lang="LID4096"/>
           </a:p>
         </p:txBody>
@@ -14240,7 +15846,7 @@
                   <a:schemeClr val="accent4"/>
                 </a:solidFill>
               </a:rPr>
-              <a:t>17931678-20b4-11e6-b67b-9e71128cae77</a:t>
+              <a:t>67a4e752-c39a-4620-9516-a02b36ff5061</a:t>
             </a:r>
           </a:p>
           <a:p>
@@ -14412,7 +16018,7 @@
                   <a:srgbClr val="0070C0"/>
                 </a:solidFill>
               </a:rPr>
-              <a:t>c9f758a1-296c-4710-84d4-e181db8c7478</a:t>
+              <a:t>7aa20b27-eac0-4fef-a7b9-b10196718b9f</a:t>
             </a:r>
           </a:p>
           <a:p>
@@ -14494,7 +16100,7 @@
                   <a:srgbClr val="00B0F0"/>
                 </a:solidFill>
               </a:rPr>
-              <a:t>c9f758a1-296c-4710-84d4-e181db8c7478</a:t>
+              <a:t>7aa20b27-eac0-4fef-a7b9-b10196718b9f</a:t>
             </a:r>
           </a:p>
         </p:txBody>
@@ -14561,7 +16167,7 @@
                   <a:srgbClr val="C00000"/>
                 </a:solidFill>
               </a:rPr>
-              <a:t>488bd23a-20c6-11e6-b67b-9e71128cae77</a:t>
+              <a:t>e68055ce-1540-4b26-b72d-d9c3e595416a</a:t>
             </a:r>
           </a:p>
           <a:p>
@@ -14663,7 +16269,7 @@
                   <a:schemeClr val="accent6"/>
                 </a:solidFill>
               </a:rPr>
-              <a:t>8ed02d0a-2971-11e6-b67b-9e71128cae77</a:t>
+              <a:t>e68055ce-1540-4b26-b72d-d9c3e595416a</a:t>
             </a:r>
           </a:p>
           <a:p>
@@ -14698,7 +16304,7 @@
                   <a:srgbClr val="00B0F0"/>
                 </a:solidFill>
               </a:rPr>
-              <a:t>c9f758a1-296c-4710-84d4-e181db8c7478</a:t>
+              <a:t>7aa20b27-eac0-4fef-a7b9-b10196718b9f</a:t>
             </a:r>
           </a:p>
           <a:p>
@@ -14716,7 +16322,7 @@
                   <a:srgbClr val="0070C0"/>
                 </a:solidFill>
               </a:rPr>
-              <a:t>c9f758a1-296c-4710-84d4-e181db8c7478</a:t>
+              <a:t>7aa20b27-eac0-4fef-a7b9-b10196718b9f</a:t>
             </a:r>
           </a:p>
         </p:txBody>
@@ -14783,7 +16389,7 @@
                   <a:srgbClr val="00B050"/>
                 </a:solidFill>
               </a:rPr>
-              <a:t>488bd23a-20c6-11e6-b67b-9e71128cae77</a:t>
+              <a:t>d428e837-46fe-49cc-9212-245d153c68ee</a:t>
             </a:r>
           </a:p>
           <a:p>
@@ -14873,7 +16479,7 @@
                   <a:srgbClr val="92D050"/>
                 </a:solidFill>
               </a:rPr>
-              <a:t>488bd23a-20c6-11e6-b67b-9e71128cae77</a:t>
+              <a:t>d428e837-46fe-49cc-9212-245d153c68ee</a:t>
             </a:r>
           </a:p>
           <a:p>
@@ -14916,7 +16522,7 @@
                   <a:srgbClr val="00B0F0"/>
                 </a:solidFill>
               </a:rPr>
-              <a:t>c9f758a1-296c-4710-84d4-e181db8c7478</a:t>
+              <a:t>7aa20b27-eac0-4fef-a7b9-b10196718b9f</a:t>
             </a:r>
           </a:p>
           <a:p>
@@ -14934,7 +16540,7 @@
                   <a:srgbClr val="0070C0"/>
                 </a:solidFill>
               </a:rPr>
-              <a:t>c9f758a1-296c-4710-84d4-e181db8c7478</a:t>
+              <a:t>7aa20b27-eac0-4fef-a7b9-b10196718b9f</a:t>
             </a:r>
           </a:p>
         </p:txBody>
@@ -15000,7 +16606,7 @@
                   <a:srgbClr val="00B0F0"/>
                 </a:solidFill>
               </a:rPr>
-              <a:t>c9f758a1-296c-4710-84d4-e181db8c7478</a:t>
+              <a:t>7aa20b27-eac0-4fef-a7b9-b10196718b9f</a:t>
             </a:r>
           </a:p>
           <a:p>
@@ -15039,7 +16645,7 @@
                   <a:srgbClr val="00B0F0"/>
                 </a:solidFill>
               </a:rPr>
-              <a:t>c9f758a1-296c-4710-84d4-e181db8c7478</a:t>
+              <a:t>7aa20b27-eac0-4fef-a7b9-b10196718b9f</a:t>
             </a:r>
             <a:endParaRPr lang="de-CH" dirty="0"/>
           </a:p>
@@ -15066,7 +16672,7 @@
                   <a:srgbClr val="0070C0"/>
                 </a:solidFill>
               </a:rPr>
-              <a:t>c9f758a1-296c-4710-84d4-e181db8c7478</a:t>
+              <a:t>7aa20b27-eac0-4fef-a7b9-b10196718b9f</a:t>
             </a:r>
             <a:endParaRPr lang="LID4096" dirty="0">
               <a:solidFill>
@@ -15137,7 +16743,7 @@
                   <a:srgbClr val="92D050"/>
                 </a:solidFill>
               </a:rPr>
-              <a:t> 488bd23a-20c6-11e6-b67b-9e71128cae77</a:t>
+              <a:t> d428e837-46fe-49cc-9212-245d153c68ee</a:t>
             </a:r>
           </a:p>
           <a:p>
@@ -15164,7 +16770,7 @@
                   <a:srgbClr val="00B0F0"/>
                 </a:solidFill>
               </a:rPr>
-              <a:t>c9f758a1-296c-4710-84d4-e181db8c7478</a:t>
+              <a:t>7aa20b27-eac0-4fef-a7b9-b10196718b9f</a:t>
             </a:r>
           </a:p>
           <a:p>
@@ -15182,7 +16788,7 @@
                   <a:srgbClr val="0070C0"/>
                 </a:solidFill>
               </a:rPr>
-              <a:t>c9f758a1-296c-4710-84d4-e181db8c7478</a:t>
+              <a:t>7aa20b27-eac0-4fef-a7b9-b10196718b9f</a:t>
             </a:r>
           </a:p>
           <a:p>
@@ -15217,7 +16823,7 @@
                   <a:srgbClr val="92D050"/>
                 </a:solidFill>
               </a:rPr>
-              <a:t>488bd23a-20c6-11e6-b67b-9e71128cae77</a:t>
+              <a:t>d428e837-46fe-49cc-9212-245d153c68ee</a:t>
             </a:r>
             <a:endParaRPr lang="de-CH" dirty="0"/>
           </a:p>
@@ -15244,1070 +16850,8 @@
                   <a:srgbClr val="00B050"/>
                 </a:solidFill>
               </a:rPr>
-              <a:t>488bd23a-20c6-11e6-b67b-9e71128cae77</a:t>
-            </a:r>
-          </a:p>
-        </p:txBody>
-      </p:sp>
-      <p:sp>
-        <p:nvSpPr>
-          <p:cNvPr id="32" name="TextBox 7">
-            <a:extLst>
-              <a:ext uri="{FF2B5EF4-FFF2-40B4-BE49-F238E27FC236}">
-                <a16:creationId xmlns:a16="http://schemas.microsoft.com/office/drawing/2014/main" id="{55EBD200-F5BD-C01D-EA4E-C81271A0020F}"/>
-              </a:ext>
-            </a:extLst>
-          </p:cNvPr>
-          <p:cNvSpPr txBox="1"/>
-          <p:nvPr/>
-        </p:nvSpPr>
-        <p:spPr>
-          <a:xfrm>
-            <a:off x="1130925" y="14212653"/>
-            <a:ext cx="5486400" cy="2123658"/>
-          </a:xfrm>
-          <a:prstGeom prst="rect">
-            <a:avLst/>
-          </a:prstGeom>
-          <a:noFill/>
-          <a:ln w="19050">
-            <a:solidFill>
-              <a:schemeClr val="bg1">
-                <a:lumMod val="85000"/>
-              </a:schemeClr>
-            </a:solidFill>
-          </a:ln>
-        </p:spPr>
-        <p:txBody>
-          <a:bodyPr wrap="square" rtlCol="0">
-            <a:spAutoFit/>
-          </a:bodyPr>
-          <a:lstStyle>
-            <a:defPPr>
-              <a:defRPr lang="de-DE"/>
-            </a:defPPr>
-            <a:lvl1pPr>
-              <a:defRPr sz="1200" b="1"/>
-            </a:lvl1pPr>
-          </a:lstStyle>
-          <a:p>
-            <a:r>
-              <a:rPr lang="en-US" dirty="0"/>
-              <a:t>2-6 Medication Prescription document</a:t>
-            </a:r>
-          </a:p>
-          <a:p>
-            <a:r>
-              <a:rPr lang="en-US" b="0" dirty="0"/>
-              <a:t>i</a:t>
-            </a:r>
-            <a:r>
-              <a:rPr lang="en-US" sz="1200" b="0" dirty="0"/>
-              <a:t>dentifier (document) </a:t>
-            </a:r>
-            <a:r>
-              <a:rPr lang="en-US" b="0" dirty="0"/>
-              <a:t>= </a:t>
-            </a:r>
-            <a:r>
-              <a:rPr lang="de-CH" b="0" dirty="0">
-                <a:solidFill>
-                  <a:srgbClr val="C00000"/>
-                </a:solidFill>
-              </a:rPr>
-              <a:t>d41d72ba-2100-11e6-b67b-9e71128cae77</a:t>
-            </a:r>
-          </a:p>
-          <a:p>
-            <a:endParaRPr lang="de-CH" b="0" dirty="0">
-              <a:solidFill>
-                <a:srgbClr val="9A1916"/>
-              </a:solidFill>
-            </a:endParaRPr>
-          </a:p>
-          <a:p>
-            <a:endParaRPr lang="de-CH" b="0" dirty="0">
-              <a:solidFill>
-                <a:srgbClr val="9A1916"/>
-              </a:solidFill>
-            </a:endParaRPr>
-          </a:p>
-          <a:p>
-            <a:endParaRPr lang="de-CH" b="0" dirty="0">
-              <a:solidFill>
-                <a:srgbClr val="9A1916"/>
-              </a:solidFill>
-            </a:endParaRPr>
-          </a:p>
-          <a:p>
-            <a:endParaRPr lang="de-CH" b="0" dirty="0"/>
-          </a:p>
-          <a:p>
-            <a:endParaRPr lang="de-CH" b="0" dirty="0"/>
-          </a:p>
-          <a:p>
-            <a:endParaRPr lang="de-CH" b="0" dirty="0"/>
-          </a:p>
-          <a:p>
-            <a:endParaRPr lang="de-CH" b="0" dirty="0"/>
-          </a:p>
-          <a:p>
-            <a:endParaRPr lang="en-US" dirty="0"/>
-          </a:p>
-          <a:p>
-            <a:endParaRPr lang="en-US" dirty="0"/>
-          </a:p>
-        </p:txBody>
-      </p:sp>
-      <p:sp>
-        <p:nvSpPr>
-          <p:cNvPr id="33" name="TextBox 8">
-            <a:extLst>
-              <a:ext uri="{FF2B5EF4-FFF2-40B4-BE49-F238E27FC236}">
-                <a16:creationId xmlns:a16="http://schemas.microsoft.com/office/drawing/2014/main" id="{4B4EF78D-8F65-7055-0426-E0CAB498EEA4}"/>
-              </a:ext>
-            </a:extLst>
-          </p:cNvPr>
-          <p:cNvSpPr txBox="1"/>
-          <p:nvPr/>
-        </p:nvSpPr>
-        <p:spPr>
-          <a:xfrm>
-            <a:off x="1290945" y="14866580"/>
-            <a:ext cx="5166360" cy="1188720"/>
-          </a:xfrm>
-          <a:prstGeom prst="rect">
-            <a:avLst/>
-          </a:prstGeom>
-          <a:solidFill>
-            <a:schemeClr val="accent1">
-              <a:lumMod val="20000"/>
-              <a:lumOff val="80000"/>
-            </a:schemeClr>
-          </a:solidFill>
-          <a:ln w="19050">
-            <a:solidFill>
-              <a:schemeClr val="accent5">
-                <a:lumMod val="60000"/>
-                <a:lumOff val="40000"/>
-              </a:schemeClr>
-            </a:solidFill>
-          </a:ln>
-        </p:spPr>
-        <p:txBody>
-          <a:bodyPr wrap="square" rtlCol="0">
-            <a:spAutoFit/>
-          </a:bodyPr>
-          <a:lstStyle>
-            <a:defPPr>
-              <a:defRPr lang="de-DE"/>
-            </a:defPPr>
-            <a:lvl1pPr>
-              <a:defRPr sz="1200" b="0"/>
-            </a:lvl1pPr>
-          </a:lstStyle>
-          <a:p>
-            <a:r>
-              <a:rPr lang="en-US" b="1" dirty="0"/>
-              <a:t>MedicationRequest</a:t>
-            </a:r>
-          </a:p>
-          <a:p>
-            <a:r>
-              <a:rPr lang="de-CH" dirty="0"/>
-              <a:t>identifier (resource) </a:t>
-            </a:r>
-            <a:r>
-              <a:rPr lang="en-US" dirty="0"/>
-              <a:t>= </a:t>
-            </a:r>
-            <a:r>
-              <a:rPr lang="de-CH" dirty="0">
-                <a:solidFill>
-                  <a:schemeClr val="accent6"/>
-                </a:solidFill>
-              </a:rPr>
-              <a:t>d41d72ba-2100-11e6-b67b-9e71128cae77</a:t>
-            </a:r>
-          </a:p>
-          <a:p>
-            <a:endParaRPr lang="de-CH" dirty="0"/>
-          </a:p>
-          <a:p>
-            <a:r>
-              <a:rPr lang="de-CH" dirty="0"/>
-              <a:t>extension:treatmentPlan (</a:t>
-            </a:r>
-            <a:r>
-              <a:rPr lang="en-US" dirty="0"/>
-              <a:t>ch-emed-ext-treatmentplan</a:t>
-            </a:r>
-            <a:r>
-              <a:rPr lang="de-CH" dirty="0"/>
-              <a:t>)</a:t>
-            </a:r>
-          </a:p>
-          <a:p>
-            <a:pPr marL="171450" indent="-171450">
-              <a:buFontTx/>
-              <a:buChar char="-"/>
-            </a:pPr>
-            <a:r>
-              <a:rPr lang="de-CH" dirty="0"/>
-              <a:t>extension:</a:t>
-            </a:r>
-            <a:r>
-              <a:rPr lang="de-CH" dirty="0">
-                <a:solidFill>
-                  <a:srgbClr val="000000"/>
-                </a:solidFill>
-              </a:rPr>
-              <a:t>id = </a:t>
-            </a:r>
-            <a:r>
-              <a:rPr lang="de-CH" dirty="0">
-                <a:solidFill>
-                  <a:srgbClr val="00B0F0"/>
-                </a:solidFill>
-              </a:rPr>
-              <a:t>5712fffe-20c6-11e6-b67b-9e71128cae77</a:t>
-            </a:r>
-          </a:p>
-          <a:p>
-            <a:pPr marL="171450" indent="-171450">
-              <a:buFontTx/>
-              <a:buChar char="-"/>
-            </a:pPr>
-            <a:r>
-              <a:rPr lang="de-CH" dirty="0"/>
-              <a:t>extension:externalDocumentId </a:t>
-            </a:r>
-            <a:r>
-              <a:rPr lang="de-CH" dirty="0">
-                <a:solidFill>
-                  <a:srgbClr val="0070C0"/>
-                </a:solidFill>
-              </a:rPr>
-              <a:t>= 5712fffe-20c6-11e6-b67b-9e71128cae77</a:t>
-            </a:r>
-          </a:p>
-        </p:txBody>
-      </p:sp>
-      <p:sp>
-        <p:nvSpPr>
-          <p:cNvPr id="34" name="TextBox 7">
-            <a:extLst>
-              <a:ext uri="{FF2B5EF4-FFF2-40B4-BE49-F238E27FC236}">
-                <a16:creationId xmlns:a16="http://schemas.microsoft.com/office/drawing/2014/main" id="{FA845ACD-BB97-E109-29CD-AD2425F90197}"/>
-              </a:ext>
-            </a:extLst>
-          </p:cNvPr>
-          <p:cNvSpPr txBox="1"/>
-          <p:nvPr/>
-        </p:nvSpPr>
-        <p:spPr>
-          <a:xfrm>
-            <a:off x="7619295" y="10282131"/>
-            <a:ext cx="5486400" cy="3970318"/>
-          </a:xfrm>
-          <a:prstGeom prst="rect">
-            <a:avLst/>
-          </a:prstGeom>
-          <a:noFill/>
-          <a:ln w="19050">
-            <a:solidFill>
-              <a:schemeClr val="bg1">
-                <a:lumMod val="85000"/>
-              </a:schemeClr>
-            </a:solidFill>
-          </a:ln>
-        </p:spPr>
-        <p:txBody>
-          <a:bodyPr wrap="square" rtlCol="0">
-            <a:spAutoFit/>
-          </a:bodyPr>
-          <a:lstStyle>
-            <a:defPPr>
-              <a:defRPr lang="de-DE"/>
-            </a:defPPr>
-            <a:lvl1pPr>
-              <a:defRPr sz="1200" b="1"/>
-            </a:lvl1pPr>
-          </a:lstStyle>
-          <a:p>
-            <a:r>
-              <a:rPr lang="en-US" dirty="0"/>
-              <a:t>2-7 Medication Card document</a:t>
-            </a:r>
-          </a:p>
-          <a:p>
-            <a:r>
-              <a:rPr lang="en-US" b="0" dirty="0"/>
-              <a:t>i</a:t>
-            </a:r>
-            <a:r>
-              <a:rPr lang="en-US" sz="1200" b="0" dirty="0"/>
-              <a:t>dentifier (document)</a:t>
-            </a:r>
-            <a:r>
-              <a:rPr lang="en-US" b="0" dirty="0"/>
-              <a:t> = </a:t>
-            </a:r>
-            <a:r>
-              <a:rPr lang="de-CH" b="0" dirty="0">
-                <a:solidFill>
-                  <a:schemeClr val="accent4"/>
-                </a:solidFill>
-              </a:rPr>
-              <a:t>6b6ed376-a7da-44cb-92d1-e75ce1ae73b0</a:t>
-            </a:r>
-          </a:p>
-          <a:p>
-            <a:endParaRPr lang="de-CH" b="0" dirty="0">
-              <a:solidFill>
-                <a:srgbClr val="CC6600"/>
-              </a:solidFill>
-            </a:endParaRPr>
-          </a:p>
-          <a:p>
-            <a:endParaRPr lang="de-CH" b="0" dirty="0">
-              <a:solidFill>
-                <a:srgbClr val="CC6600"/>
-              </a:solidFill>
-            </a:endParaRPr>
-          </a:p>
-          <a:p>
-            <a:endParaRPr lang="de-CH" b="0" dirty="0"/>
-          </a:p>
-          <a:p>
-            <a:endParaRPr lang="de-CH" b="0" dirty="0"/>
-          </a:p>
-          <a:p>
-            <a:endParaRPr lang="de-CH" b="0" dirty="0"/>
-          </a:p>
-          <a:p>
-            <a:endParaRPr lang="de-CH" b="0" dirty="0"/>
-          </a:p>
-          <a:p>
-            <a:endParaRPr lang="de-CH" b="0" dirty="0"/>
-          </a:p>
-          <a:p>
-            <a:endParaRPr lang="de-CH" b="0" dirty="0"/>
-          </a:p>
-          <a:p>
-            <a:endParaRPr lang="de-CH" b="0" dirty="0"/>
-          </a:p>
-          <a:p>
-            <a:endParaRPr lang="de-CH" b="0" dirty="0"/>
-          </a:p>
-          <a:p>
-            <a:endParaRPr lang="de-CH" b="0" dirty="0"/>
-          </a:p>
-          <a:p>
-            <a:endParaRPr lang="de-CH" b="0" dirty="0"/>
-          </a:p>
-          <a:p>
-            <a:endParaRPr lang="de-CH" b="0" dirty="0"/>
-          </a:p>
-          <a:p>
-            <a:endParaRPr lang="de-CH" b="0" dirty="0"/>
-          </a:p>
-          <a:p>
-            <a:endParaRPr lang="de-CH" b="0" dirty="0"/>
-          </a:p>
-          <a:p>
-            <a:endParaRPr lang="de-CH" b="0" dirty="0"/>
-          </a:p>
-          <a:p>
-            <a:endParaRPr lang="de-CH" b="0" dirty="0"/>
-          </a:p>
-          <a:p>
-            <a:endParaRPr lang="en-US" b="0" dirty="0"/>
-          </a:p>
-          <a:p>
-            <a:endParaRPr lang="en-US" dirty="0"/>
-          </a:p>
-        </p:txBody>
-      </p:sp>
-      <p:sp>
-        <p:nvSpPr>
-          <p:cNvPr id="35" name="TextBox 8">
-            <a:extLst>
-              <a:ext uri="{FF2B5EF4-FFF2-40B4-BE49-F238E27FC236}">
-                <a16:creationId xmlns:a16="http://schemas.microsoft.com/office/drawing/2014/main" id="{301BC25A-EB47-CCD6-F6AC-1ED6A4B18248}"/>
-              </a:ext>
-            </a:extLst>
-          </p:cNvPr>
-          <p:cNvSpPr txBox="1"/>
-          <p:nvPr/>
-        </p:nvSpPr>
-        <p:spPr>
-          <a:xfrm>
-            <a:off x="7785279" y="10986462"/>
-            <a:ext cx="5166360" cy="1384995"/>
-          </a:xfrm>
-          <a:prstGeom prst="rect">
-            <a:avLst/>
-          </a:prstGeom>
-          <a:solidFill>
-            <a:schemeClr val="accent4">
-              <a:lumMod val="20000"/>
-              <a:lumOff val="80000"/>
-            </a:schemeClr>
-          </a:solidFill>
-          <a:ln w="19050">
-            <a:solidFill>
-              <a:srgbClr val="00B0F0"/>
-            </a:solidFill>
-          </a:ln>
-        </p:spPr>
-        <p:txBody>
-          <a:bodyPr wrap="square" rtlCol="0">
-            <a:spAutoFit/>
-          </a:bodyPr>
-          <a:lstStyle>
-            <a:defPPr>
-              <a:defRPr lang="de-DE"/>
-            </a:defPPr>
-            <a:lvl1pPr>
-              <a:defRPr sz="1200" b="1"/>
-            </a:lvl1pPr>
-          </a:lstStyle>
-          <a:p>
-            <a:r>
-              <a:rPr lang="en-US" dirty="0"/>
-              <a:t>Medication</a:t>
-            </a:r>
-            <a:r>
-              <a:rPr lang="de-CH" dirty="0"/>
-              <a:t>Statement</a:t>
-            </a:r>
-          </a:p>
-          <a:p>
-            <a:r>
-              <a:rPr lang="de-CH" b="0" dirty="0"/>
-              <a:t>identifier (resource) = </a:t>
-            </a:r>
-            <a:r>
-              <a:rPr lang="de-CH" b="0" dirty="0">
-                <a:solidFill>
-                  <a:schemeClr val="accent2">
-                    <a:lumMod val="60000"/>
-                    <a:lumOff val="40000"/>
-                  </a:schemeClr>
-                </a:solidFill>
-              </a:rPr>
-              <a:t>d0f885ca-afa6-4e7e-905d-f7698f9607aa</a:t>
-            </a:r>
-          </a:p>
-          <a:p>
-            <a:endParaRPr lang="de-CH" b="0" dirty="0"/>
-          </a:p>
-          <a:p>
-            <a:r>
-              <a:rPr lang="de-CH" b="0" dirty="0"/>
-              <a:t>extension:treatmentPlan (ch-emed-ext-treatmentplan)</a:t>
-            </a:r>
-          </a:p>
-          <a:p>
-            <a:pPr marL="171450" indent="-171450">
-              <a:buFontTx/>
-              <a:buChar char="-"/>
-            </a:pPr>
-            <a:r>
-              <a:rPr lang="de-CH" b="0" dirty="0"/>
-              <a:t>extension:id = </a:t>
-            </a:r>
-            <a:r>
-              <a:rPr lang="de-CH" b="0" dirty="0">
-                <a:solidFill>
-                  <a:srgbClr val="00B0F0"/>
-                </a:solidFill>
-              </a:rPr>
-              <a:t>17931678-20b4-11e6-b67b-9e71128cca77</a:t>
-            </a:r>
-          </a:p>
-          <a:p>
-            <a:pPr marL="171450" indent="-171450">
-              <a:buFontTx/>
-              <a:buChar char="-"/>
-            </a:pPr>
-            <a:r>
-              <a:rPr lang="de-CH" b="0" dirty="0"/>
-              <a:t>extension:externalDocumentId = </a:t>
-            </a:r>
-            <a:r>
-              <a:rPr lang="de-CH" b="0" dirty="0">
-                <a:solidFill>
-                  <a:srgbClr val="0070C0"/>
-                </a:solidFill>
-              </a:rPr>
-              <a:t>17931678-20b4-11e6-b67b-9e71128cca77</a:t>
-            </a:r>
-          </a:p>
-          <a:p>
-            <a:pPr marL="171450" indent="-171450">
-              <a:buFontTx/>
-              <a:buChar char="-"/>
-            </a:pPr>
-            <a:endParaRPr lang="de-CH" b="0" dirty="0">
-              <a:solidFill>
-                <a:srgbClr val="7030A0"/>
-              </a:solidFill>
-            </a:endParaRPr>
-          </a:p>
-        </p:txBody>
-      </p:sp>
-      <p:sp>
-        <p:nvSpPr>
-          <p:cNvPr id="12" name="TextBox 5">
-            <a:extLst>
-              <a:ext uri="{FF2B5EF4-FFF2-40B4-BE49-F238E27FC236}">
-                <a16:creationId xmlns:a16="http://schemas.microsoft.com/office/drawing/2014/main" id="{879BD315-04A1-1C9E-0387-A300712C3E23}"/>
-              </a:ext>
-            </a:extLst>
-          </p:cNvPr>
-          <p:cNvSpPr txBox="1"/>
-          <p:nvPr/>
-        </p:nvSpPr>
-        <p:spPr>
-          <a:xfrm>
-            <a:off x="1130925" y="8879245"/>
-            <a:ext cx="5486400" cy="1384995"/>
-          </a:xfrm>
-          <a:prstGeom prst="rect">
-            <a:avLst/>
-          </a:prstGeom>
-          <a:noFill/>
-          <a:ln w="19050">
-            <a:solidFill>
-              <a:schemeClr val="bg1">
-                <a:lumMod val="85000"/>
-              </a:schemeClr>
-            </a:solidFill>
-          </a:ln>
-        </p:spPr>
-        <p:txBody>
-          <a:bodyPr wrap="square" rtlCol="0">
-            <a:spAutoFit/>
-          </a:bodyPr>
-          <a:lstStyle/>
-          <a:p>
-            <a:r>
-              <a:rPr lang="en-US" sz="1200" b="1" dirty="0"/>
-              <a:t>2-3 Medication Treatment Plan document</a:t>
-            </a:r>
-          </a:p>
-          <a:p>
-            <a:r>
-              <a:rPr lang="en-US" sz="1200" dirty="0"/>
-              <a:t>identifier (document) = </a:t>
-            </a:r>
-            <a:r>
-              <a:rPr lang="de-CH" sz="1200" dirty="0">
-                <a:solidFill>
-                  <a:srgbClr val="0070C0"/>
-                </a:solidFill>
-              </a:rPr>
-              <a:t>17931678-20b4-11e6-b67b-9e71128cca77</a:t>
-            </a:r>
-          </a:p>
-          <a:p>
-            <a:endParaRPr lang="en-US" sz="1200" dirty="0">
-              <a:solidFill>
-                <a:srgbClr val="C00000"/>
-              </a:solidFill>
-            </a:endParaRPr>
-          </a:p>
-          <a:p>
-            <a:endParaRPr lang="en-US" sz="1200" dirty="0">
-              <a:solidFill>
-                <a:srgbClr val="C00000"/>
-              </a:solidFill>
-            </a:endParaRPr>
-          </a:p>
-          <a:p>
-            <a:endParaRPr lang="en-US" sz="1200" b="1" dirty="0"/>
-          </a:p>
-          <a:p>
-            <a:endParaRPr lang="en-US" sz="1200" b="1" dirty="0"/>
-          </a:p>
-          <a:p>
-            <a:endParaRPr lang="en-US" sz="1200" b="1" dirty="0"/>
-          </a:p>
-        </p:txBody>
-      </p:sp>
-      <p:sp>
-        <p:nvSpPr>
-          <p:cNvPr id="13" name="TextBox 6">
-            <a:extLst>
-              <a:ext uri="{FF2B5EF4-FFF2-40B4-BE49-F238E27FC236}">
-                <a16:creationId xmlns:a16="http://schemas.microsoft.com/office/drawing/2014/main" id="{4DBB7227-D59A-D4BA-2409-6BC26BD0156C}"/>
-              </a:ext>
-            </a:extLst>
-          </p:cNvPr>
-          <p:cNvSpPr txBox="1"/>
-          <p:nvPr/>
-        </p:nvSpPr>
-        <p:spPr>
-          <a:xfrm>
-            <a:off x="1300829" y="9419060"/>
-            <a:ext cx="5166360" cy="457200"/>
-          </a:xfrm>
-          <a:prstGeom prst="rect">
-            <a:avLst/>
-          </a:prstGeom>
-          <a:solidFill>
-            <a:schemeClr val="accent4">
-              <a:lumMod val="20000"/>
-              <a:lumOff val="80000"/>
-            </a:schemeClr>
-          </a:solidFill>
-          <a:ln w="19050">
-            <a:solidFill>
-              <a:srgbClr val="00B0F0"/>
-            </a:solidFill>
-          </a:ln>
-        </p:spPr>
-        <p:txBody>
-          <a:bodyPr wrap="square" rtlCol="0">
-            <a:spAutoFit/>
-          </a:bodyPr>
-          <a:lstStyle>
-            <a:defPPr>
-              <a:defRPr lang="de-DE"/>
-            </a:defPPr>
-            <a:lvl1pPr>
-              <a:defRPr sz="1200" b="1"/>
-            </a:lvl1pPr>
-          </a:lstStyle>
-          <a:p>
-            <a:r>
-              <a:rPr lang="de-CH" dirty="0"/>
-              <a:t>MedicationStatement</a:t>
-            </a:r>
-          </a:p>
-          <a:p>
-            <a:r>
-              <a:rPr lang="de-CH" b="0" dirty="0"/>
-              <a:t>identifier (resource) </a:t>
-            </a:r>
-            <a:r>
-              <a:rPr lang="de-CH" b="0"/>
-              <a:t>= </a:t>
-            </a:r>
-            <a:r>
-              <a:rPr lang="de-CH" b="0">
-                <a:solidFill>
-                  <a:srgbClr val="00B0F0"/>
-                </a:solidFill>
-              </a:rPr>
-              <a:t>17931678-20b4-11e6-b67b-9e71128cca77  </a:t>
-            </a:r>
-            <a:endParaRPr lang="de-CH" b="0" dirty="0">
-              <a:solidFill>
-                <a:srgbClr val="00B0F0"/>
-              </a:solidFill>
-            </a:endParaRPr>
-          </a:p>
-        </p:txBody>
-      </p:sp>
-      <p:sp>
-        <p:nvSpPr>
-          <p:cNvPr id="14" name="TextBox 9">
-            <a:extLst>
-              <a:ext uri="{FF2B5EF4-FFF2-40B4-BE49-F238E27FC236}">
-                <a16:creationId xmlns:a16="http://schemas.microsoft.com/office/drawing/2014/main" id="{F6C1B186-314F-C611-C769-2966B95500E4}"/>
-              </a:ext>
-            </a:extLst>
-          </p:cNvPr>
-          <p:cNvSpPr txBox="1"/>
-          <p:nvPr/>
-        </p:nvSpPr>
-        <p:spPr>
-          <a:xfrm>
-            <a:off x="1130925" y="10349143"/>
-            <a:ext cx="5486400" cy="2123658"/>
-          </a:xfrm>
-          <a:prstGeom prst="rect">
-            <a:avLst/>
-          </a:prstGeom>
-          <a:noFill/>
-          <a:ln w="19050">
-            <a:solidFill>
-              <a:schemeClr val="bg1">
-                <a:lumMod val="85000"/>
-              </a:schemeClr>
-            </a:solidFill>
-          </a:ln>
-        </p:spPr>
-        <p:txBody>
-          <a:bodyPr wrap="square" rtlCol="0">
-            <a:spAutoFit/>
-          </a:bodyPr>
-          <a:lstStyle>
-            <a:defPPr>
-              <a:defRPr lang="de-DE"/>
-            </a:defPPr>
-            <a:lvl1pPr>
-              <a:defRPr sz="1200" b="1"/>
-            </a:lvl1pPr>
-          </a:lstStyle>
-          <a:p>
-            <a:r>
-              <a:rPr lang="en-US" dirty="0"/>
-              <a:t>2-4  Medication Dispense document</a:t>
-            </a:r>
-          </a:p>
-          <a:p>
-            <a:r>
-              <a:rPr lang="en-US" b="0" dirty="0"/>
-              <a:t>i</a:t>
-            </a:r>
-            <a:r>
-              <a:rPr lang="en-US" sz="1200" b="0" dirty="0"/>
-              <a:t>dentifier (document)</a:t>
-            </a:r>
-            <a:r>
-              <a:rPr lang="en-US" b="0" dirty="0"/>
-              <a:t> = </a:t>
-            </a:r>
-            <a:r>
-              <a:rPr lang="de-CH" b="0" dirty="0">
-                <a:solidFill>
-                  <a:srgbClr val="00B050"/>
-                </a:solidFill>
-              </a:rPr>
-              <a:t>d8143fea-4778-11e6-beb8-9e71128cae77</a:t>
-            </a:r>
-          </a:p>
-          <a:p>
-            <a:endParaRPr lang="de-CH" b="0" dirty="0">
-              <a:solidFill>
-                <a:srgbClr val="00B050"/>
-              </a:solidFill>
-            </a:endParaRPr>
-          </a:p>
-          <a:p>
-            <a:endParaRPr lang="de-CH" b="0" dirty="0">
-              <a:solidFill>
-                <a:srgbClr val="CC0099"/>
-              </a:solidFill>
-            </a:endParaRPr>
-          </a:p>
-          <a:p>
-            <a:endParaRPr lang="de-CH" b="0" dirty="0"/>
-          </a:p>
-          <a:p>
-            <a:endParaRPr lang="de-CH" b="0" dirty="0"/>
-          </a:p>
-          <a:p>
-            <a:endParaRPr lang="de-CH" b="0" dirty="0"/>
-          </a:p>
-          <a:p>
-            <a:endParaRPr lang="de-CH" b="0" dirty="0"/>
-          </a:p>
-          <a:p>
-            <a:endParaRPr lang="en-US" b="0" dirty="0"/>
-          </a:p>
-          <a:p>
-            <a:endParaRPr lang="en-US" dirty="0"/>
-          </a:p>
-          <a:p>
-            <a:endParaRPr lang="en-US" dirty="0"/>
-          </a:p>
-        </p:txBody>
-      </p:sp>
-      <p:sp>
-        <p:nvSpPr>
-          <p:cNvPr id="15" name="TextBox 10">
-            <a:extLst>
-              <a:ext uri="{FF2B5EF4-FFF2-40B4-BE49-F238E27FC236}">
-                <a16:creationId xmlns:a16="http://schemas.microsoft.com/office/drawing/2014/main" id="{E7CFF42B-2186-017D-91EF-AF8E257BCB0A}"/>
-              </a:ext>
-            </a:extLst>
-          </p:cNvPr>
-          <p:cNvSpPr txBox="1"/>
-          <p:nvPr/>
-        </p:nvSpPr>
-        <p:spPr>
-          <a:xfrm>
-            <a:off x="1290945" y="11000125"/>
-            <a:ext cx="5166360" cy="1188720"/>
-          </a:xfrm>
-          <a:prstGeom prst="rect">
-            <a:avLst/>
-          </a:prstGeom>
-          <a:solidFill>
-            <a:schemeClr val="accent4">
-              <a:lumMod val="20000"/>
-              <a:lumOff val="80000"/>
-            </a:schemeClr>
-          </a:solidFill>
-          <a:ln w="19050">
-            <a:solidFill>
-              <a:srgbClr val="92D050"/>
-            </a:solidFill>
-          </a:ln>
-        </p:spPr>
-        <p:txBody>
-          <a:bodyPr wrap="square" rtlCol="0">
-            <a:spAutoFit/>
-          </a:bodyPr>
-          <a:lstStyle>
-            <a:defPPr>
-              <a:defRPr lang="de-DE"/>
-            </a:defPPr>
-            <a:lvl1pPr>
-              <a:defRPr sz="1200" b="0"/>
-            </a:lvl1pPr>
-          </a:lstStyle>
-          <a:p>
-            <a:r>
-              <a:rPr lang="de-CH" b="1" dirty="0"/>
-              <a:t>MedicationDispense</a:t>
-            </a:r>
-          </a:p>
-          <a:p>
-            <a:r>
-              <a:rPr lang="de-CH" dirty="0"/>
-              <a:t>identifier (resource) = </a:t>
-            </a:r>
-            <a:r>
-              <a:rPr lang="de-CH" dirty="0">
-                <a:solidFill>
-                  <a:srgbClr val="92D050"/>
-                </a:solidFill>
-              </a:rPr>
-              <a:t>d8143fea-4778-11e6-beb8-9e71128cae77</a:t>
-            </a:r>
-          </a:p>
-          <a:p>
-            <a:endParaRPr lang="de-CH" dirty="0"/>
-          </a:p>
-          <a:p>
-            <a:r>
-              <a:rPr lang="de-CH" dirty="0"/>
-              <a:t>extension:treatmentPlan (</a:t>
-            </a:r>
-            <a:r>
-              <a:rPr lang="de-CH" b="0" dirty="0"/>
-              <a:t>ch-emed-ext-treatmentplan )</a:t>
-            </a:r>
-            <a:endParaRPr lang="de-CH" dirty="0"/>
-          </a:p>
-          <a:p>
-            <a:pPr marL="171450" indent="-171450">
-              <a:buFontTx/>
-              <a:buChar char="-"/>
-            </a:pPr>
-            <a:r>
-              <a:rPr lang="de-CH" dirty="0"/>
-              <a:t>extension:id = </a:t>
-            </a:r>
-            <a:r>
-              <a:rPr lang="de-CH" dirty="0">
-                <a:solidFill>
-                  <a:srgbClr val="00B0F0"/>
-                </a:solidFill>
-              </a:rPr>
-              <a:t>17931678-20b4-11e6-b67b-9e71128cca77</a:t>
-            </a:r>
-          </a:p>
-          <a:p>
-            <a:pPr marL="171450" indent="-171450">
-              <a:buFontTx/>
-              <a:buChar char="-"/>
-            </a:pPr>
-            <a:r>
-              <a:rPr lang="de-CH" dirty="0"/>
-              <a:t>extension:externalDocumentId </a:t>
-            </a:r>
-            <a:r>
-              <a:rPr lang="de-CH" dirty="0">
-                <a:solidFill>
-                  <a:srgbClr val="7030A0"/>
-                </a:solidFill>
-              </a:rPr>
-              <a:t>= </a:t>
-            </a:r>
-            <a:r>
-              <a:rPr lang="de-CH" dirty="0">
-                <a:solidFill>
-                  <a:srgbClr val="0070C0"/>
-                </a:solidFill>
-              </a:rPr>
-              <a:t>17931678-20b4-11e6-b67b-9e71128cca77</a:t>
-            </a:r>
-          </a:p>
-        </p:txBody>
-      </p:sp>
-      <p:sp>
-        <p:nvSpPr>
-          <p:cNvPr id="16" name="TextBox 9">
-            <a:extLst>
-              <a:ext uri="{FF2B5EF4-FFF2-40B4-BE49-F238E27FC236}">
-                <a16:creationId xmlns:a16="http://schemas.microsoft.com/office/drawing/2014/main" id="{3D6A90CD-33AD-B3BD-31F7-A1F8F7C5ADD3}"/>
-              </a:ext>
-            </a:extLst>
-          </p:cNvPr>
-          <p:cNvSpPr txBox="1"/>
-          <p:nvPr/>
-        </p:nvSpPr>
-        <p:spPr>
-          <a:xfrm>
-            <a:off x="1130925" y="12736312"/>
-            <a:ext cx="5486400" cy="1384995"/>
-          </a:xfrm>
-          <a:prstGeom prst="rect">
-            <a:avLst/>
-          </a:prstGeom>
-          <a:noFill/>
-          <a:ln w="19050">
-            <a:solidFill>
-              <a:schemeClr val="bg1">
-                <a:lumMod val="85000"/>
-              </a:schemeClr>
-            </a:solidFill>
-          </a:ln>
-        </p:spPr>
-        <p:txBody>
-          <a:bodyPr wrap="square" rtlCol="0">
-            <a:spAutoFit/>
-          </a:bodyPr>
-          <a:lstStyle>
-            <a:defPPr>
-              <a:defRPr lang="de-DE"/>
-            </a:defPPr>
-            <a:lvl1pPr>
-              <a:defRPr sz="1200" b="1"/>
-            </a:lvl1pPr>
-          </a:lstStyle>
-          <a:p>
-            <a:r>
-              <a:rPr lang="en-US" dirty="0"/>
-              <a:t>2-5 </a:t>
-            </a:r>
-            <a:r>
-              <a:rPr lang="de-CH" dirty="0"/>
-              <a:t>Medication Treatment Plan document</a:t>
-            </a:r>
-          </a:p>
-          <a:p>
-            <a:r>
-              <a:rPr lang="en-US" b="0" dirty="0"/>
-              <a:t>i</a:t>
-            </a:r>
-            <a:r>
-              <a:rPr lang="en-US" sz="1200" b="0" dirty="0"/>
-              <a:t>dentifier (document)</a:t>
-            </a:r>
-            <a:r>
-              <a:rPr lang="de-CH" b="0" dirty="0"/>
-              <a:t> = </a:t>
-            </a:r>
-            <a:r>
-              <a:rPr lang="de-CH" b="0" dirty="0">
-                <a:solidFill>
-                  <a:srgbClr val="0070C0"/>
-                </a:solidFill>
-              </a:rPr>
-              <a:t>5712fffe-20c6-11e6-b67b-9e71128cae77</a:t>
-            </a:r>
-          </a:p>
-          <a:p>
-            <a:endParaRPr lang="de-CH" b="0" dirty="0">
-              <a:solidFill>
-                <a:srgbClr val="C8BA02"/>
-              </a:solidFill>
-            </a:endParaRPr>
-          </a:p>
-          <a:p>
-            <a:endParaRPr lang="de-CH" b="0" dirty="0">
-              <a:solidFill>
-                <a:srgbClr val="C8BA02"/>
-              </a:solidFill>
-            </a:endParaRPr>
-          </a:p>
-          <a:p>
-            <a:endParaRPr lang="de-CH" b="0" dirty="0"/>
-          </a:p>
-          <a:p>
-            <a:endParaRPr lang="en-US" dirty="0"/>
-          </a:p>
-          <a:p>
-            <a:endParaRPr lang="en-US" dirty="0"/>
-          </a:p>
-        </p:txBody>
-      </p:sp>
-      <p:sp>
-        <p:nvSpPr>
-          <p:cNvPr id="17" name="TextBox 10">
-            <a:extLst>
-              <a:ext uri="{FF2B5EF4-FFF2-40B4-BE49-F238E27FC236}">
-                <a16:creationId xmlns:a16="http://schemas.microsoft.com/office/drawing/2014/main" id="{7DD7EE78-9A53-5013-2BF6-C5862D49B517}"/>
-              </a:ext>
-            </a:extLst>
-          </p:cNvPr>
-          <p:cNvSpPr txBox="1"/>
-          <p:nvPr/>
-        </p:nvSpPr>
-        <p:spPr>
-          <a:xfrm>
-            <a:off x="1290945" y="13258165"/>
-            <a:ext cx="5166360" cy="457200"/>
-          </a:xfrm>
-          <a:prstGeom prst="rect">
-            <a:avLst/>
-          </a:prstGeom>
-          <a:solidFill>
-            <a:schemeClr val="accent1">
-              <a:lumMod val="20000"/>
-              <a:lumOff val="80000"/>
-            </a:schemeClr>
-          </a:solidFill>
-          <a:ln w="19050">
-            <a:solidFill>
-              <a:srgbClr val="00B0F0"/>
-            </a:solidFill>
-          </a:ln>
-        </p:spPr>
-        <p:txBody>
-          <a:bodyPr wrap="square" rtlCol="0">
-            <a:spAutoFit/>
-          </a:bodyPr>
-          <a:lstStyle>
-            <a:defPPr>
-              <a:defRPr lang="de-DE"/>
-            </a:defPPr>
-            <a:lvl1pPr>
-              <a:defRPr sz="1200" b="1"/>
-            </a:lvl1pPr>
-          </a:lstStyle>
-          <a:p>
-            <a:r>
-              <a:rPr lang="de-CH" dirty="0"/>
-              <a:t>MedicationStatement</a:t>
-            </a:r>
-          </a:p>
-          <a:p>
-            <a:r>
-              <a:rPr lang="de-CH" b="0" dirty="0"/>
-              <a:t>identifier (resource) = </a:t>
-            </a:r>
-            <a:r>
-              <a:rPr lang="de-CH" b="0" dirty="0">
-                <a:solidFill>
-                  <a:srgbClr val="00B0F0"/>
-                </a:solidFill>
-              </a:rPr>
-              <a:t>5712fffe-20c6-11e6-b67b-9e71128cae77</a:t>
-            </a:r>
-            <a:endParaRPr lang="LID4096" b="0" dirty="0">
-              <a:solidFill>
-                <a:srgbClr val="00B0F0"/>
-              </a:solidFill>
-            </a:endParaRPr>
+              <a:t>d428e837-46fe-49cc-9212-245d153c68ee</a:t>
+            </a:r>
           </a:p>
         </p:txBody>
       </p:sp>
@@ -16356,229 +16900,6 @@
               <a:rPr lang="en-US" sz="1200" b="1" dirty="0"/>
               <a:t>Triatec</a:t>
             </a:r>
-          </a:p>
-        </p:txBody>
-      </p:sp>
-      <p:sp>
-        <p:nvSpPr>
-          <p:cNvPr id="52" name="TextBox 5">
-            <a:extLst>
-              <a:ext uri="{FF2B5EF4-FFF2-40B4-BE49-F238E27FC236}">
-                <a16:creationId xmlns:a16="http://schemas.microsoft.com/office/drawing/2014/main" id="{D6AE6F55-FE9B-42CD-4861-76C204C58519}"/>
-              </a:ext>
-            </a:extLst>
-          </p:cNvPr>
-          <p:cNvSpPr txBox="1"/>
-          <p:nvPr/>
-        </p:nvSpPr>
-        <p:spPr>
-          <a:xfrm rot="16200000">
-            <a:off x="-1248164" y="10537524"/>
-            <a:ext cx="3593556" cy="276999"/>
-          </a:xfrm>
-          <a:prstGeom prst="rect">
-            <a:avLst/>
-          </a:prstGeom>
-          <a:solidFill>
-            <a:schemeClr val="accent4">
-              <a:lumMod val="20000"/>
-              <a:lumOff val="80000"/>
-            </a:schemeClr>
-          </a:solidFill>
-          <a:ln w="19050">
-            <a:solidFill>
-              <a:schemeClr val="bg1">
-                <a:lumMod val="75000"/>
-              </a:schemeClr>
-            </a:solidFill>
-          </a:ln>
-        </p:spPr>
-        <p:txBody>
-          <a:bodyPr wrap="square" rtlCol="0">
-            <a:spAutoFit/>
-          </a:bodyPr>
-          <a:lstStyle/>
-          <a:p>
-            <a:r>
-              <a:rPr lang="en-US" sz="1200" b="1" dirty="0"/>
-              <a:t>Beloc Zok</a:t>
-            </a:r>
-          </a:p>
-        </p:txBody>
-      </p:sp>
-      <p:sp>
-        <p:nvSpPr>
-          <p:cNvPr id="53" name="TextBox 5">
-            <a:extLst>
-              <a:ext uri="{FF2B5EF4-FFF2-40B4-BE49-F238E27FC236}">
-                <a16:creationId xmlns:a16="http://schemas.microsoft.com/office/drawing/2014/main" id="{F5991543-1D70-B304-9D94-3DFC5A6819FB}"/>
-              </a:ext>
-            </a:extLst>
-          </p:cNvPr>
-          <p:cNvSpPr txBox="1"/>
-          <p:nvPr/>
-        </p:nvSpPr>
-        <p:spPr>
-          <a:xfrm rot="16200000">
-            <a:off x="-1248165" y="14401032"/>
-            <a:ext cx="3593557" cy="276999"/>
-          </a:xfrm>
-          <a:prstGeom prst="rect">
-            <a:avLst/>
-          </a:prstGeom>
-          <a:solidFill>
-            <a:schemeClr val="accent1">
-              <a:lumMod val="20000"/>
-              <a:lumOff val="80000"/>
-            </a:schemeClr>
-          </a:solidFill>
-          <a:ln w="19050">
-            <a:solidFill>
-              <a:schemeClr val="bg1">
-                <a:lumMod val="75000"/>
-              </a:schemeClr>
-            </a:solidFill>
-          </a:ln>
-        </p:spPr>
-        <p:txBody>
-          <a:bodyPr wrap="square" rtlCol="0">
-            <a:spAutoFit/>
-          </a:bodyPr>
-          <a:lstStyle/>
-          <a:p>
-            <a:r>
-              <a:rPr lang="en-US" sz="1200" b="1" dirty="0"/>
-              <a:t>Norvasc</a:t>
-            </a:r>
-          </a:p>
-        </p:txBody>
-      </p:sp>
-      <p:sp>
-        <p:nvSpPr>
-          <p:cNvPr id="100" name="TextBox 8">
-            <a:extLst>
-              <a:ext uri="{FF2B5EF4-FFF2-40B4-BE49-F238E27FC236}">
-                <a16:creationId xmlns:a16="http://schemas.microsoft.com/office/drawing/2014/main" id="{D03AF73B-8B75-C6A4-30AE-30F605B5D5C4}"/>
-              </a:ext>
-            </a:extLst>
-          </p:cNvPr>
-          <p:cNvSpPr txBox="1"/>
-          <p:nvPr/>
-        </p:nvSpPr>
-        <p:spPr>
-          <a:xfrm>
-            <a:off x="7779315" y="12674512"/>
-            <a:ext cx="5166360" cy="1384995"/>
-          </a:xfrm>
-          <a:prstGeom prst="rect">
-            <a:avLst/>
-          </a:prstGeom>
-          <a:solidFill>
-            <a:schemeClr val="accent1">
-              <a:lumMod val="20000"/>
-              <a:lumOff val="80000"/>
-            </a:schemeClr>
-          </a:solidFill>
-          <a:ln w="19050">
-            <a:solidFill>
-              <a:srgbClr val="00B0F0"/>
-            </a:solidFill>
-          </a:ln>
-        </p:spPr>
-        <p:txBody>
-          <a:bodyPr wrap="square" rtlCol="0">
-            <a:spAutoFit/>
-          </a:bodyPr>
-          <a:lstStyle>
-            <a:defPPr>
-              <a:defRPr lang="de-DE"/>
-            </a:defPPr>
-            <a:lvl1pPr>
-              <a:defRPr sz="1200" b="1"/>
-            </a:lvl1pPr>
-          </a:lstStyle>
-          <a:p>
-            <a:r>
-              <a:rPr lang="en-US" dirty="0"/>
-              <a:t>Medication</a:t>
-            </a:r>
-            <a:r>
-              <a:rPr lang="de-CH" dirty="0"/>
-              <a:t>Statement</a:t>
-            </a:r>
-          </a:p>
-          <a:p>
-            <a:r>
-              <a:rPr lang="de-CH" b="0" dirty="0"/>
-              <a:t>identifier (resource) = </a:t>
-            </a:r>
-            <a:r>
-              <a:rPr lang="de-CH" b="0" dirty="0">
-                <a:solidFill>
-                  <a:schemeClr val="accent2">
-                    <a:lumMod val="60000"/>
-                    <a:lumOff val="40000"/>
-                  </a:schemeClr>
-                </a:solidFill>
-              </a:rPr>
-              <a:t>534996fe-5e45-40ed-9388-06fa268e13d8</a:t>
-            </a:r>
-          </a:p>
-          <a:p>
-            <a:endParaRPr lang="de-CH" b="0" dirty="0"/>
-          </a:p>
-          <a:p>
-            <a:r>
-              <a:rPr lang="de-CH" b="0" dirty="0"/>
-              <a:t>extension:treatmentPlan (ch-emed-ext-treatmentplan)</a:t>
-            </a:r>
-          </a:p>
-          <a:p>
-            <a:pPr marL="171450" indent="-171450">
-              <a:buFontTx/>
-              <a:buChar char="-"/>
-            </a:pPr>
-            <a:r>
-              <a:rPr lang="de-CH" b="0" dirty="0"/>
-              <a:t>extension:id = </a:t>
-            </a:r>
-            <a:r>
-              <a:rPr lang="de-CH" b="0" dirty="0">
-                <a:solidFill>
-                  <a:srgbClr val="00B0F0"/>
-                </a:solidFill>
-              </a:rPr>
-              <a:t>5712fffe-20c6-11e6-b67b-9e71128cae77</a:t>
-            </a:r>
-          </a:p>
-          <a:p>
-            <a:pPr marL="171450" indent="-171450">
-              <a:buFontTx/>
-              <a:buChar char="-"/>
-            </a:pPr>
-            <a:r>
-              <a:rPr lang="de-CH" b="0" dirty="0"/>
-              <a:t>extension:externalDocumentId = </a:t>
-            </a:r>
-            <a:r>
-              <a:rPr lang="de-CH" b="0" dirty="0">
-                <a:solidFill>
-                  <a:srgbClr val="0070C0"/>
-                </a:solidFill>
-              </a:rPr>
-              <a:t>5712fffe-20c6-11e6-b67b-9e71128cae77</a:t>
-            </a:r>
-          </a:p>
-          <a:p>
-            <a:pPr marL="171450" indent="-171450">
-              <a:buFontTx/>
-              <a:buChar char="-"/>
-            </a:pPr>
-            <a:endParaRPr lang="de-CH" b="0" dirty="0">
-              <a:solidFill>
-                <a:srgbClr val="7030A0"/>
-              </a:solidFill>
-            </a:endParaRPr>
           </a:p>
         </p:txBody>
       </p:sp>
@@ -16892,245 +17213,6 @@
                 <a:lumMod val="75000"/>
               </a:schemeClr>
             </a:solidFill>
-          </a:ln>
-        </p:spPr>
-        <p:style>
-          <a:lnRef idx="1">
-            <a:schemeClr val="accent6"/>
-          </a:lnRef>
-          <a:fillRef idx="0">
-            <a:schemeClr val="accent6"/>
-          </a:fillRef>
-          <a:effectRef idx="0">
-            <a:schemeClr val="accent6"/>
-          </a:effectRef>
-          <a:fontRef idx="minor">
-            <a:schemeClr val="tx1"/>
-          </a:fontRef>
-        </p:style>
-      </p:cxnSp>
-      <p:cxnSp>
-        <p:nvCxnSpPr>
-          <p:cNvPr id="208" name="Verbinder: gewinkelt 119">
-            <a:extLst>
-              <a:ext uri="{FF2B5EF4-FFF2-40B4-BE49-F238E27FC236}">
-                <a16:creationId xmlns:a16="http://schemas.microsoft.com/office/drawing/2014/main" id="{0A4EE844-75E5-625D-3E53-F4D6FDCD5E7D}"/>
-              </a:ext>
-            </a:extLst>
-          </p:cNvPr>
-          <p:cNvCxnSpPr>
-            <a:cxnSpLocks/>
-            <a:endCxn id="12" idx="1"/>
-          </p:cNvCxnSpPr>
-          <p:nvPr/>
-        </p:nvCxnSpPr>
-        <p:spPr>
-          <a:xfrm rot="16200000" flipV="1">
-            <a:off x="186315" y="10516353"/>
-            <a:ext cx="2127518" cy="238298"/>
-          </a:xfrm>
-          <a:prstGeom prst="bentConnector4">
-            <a:avLst>
-              <a:gd name="adj1" fmla="val 209"/>
-              <a:gd name="adj2" fmla="val 195930"/>
-            </a:avLst>
-          </a:prstGeom>
-          <a:ln>
-            <a:solidFill>
-              <a:schemeClr val="bg1">
-                <a:lumMod val="75000"/>
-              </a:schemeClr>
-            </a:solidFill>
-            <a:tailEnd type="triangle"/>
-          </a:ln>
-        </p:spPr>
-        <p:style>
-          <a:lnRef idx="1">
-            <a:schemeClr val="accent6"/>
-          </a:lnRef>
-          <a:fillRef idx="0">
-            <a:schemeClr val="accent6"/>
-          </a:fillRef>
-          <a:effectRef idx="0">
-            <a:schemeClr val="accent6"/>
-          </a:effectRef>
-          <a:fontRef idx="minor">
-            <a:schemeClr val="tx1"/>
-          </a:fontRef>
-        </p:style>
-      </p:cxnSp>
-      <p:cxnSp>
-        <p:nvCxnSpPr>
-          <p:cNvPr id="211" name="Verbinder: gewinkelt 119">
-            <a:extLst>
-              <a:ext uri="{FF2B5EF4-FFF2-40B4-BE49-F238E27FC236}">
-                <a16:creationId xmlns:a16="http://schemas.microsoft.com/office/drawing/2014/main" id="{DA1D97C0-C833-E07F-68FB-317F93E82789}"/>
-              </a:ext>
-            </a:extLst>
-          </p:cNvPr>
-          <p:cNvCxnSpPr>
-            <a:cxnSpLocks/>
-            <a:endCxn id="12" idx="3"/>
-          </p:cNvCxnSpPr>
-          <p:nvPr/>
-        </p:nvCxnSpPr>
-        <p:spPr>
-          <a:xfrm rot="16200000" flipV="1">
-            <a:off x="5840376" y="10348693"/>
-            <a:ext cx="2127517" cy="573618"/>
-          </a:xfrm>
-          <a:prstGeom prst="bentConnector2">
-            <a:avLst/>
-          </a:prstGeom>
-          <a:ln>
-            <a:solidFill>
-              <a:schemeClr val="bg1">
-                <a:lumMod val="75000"/>
-              </a:schemeClr>
-            </a:solidFill>
-            <a:tailEnd type="triangle"/>
-          </a:ln>
-        </p:spPr>
-        <p:style>
-          <a:lnRef idx="1">
-            <a:schemeClr val="accent6"/>
-          </a:lnRef>
-          <a:fillRef idx="0">
-            <a:schemeClr val="accent6"/>
-          </a:fillRef>
-          <a:effectRef idx="0">
-            <a:schemeClr val="accent6"/>
-          </a:effectRef>
-          <a:fontRef idx="minor">
-            <a:schemeClr val="tx1"/>
-          </a:fontRef>
-        </p:style>
-      </p:cxnSp>
-      <p:cxnSp>
-        <p:nvCxnSpPr>
-          <p:cNvPr id="231" name="Straight Connector 230">
-            <a:extLst>
-              <a:ext uri="{FF2B5EF4-FFF2-40B4-BE49-F238E27FC236}">
-                <a16:creationId xmlns:a16="http://schemas.microsoft.com/office/drawing/2014/main" id="{59C3942F-61D0-D72B-8274-436EE99B694E}"/>
-              </a:ext>
-            </a:extLst>
-          </p:cNvPr>
-          <p:cNvCxnSpPr>
-            <a:cxnSpLocks/>
-          </p:cNvCxnSpPr>
-          <p:nvPr/>
-        </p:nvCxnSpPr>
-        <p:spPr>
-          <a:xfrm flipV="1">
-            <a:off x="7190942" y="11699260"/>
-            <a:ext cx="651578" cy="1"/>
-          </a:xfrm>
-          <a:prstGeom prst="line">
-            <a:avLst/>
-          </a:prstGeom>
-          <a:ln>
-            <a:solidFill>
-              <a:schemeClr val="bg1">
-                <a:lumMod val="75000"/>
-              </a:schemeClr>
-            </a:solidFill>
-          </a:ln>
-        </p:spPr>
-        <p:style>
-          <a:lnRef idx="1">
-            <a:schemeClr val="accent6"/>
-          </a:lnRef>
-          <a:fillRef idx="0">
-            <a:schemeClr val="accent6"/>
-          </a:fillRef>
-          <a:effectRef idx="0">
-            <a:schemeClr val="accent6"/>
-          </a:effectRef>
-          <a:fontRef idx="minor">
-            <a:schemeClr val="tx1"/>
-          </a:fontRef>
-        </p:style>
-      </p:cxnSp>
-      <p:cxnSp>
-        <p:nvCxnSpPr>
-          <p:cNvPr id="235" name="Verbinder: gewinkelt 119">
-            <a:extLst>
-              <a:ext uri="{FF2B5EF4-FFF2-40B4-BE49-F238E27FC236}">
-                <a16:creationId xmlns:a16="http://schemas.microsoft.com/office/drawing/2014/main" id="{4EA69642-CD5E-E2D3-625B-38066E2B0159}"/>
-              </a:ext>
-            </a:extLst>
-          </p:cNvPr>
-          <p:cNvCxnSpPr>
-            <a:cxnSpLocks/>
-          </p:cNvCxnSpPr>
-          <p:nvPr/>
-        </p:nvCxnSpPr>
-        <p:spPr>
-          <a:xfrm rot="16200000" flipV="1">
-            <a:off x="111853" y="14333739"/>
-            <a:ext cx="2225656" cy="238298"/>
-          </a:xfrm>
-          <a:prstGeom prst="bentConnector4">
-            <a:avLst>
-              <a:gd name="adj1" fmla="val 128"/>
-              <a:gd name="adj2" fmla="val 195930"/>
-            </a:avLst>
-          </a:prstGeom>
-          <a:ln>
-            <a:solidFill>
-              <a:schemeClr val="bg1">
-                <a:lumMod val="75000"/>
-              </a:schemeClr>
-            </a:solidFill>
-            <a:tailEnd type="triangle"/>
-          </a:ln>
-        </p:spPr>
-        <p:style>
-          <a:lnRef idx="1">
-            <a:schemeClr val="accent6"/>
-          </a:lnRef>
-          <a:fillRef idx="0">
-            <a:schemeClr val="accent6"/>
-          </a:fillRef>
-          <a:effectRef idx="0">
-            <a:schemeClr val="accent6"/>
-          </a:effectRef>
-          <a:fontRef idx="minor">
-            <a:schemeClr val="tx1"/>
-          </a:fontRef>
-        </p:style>
-      </p:cxnSp>
-      <p:cxnSp>
-        <p:nvCxnSpPr>
-          <p:cNvPr id="236" name="Verbinder: gewinkelt 119">
-            <a:extLst>
-              <a:ext uri="{FF2B5EF4-FFF2-40B4-BE49-F238E27FC236}">
-                <a16:creationId xmlns:a16="http://schemas.microsoft.com/office/drawing/2014/main" id="{9EE1AE21-DD65-4E49-272B-B00CF847E193}"/>
-              </a:ext>
-            </a:extLst>
-          </p:cNvPr>
-          <p:cNvCxnSpPr>
-            <a:cxnSpLocks/>
-          </p:cNvCxnSpPr>
-          <p:nvPr/>
-        </p:nvCxnSpPr>
-        <p:spPr>
-          <a:xfrm rot="10800000">
-            <a:off x="6616841" y="13366777"/>
-            <a:ext cx="1210337" cy="2"/>
-          </a:xfrm>
-          <a:prstGeom prst="bentConnector3">
-            <a:avLst>
-              <a:gd name="adj1" fmla="val 50000"/>
-            </a:avLst>
-          </a:prstGeom>
-          <a:ln>
-            <a:solidFill>
-              <a:schemeClr val="bg1">
-                <a:lumMod val="75000"/>
-              </a:schemeClr>
-            </a:solidFill>
-            <a:tailEnd type="triangle"/>
           </a:ln>
         </p:spPr>
         <p:style>

</xml_diff>